<commit_message>
Primera descripción de los efectos
</commit_message>
<xml_diff>
--- a/Subsis/Presentación/Sistema de adquisición, filtrado y Tratamiento digital.pptx
+++ b/Subsis/Presentación/Sistema de adquisición, filtrado y Tratamiento digital.pptx
@@ -5,10 +5,10 @@
     <p:sldMasterId id="2147483669" r:id="rId1"/>
   </p:sldMasterIdLst>
   <p:notesMasterIdLst>
-    <p:notesMasterId r:id="rId25"/>
+    <p:notesMasterId r:id="rId32"/>
   </p:notesMasterIdLst>
   <p:handoutMasterIdLst>
-    <p:handoutMasterId r:id="rId26"/>
+    <p:handoutMasterId r:id="rId33"/>
   </p:handoutMasterIdLst>
   <p:sldIdLst>
     <p:sldId id="256" r:id="rId2"/>
@@ -27,13 +27,20 @@
     <p:sldId id="266" r:id="rId15"/>
     <p:sldId id="267" r:id="rId16"/>
     <p:sldId id="268" r:id="rId17"/>
-    <p:sldId id="269" r:id="rId18"/>
-    <p:sldId id="279" r:id="rId19"/>
-    <p:sldId id="278" r:id="rId20"/>
-    <p:sldId id="270" r:id="rId21"/>
-    <p:sldId id="276" r:id="rId22"/>
-    <p:sldId id="273" r:id="rId23"/>
-    <p:sldId id="272" r:id="rId24"/>
+    <p:sldId id="280" r:id="rId18"/>
+    <p:sldId id="281" r:id="rId19"/>
+    <p:sldId id="282" r:id="rId20"/>
+    <p:sldId id="284" r:id="rId21"/>
+    <p:sldId id="283" r:id="rId22"/>
+    <p:sldId id="286" r:id="rId23"/>
+    <p:sldId id="285" r:id="rId24"/>
+    <p:sldId id="269" r:id="rId25"/>
+    <p:sldId id="279" r:id="rId26"/>
+    <p:sldId id="278" r:id="rId27"/>
+    <p:sldId id="270" r:id="rId28"/>
+    <p:sldId id="276" r:id="rId29"/>
+    <p:sldId id="273" r:id="rId30"/>
+    <p:sldId id="272" r:id="rId31"/>
   </p:sldIdLst>
   <p:sldSz cx="12192000" cy="6858000"/>
   <p:notesSz cx="6858000" cy="9144000"/>
@@ -14961,7 +14968,7 @@
           <a:p>
             <a:fld id="{0BED2AD6-8755-4780-A945-DFB3AAF8B968}" type="slidenum">
               <a:rPr lang="en-US" smtClean="0"/>
-              <a:t>‹#›</a:t>
+              <a:t>‹Nº›</a:t>
             </a:fld>
             <a:endParaRPr lang="en-US"/>
           </a:p>
@@ -15227,7 +15234,7 @@
           <a:p>
             <a:fld id="{6B93383A-9629-40DD-AC2C-9F630984072E}" type="slidenum">
               <a:rPr lang="en-US" smtClean="0"/>
-              <a:t>‹#›</a:t>
+              <a:t>‹Nº›</a:t>
             </a:fld>
             <a:endParaRPr lang="en-US"/>
           </a:p>
@@ -15563,7 +15570,7 @@
           <a:p>
             <a:fld id="{6D22F896-40B5-4ADD-8801-0D06FADFA095}" type="slidenum">
               <a:rPr lang="en-US" smtClean="0"/>
-              <a:t>‹#›</a:t>
+              <a:t>‹Nº›</a:t>
             </a:fld>
             <a:endParaRPr lang="en-US" dirty="0"/>
           </a:p>
@@ -15824,7 +15831,7 @@
           <a:p>
             <a:fld id="{6D22F896-40B5-4ADD-8801-0D06FADFA095}" type="slidenum">
               <a:rPr lang="en-US" smtClean="0"/>
-              <a:t>‹#›</a:t>
+              <a:t>‹Nº›</a:t>
             </a:fld>
             <a:endParaRPr lang="en-US" dirty="0"/>
           </a:p>
@@ -16069,7 +16076,7 @@
           <a:p>
             <a:fld id="{6D22F896-40B5-4ADD-8801-0D06FADFA095}" type="slidenum">
               <a:rPr lang="en-US" smtClean="0"/>
-              <a:t>‹#›</a:t>
+              <a:t>‹Nº›</a:t>
             </a:fld>
             <a:endParaRPr lang="en-US" dirty="0"/>
           </a:p>
@@ -16383,7 +16390,7 @@
           <a:p>
             <a:fld id="{6D22F896-40B5-4ADD-8801-0D06FADFA095}" type="slidenum">
               <a:rPr lang="en-US" smtClean="0"/>
-              <a:t>‹#›</a:t>
+              <a:t>‹Nº›</a:t>
             </a:fld>
             <a:endParaRPr lang="en-US" dirty="0"/>
           </a:p>
@@ -16860,7 +16867,7 @@
           <a:p>
             <a:fld id="{6D22F896-40B5-4ADD-8801-0D06FADFA095}" type="slidenum">
               <a:rPr lang="en-US" smtClean="0"/>
-              <a:t>‹#›</a:t>
+              <a:t>‹Nº›</a:t>
             </a:fld>
             <a:endParaRPr lang="en-US" dirty="0"/>
           </a:p>
@@ -17401,7 +17408,7 @@
           <a:p>
             <a:fld id="{6D22F896-40B5-4ADD-8801-0D06FADFA095}" type="slidenum">
               <a:rPr lang="en-US" smtClean="0"/>
-              <a:t>‹#›</a:t>
+              <a:t>‹Nº›</a:t>
             </a:fld>
             <a:endParaRPr lang="en-US" dirty="0"/>
           </a:p>
@@ -18179,7 +18186,7 @@
           <a:p>
             <a:fld id="{6D22F896-40B5-4ADD-8801-0D06FADFA095}" type="slidenum">
               <a:rPr lang="en-US" smtClean="0"/>
-              <a:t>‹#›</a:t>
+              <a:t>‹Nº›</a:t>
             </a:fld>
             <a:endParaRPr lang="en-US" dirty="0"/>
           </a:p>
@@ -18358,7 +18365,7 @@
           <a:p>
             <a:fld id="{6D22F896-40B5-4ADD-8801-0D06FADFA095}" type="slidenum">
               <a:rPr lang="en-US" smtClean="0"/>
-              <a:t>‹#›</a:t>
+              <a:t>‹Nº›</a:t>
             </a:fld>
             <a:endParaRPr lang="en-US" dirty="0"/>
           </a:p>
@@ -18595,7 +18602,7 @@
           <a:p>
             <a:fld id="{6D22F896-40B5-4ADD-8801-0D06FADFA095}" type="slidenum">
               <a:rPr lang="en-US" smtClean="0"/>
-              <a:t>‹#›</a:t>
+              <a:t>‹Nº›</a:t>
             </a:fld>
             <a:endParaRPr lang="en-US" dirty="0"/>
           </a:p>
@@ -18769,7 +18776,7 @@
           <a:p>
             <a:fld id="{6D22F896-40B5-4ADD-8801-0D06FADFA095}" type="slidenum">
               <a:rPr lang="en-US" smtClean="0"/>
-              <a:t>‹#›</a:t>
+              <a:t>‹Nº›</a:t>
             </a:fld>
             <a:endParaRPr lang="en-US" dirty="0"/>
           </a:p>
@@ -19072,7 +19079,7 @@
           <a:p>
             <a:fld id="{6D22F896-40B5-4ADD-8801-0D06FADFA095}" type="slidenum">
               <a:rPr lang="en-US" smtClean="0"/>
-              <a:t>‹#›</a:t>
+              <a:t>‹Nº›</a:t>
             </a:fld>
             <a:endParaRPr lang="en-US" dirty="0"/>
           </a:p>
@@ -19308,7 +19315,7 @@
           <a:p>
             <a:fld id="{6D22F896-40B5-4ADD-8801-0D06FADFA095}" type="slidenum">
               <a:rPr lang="en-US" smtClean="0"/>
-              <a:t>‹#›</a:t>
+              <a:t>‹Nº›</a:t>
             </a:fld>
             <a:endParaRPr lang="en-US" dirty="0"/>
           </a:p>
@@ -19691,7 +19698,7 @@
           <a:p>
             <a:fld id="{6D22F896-40B5-4ADD-8801-0D06FADFA095}" type="slidenum">
               <a:rPr lang="en-US" smtClean="0"/>
-              <a:t>‹#›</a:t>
+              <a:t>‹Nº›</a:t>
             </a:fld>
             <a:endParaRPr lang="en-US" dirty="0"/>
           </a:p>
@@ -19813,7 +19820,7 @@
           <a:p>
             <a:fld id="{6D22F896-40B5-4ADD-8801-0D06FADFA095}" type="slidenum">
               <a:rPr lang="en-US" smtClean="0"/>
-              <a:t>‹#›</a:t>
+              <a:t>‹Nº›</a:t>
             </a:fld>
             <a:endParaRPr lang="en-US" dirty="0"/>
           </a:p>
@@ -19912,7 +19919,7 @@
           <a:p>
             <a:fld id="{6D22F896-40B5-4ADD-8801-0D06FADFA095}" type="slidenum">
               <a:rPr lang="en-US" smtClean="0"/>
-              <a:t>‹#›</a:t>
+              <a:t>‹Nº›</a:t>
             </a:fld>
             <a:endParaRPr lang="en-US" dirty="0"/>
           </a:p>
@@ -20165,7 +20172,7 @@
           <a:p>
             <a:fld id="{6D22F896-40B5-4ADD-8801-0D06FADFA095}" type="slidenum">
               <a:rPr lang="en-US" smtClean="0"/>
-              <a:t>‹#›</a:t>
+              <a:t>‹Nº›</a:t>
             </a:fld>
             <a:endParaRPr lang="en-US" dirty="0"/>
           </a:p>
@@ -20426,7 +20433,7 @@
           <a:p>
             <a:fld id="{6D22F896-40B5-4ADD-8801-0D06FADFA095}" type="slidenum">
               <a:rPr lang="en-US" smtClean="0"/>
-              <a:t>‹#›</a:t>
+              <a:t>‹Nº›</a:t>
             </a:fld>
             <a:endParaRPr lang="en-US" dirty="0"/>
           </a:p>
@@ -20710,7 +20717,7 @@
             <a:fld id="{6D22F896-40B5-4ADD-8801-0D06FADFA095}" type="slidenum">
               <a:rPr lang="en-US" smtClean="0"/>
               <a:pPr/>
-              <a:t>‹#›</a:t>
+              <a:t>‹Nº›</a:t>
             </a:fld>
             <a:endParaRPr lang="en-US" dirty="0"/>
           </a:p>
@@ -22273,7 +22280,22 @@
             <a:pPr algn="ctr"/>
             <a:r>
               <a:rPr lang="en-US" dirty="0"/>
-              <a:t>Etapa de entrada (</a:t>
+              <a:t>Etapa de </a:t>
+            </a:r>
+            <a:r>
+              <a:rPr lang="en-US" dirty="0" err="1"/>
+              <a:t>salida</a:t>
+            </a:r>
+            <a:r>
+              <a:rPr lang="en-US" dirty="0"/>
+              <a:t> </a:t>
+            </a:r>
+          </a:p>
+          <a:p>
+            <a:pPr algn="ctr"/>
+            <a:r>
+              <a:rPr lang="en-US" dirty="0"/>
+              <a:t>(</a:t>
             </a:r>
             <a:r>
               <a:rPr lang="en-US" dirty="0" err="1"/>
@@ -23239,7 +23261,7 @@
             </a:r>
             <a:r>
               <a:rPr lang="en-US" dirty="0" err="1"/>
-              <a:t>amplia</a:t>
+              <a:t>amplio</a:t>
             </a:r>
             <a:r>
               <a:rPr lang="en-US" dirty="0"/>
@@ -24705,10 +24727,13 @@
           <a:lstStyle/>
           <a:p>
             <a:r>
-              <a:rPr lang="en-US" cap="small"/>
-              <a:t>Implementación: Etapa Salida</a:t>
-            </a:r>
-            <a:endParaRPr lang="en-US" cap="small" dirty="0"/>
+              <a:rPr lang="en-US" cap="small" dirty="0" err="1"/>
+              <a:t>Implementación</a:t>
+            </a:r>
+            <a:r>
+              <a:rPr lang="en-US" cap="small" dirty="0"/>
+              <a:t>: Etapa Salida</a:t>
+            </a:r>
           </a:p>
         </p:txBody>
       </p:sp>
@@ -26942,6 +26967,126 @@
           </a:p>
         </p:txBody>
       </p:sp>
+      <p:sp>
+        <p:nvSpPr>
+          <p:cNvPr id="7" name="CuadroTexto 6">
+            <a:extLst>
+              <a:ext uri="{FF2B5EF4-FFF2-40B4-BE49-F238E27FC236}">
+                <a16:creationId xmlns:a16="http://schemas.microsoft.com/office/drawing/2014/main" id="{083806C5-CFE4-44DD-B428-AE9169EDA6FC}"/>
+              </a:ext>
+            </a:extLst>
+          </p:cNvPr>
+          <p:cNvSpPr txBox="1"/>
+          <p:nvPr/>
+        </p:nvSpPr>
+        <p:spPr>
+          <a:xfrm>
+            <a:off x="685800" y="2318994"/>
+            <a:ext cx="5410200" cy="3139321"/>
+          </a:xfrm>
+          <a:prstGeom prst="rect">
+            <a:avLst/>
+          </a:prstGeom>
+          <a:noFill/>
+        </p:spPr>
+        <p:txBody>
+          <a:bodyPr wrap="square" rtlCol="0">
+            <a:spAutoFit/>
+          </a:bodyPr>
+          <a:lstStyle/>
+          <a:p>
+            <a:pPr marL="285750" indent="-285750">
+              <a:buFont typeface="Arial" panose="020B0604020202020204" pitchFamily="34" charset="0"/>
+              <a:buChar char="•"/>
+            </a:pPr>
+            <a:r>
+              <a:rPr lang="es-ES_tradnl" dirty="0"/>
+              <a:t>La señal adquirida mediante el ADC integrado de la tarjeta “Mini-DK2” se somete a diferentes efectos:</a:t>
+            </a:r>
+          </a:p>
+          <a:p>
+            <a:pPr marL="742950" lvl="1" indent="-285750">
+              <a:buFont typeface="Arial" panose="020B0604020202020204" pitchFamily="34" charset="0"/>
+              <a:buChar char="•"/>
+            </a:pPr>
+            <a:r>
+              <a:rPr lang="es-ES_tradnl" b="1" dirty="0" err="1"/>
+              <a:t>Delay</a:t>
+            </a:r>
+            <a:endParaRPr lang="es-ES_tradnl" b="1" dirty="0"/>
+          </a:p>
+          <a:p>
+            <a:pPr marL="742950" lvl="1" indent="-285750">
+              <a:buFont typeface="Arial" panose="020B0604020202020204" pitchFamily="34" charset="0"/>
+              <a:buChar char="•"/>
+            </a:pPr>
+            <a:r>
+              <a:rPr lang="es-ES_tradnl" b="1" dirty="0"/>
+              <a:t>Distorsión</a:t>
+            </a:r>
+          </a:p>
+          <a:p>
+            <a:pPr marL="742950" lvl="1" indent="-285750">
+              <a:buFont typeface="Arial" panose="020B0604020202020204" pitchFamily="34" charset="0"/>
+              <a:buChar char="•"/>
+            </a:pPr>
+            <a:r>
+              <a:rPr lang="es-ES_tradnl" b="1" dirty="0" err="1"/>
+              <a:t>Fuzz</a:t>
+            </a:r>
+            <a:endParaRPr lang="es-ES_tradnl" b="1" dirty="0"/>
+          </a:p>
+          <a:p>
+            <a:pPr marL="742950" lvl="1" indent="-285750">
+              <a:buFont typeface="Arial" panose="020B0604020202020204" pitchFamily="34" charset="0"/>
+              <a:buChar char="•"/>
+            </a:pPr>
+            <a:r>
+              <a:rPr lang="es-ES_tradnl" b="1" dirty="0"/>
+              <a:t>Echo</a:t>
+            </a:r>
+          </a:p>
+          <a:p>
+            <a:pPr marL="742950" lvl="1" indent="-285750">
+              <a:buFont typeface="Arial" panose="020B0604020202020204" pitchFamily="34" charset="0"/>
+              <a:buChar char="•"/>
+            </a:pPr>
+            <a:r>
+              <a:rPr lang="es-ES_tradnl" b="1" dirty="0" err="1"/>
+              <a:t>Reverb</a:t>
+            </a:r>
+            <a:endParaRPr lang="es-ES_tradnl" b="1" dirty="0"/>
+          </a:p>
+          <a:p>
+            <a:pPr marL="742950" lvl="1" indent="-285750">
+              <a:buFont typeface="Arial" panose="020B0604020202020204" pitchFamily="34" charset="0"/>
+              <a:buChar char="•"/>
+            </a:pPr>
+            <a:r>
+              <a:rPr lang="es-ES_tradnl" b="1" dirty="0" err="1"/>
+              <a:t>Octavador</a:t>
+            </a:r>
+            <a:endParaRPr lang="es-ES_tradnl" b="1" dirty="0"/>
+          </a:p>
+          <a:p>
+            <a:pPr marL="742950" lvl="1" indent="-285750">
+              <a:buFont typeface="Arial" panose="020B0604020202020204" pitchFamily="34" charset="0"/>
+              <a:buChar char="•"/>
+            </a:pPr>
+            <a:r>
+              <a:rPr lang="es-ES_tradnl" b="1" dirty="0"/>
+              <a:t>Trémolo</a:t>
+            </a:r>
+          </a:p>
+          <a:p>
+            <a:pPr marL="742950" lvl="1" indent="-285750">
+              <a:buFont typeface="Arial" panose="020B0604020202020204" pitchFamily="34" charset="0"/>
+              <a:buChar char="•"/>
+            </a:pPr>
+            <a:endParaRPr lang="es-ES_tradnl" dirty="0"/>
+          </a:p>
+        </p:txBody>
+      </p:sp>
     </p:spTree>
     <p:extLst>
       <p:ext uri="{BB962C8B-B14F-4D97-AF65-F5344CB8AC3E}">
@@ -27000,9 +27145,12 @@
           <a:p>
             <a:r>
               <a:rPr lang="en-US" cap="small" dirty="0" err="1"/>
-              <a:t>Problemas</a:t>
-            </a:r>
-            <a:endParaRPr lang="en-US" cap="small" dirty="0"/>
+              <a:t>Implementación</a:t>
+            </a:r>
+            <a:r>
+              <a:rPr lang="en-US" cap="small" dirty="0"/>
+              <a:t>: Delay</a:t>
+            </a:r>
           </a:p>
         </p:txBody>
       </p:sp>
@@ -27093,10 +27241,144 @@
           </a:p>
         </p:txBody>
       </p:sp>
+      <p:sp>
+        <p:nvSpPr>
+          <p:cNvPr id="7" name="CuadroTexto 6">
+            <a:extLst>
+              <a:ext uri="{FF2B5EF4-FFF2-40B4-BE49-F238E27FC236}">
+                <a16:creationId xmlns:a16="http://schemas.microsoft.com/office/drawing/2014/main" id="{083806C5-CFE4-44DD-B428-AE9169EDA6FC}"/>
+              </a:ext>
+            </a:extLst>
+          </p:cNvPr>
+          <p:cNvSpPr txBox="1"/>
+          <p:nvPr/>
+        </p:nvSpPr>
+        <p:spPr>
+          <a:xfrm>
+            <a:off x="685800" y="2318994"/>
+            <a:ext cx="5410200" cy="2585323"/>
+          </a:xfrm>
+          <a:prstGeom prst="rect">
+            <a:avLst/>
+          </a:prstGeom>
+          <a:noFill/>
+        </p:spPr>
+        <p:txBody>
+          <a:bodyPr wrap="square" rtlCol="0">
+            <a:spAutoFit/>
+          </a:bodyPr>
+          <a:lstStyle/>
+          <a:p>
+            <a:pPr marL="742950" lvl="1" indent="-285750">
+              <a:buFont typeface="Arial" panose="020B0604020202020204" pitchFamily="34" charset="0"/>
+              <a:buChar char="•"/>
+            </a:pPr>
+            <a:r>
+              <a:rPr lang="es-ES_tradnl" dirty="0"/>
+              <a:t>El efecto de </a:t>
+            </a:r>
+            <a:r>
+              <a:rPr lang="es-ES_tradnl" dirty="0" err="1"/>
+              <a:t>Delay</a:t>
+            </a:r>
+            <a:r>
+              <a:rPr lang="es-ES_tradnl" dirty="0"/>
+              <a:t> se obtiene generando una salida de audio en la cual aparezcan las muestras actuales de entrada mezcladas con muestras anteriores atenuadas.</a:t>
+            </a:r>
+          </a:p>
+          <a:p>
+            <a:pPr marL="742950" lvl="1" indent="-285750">
+              <a:buFont typeface="Arial" panose="020B0604020202020204" pitchFamily="34" charset="0"/>
+              <a:buChar char="•"/>
+            </a:pPr>
+            <a:endParaRPr lang="es-ES_tradnl" dirty="0"/>
+          </a:p>
+          <a:p>
+            <a:pPr marL="742950" lvl="1" indent="-285750">
+              <a:buFont typeface="Arial" panose="020B0604020202020204" pitchFamily="34" charset="0"/>
+              <a:buChar char="•"/>
+            </a:pPr>
+            <a:r>
+              <a:rPr lang="es-ES_tradnl" b="1" dirty="0"/>
+              <a:t>Buffer muestras</a:t>
+            </a:r>
+            <a:r>
+              <a:rPr lang="es-ES_tradnl" dirty="0"/>
+              <a:t>: 18384.</a:t>
+            </a:r>
+          </a:p>
+          <a:p>
+            <a:pPr marL="742950" lvl="1" indent="-285750">
+              <a:buFont typeface="Arial" panose="020B0604020202020204" pitchFamily="34" charset="0"/>
+              <a:buChar char="•"/>
+            </a:pPr>
+            <a:r>
+              <a:rPr lang="es-ES_tradnl" b="1" dirty="0"/>
+              <a:t>Frecuencia muestreo ADC: </a:t>
+            </a:r>
+            <a:r>
+              <a:rPr lang="es-ES_tradnl" dirty="0"/>
+              <a:t>25KHz.</a:t>
+            </a:r>
+          </a:p>
+          <a:p>
+            <a:pPr marL="742950" lvl="1" indent="-285750">
+              <a:buFont typeface="Arial" panose="020B0604020202020204" pitchFamily="34" charset="0"/>
+              <a:buChar char="•"/>
+            </a:pPr>
+            <a:r>
+              <a:rPr lang="es-ES_tradnl" b="1" dirty="0"/>
+              <a:t>Tiempo </a:t>
+            </a:r>
+            <a:r>
+              <a:rPr lang="es-ES_tradnl" b="1" dirty="0" err="1"/>
+              <a:t>Delay</a:t>
+            </a:r>
+            <a:r>
+              <a:rPr lang="es-ES_tradnl" b="1" dirty="0"/>
+              <a:t>: </a:t>
+            </a:r>
+            <a:r>
+              <a:rPr lang="es-ES_tradnl" dirty="0"/>
+              <a:t>0,5 s aproximadamente.</a:t>
+            </a:r>
+          </a:p>
+        </p:txBody>
+      </p:sp>
+      <p:pic>
+        <p:nvPicPr>
+          <p:cNvPr id="13" name="Imagen 12">
+            <a:extLst>
+              <a:ext uri="{FF2B5EF4-FFF2-40B4-BE49-F238E27FC236}">
+                <a16:creationId xmlns:a16="http://schemas.microsoft.com/office/drawing/2014/main" id="{55203421-A6E0-43E2-BA30-96D9C1E41454}"/>
+              </a:ext>
+            </a:extLst>
+          </p:cNvPr>
+          <p:cNvPicPr>
+            <a:picLocks noChangeAspect="1"/>
+          </p:cNvPicPr>
+          <p:nvPr/>
+        </p:nvPicPr>
+        <p:blipFill>
+          <a:blip r:embed="rId2"/>
+          <a:stretch>
+            <a:fillRect/>
+          </a:stretch>
+        </p:blipFill>
+        <p:spPr>
+          <a:xfrm>
+            <a:off x="6171413" y="2475395"/>
+            <a:ext cx="5848651" cy="1441524"/>
+          </a:xfrm>
+          <a:prstGeom prst="rect">
+            <a:avLst/>
+          </a:prstGeom>
+        </p:spPr>
+      </p:pic>
     </p:spTree>
     <p:extLst>
       <p:ext uri="{BB962C8B-B14F-4D97-AF65-F5344CB8AC3E}">
-        <p14:creationId xmlns:p14="http://schemas.microsoft.com/office/powerpoint/2010/main" val="2862553281"/>
+        <p14:creationId xmlns:p14="http://schemas.microsoft.com/office/powerpoint/2010/main" val="3818750894"/>
       </p:ext>
     </p:extLst>
   </p:cSld>
@@ -27109,14 +27391,6 @@
 <file path=ppt/slides/slide18.xml><?xml version="1.0" encoding="utf-8"?>
 <p:sld xmlns:a="http://schemas.openxmlformats.org/drawingml/2006/main" xmlns:r="http://schemas.openxmlformats.org/officeDocument/2006/relationships" xmlns:p="http://schemas.openxmlformats.org/presentationml/2006/main">
   <p:cSld>
-    <p:bg>
-      <p:bgPr>
-        <a:solidFill>
-          <a:schemeClr val="bg1"/>
-        </a:solidFill>
-        <a:effectLst/>
-      </p:bgPr>
-    </p:bg>
     <p:spTree>
       <p:nvGrpSpPr>
         <p:cNvPr id="1" name=""/>
@@ -27136,7 +27410,7 @@
           <p:cNvPr id="2" name="Title 1">
             <a:extLst>
               <a:ext uri="{FF2B5EF4-FFF2-40B4-BE49-F238E27FC236}">
-                <a16:creationId xmlns:a16="http://schemas.microsoft.com/office/drawing/2014/main" id="{D0DC89B9-017F-4218-B751-60CBACED24EF}"/>
+                <a16:creationId xmlns:a16="http://schemas.microsoft.com/office/drawing/2014/main" id="{A8D9B15F-243A-46AB-8E11-D0C0441C7E7A}"/>
               </a:ext>
             </a:extLst>
           </p:cNvPr>
@@ -27149,19 +27423,25 @@
         </p:nvSpPr>
         <p:spPr>
           <a:xfrm>
-            <a:off x="9756396" y="764373"/>
-            <a:ext cx="1749804" cy="1293028"/>
+            <a:off x="2541864" y="764373"/>
+            <a:ext cx="8964336" cy="1293028"/>
           </a:xfrm>
         </p:spPr>
         <p:txBody>
-          <a:bodyPr vert="horz" lIns="91440" tIns="45720" rIns="91440" bIns="45720" rtlCol="0" anchor="ctr">
-            <a:normAutofit/>
-          </a:bodyPr>
+          <a:bodyPr/>
           <a:lstStyle/>
           <a:p>
             <a:r>
               <a:rPr lang="en-US" cap="small" dirty="0" err="1"/>
-              <a:t>Índice</a:t>
+              <a:t>Implementación</a:t>
+            </a:r>
+            <a:r>
+              <a:rPr lang="en-US" cap="small" dirty="0"/>
+              <a:t>: </a:t>
+            </a:r>
+            <a:r>
+              <a:rPr lang="en-US" cap="small" dirty="0" err="1"/>
+              <a:t>Distorsión</a:t>
             </a:r>
             <a:endParaRPr lang="en-US" cap="small" dirty="0"/>
           </a:p>
@@ -27172,7 +27452,7 @@
           <p:cNvPr id="3" name="Date Placeholder 2">
             <a:extLst>
               <a:ext uri="{FF2B5EF4-FFF2-40B4-BE49-F238E27FC236}">
-                <a16:creationId xmlns:a16="http://schemas.microsoft.com/office/drawing/2014/main" id="{56AB03D1-EEAA-457D-B1FB-120BAB38CC01}"/>
+                <a16:creationId xmlns:a16="http://schemas.microsoft.com/office/drawing/2014/main" id="{A290E9DE-389C-4E44-B46B-D764E57D5027}"/>
               </a:ext>
             </a:extLst>
           </p:cNvPr>
@@ -27185,105 +27465,23 @@
         </p:nvSpPr>
         <p:spPr/>
         <p:txBody>
-          <a:bodyPr vert="horz" lIns="91440" tIns="45720" rIns="91440" bIns="45720" rtlCol="0" anchor="ctr">
-            <a:normAutofit/>
-          </a:bodyPr>
+          <a:bodyPr/>
           <a:lstStyle/>
           <a:p>
-            <a:pPr>
-              <a:spcAft>
-                <a:spcPts val="600"/>
-              </a:spcAft>
-            </a:pPr>
-            <a:fld id="{3DF178BE-18F7-4553-B706-7570B1EAB4FB}" type="datetime1">
-              <a:rPr lang="es-ES" smtClean="0">
-                <a:solidFill>
-                  <a:schemeClr val="tx1"/>
-                </a:solidFill>
-              </a:rPr>
+            <a:fld id="{E0855CDD-93BC-47DE-BEFF-59319602E3E3}" type="datetime1">
+              <a:rPr lang="es-ES" smtClean="0"/>
               <a:t>27/01/2018</a:t>
             </a:fld>
-            <a:endParaRPr lang="en-US">
-              <a:solidFill>
-                <a:schemeClr val="tx1"/>
-              </a:solidFill>
-            </a:endParaRPr>
+            <a:endParaRPr lang="en-US" dirty="0"/>
           </a:p>
         </p:txBody>
       </p:sp>
       <p:sp>
         <p:nvSpPr>
-          <p:cNvPr id="4" name="Slide Number Placeholder 3">
+          <p:cNvPr id="4" name="Footer Placeholder 3">
             <a:extLst>
               <a:ext uri="{FF2B5EF4-FFF2-40B4-BE49-F238E27FC236}">
-                <a16:creationId xmlns:a16="http://schemas.microsoft.com/office/drawing/2014/main" id="{F709A17A-628C-4240-882E-90DE1270E6B9}"/>
-              </a:ext>
-            </a:extLst>
-          </p:cNvPr>
-          <p:cNvSpPr>
-            <a:spLocks noGrp="1"/>
-          </p:cNvSpPr>
-          <p:nvPr>
-            <p:ph type="sldNum" sz="quarter" idx="12"/>
-          </p:nvPr>
-        </p:nvSpPr>
-        <p:spPr/>
-        <p:txBody>
-          <a:bodyPr vert="horz" lIns="91440" tIns="45720" rIns="91440" bIns="45720" rtlCol="0" anchor="ctr">
-            <a:normAutofit/>
-          </a:bodyPr>
-          <a:lstStyle/>
-          <a:p>
-            <a:pPr>
-              <a:spcAft>
-                <a:spcPts val="600"/>
-              </a:spcAft>
-            </a:pPr>
-            <a:fld id="{6D22F896-40B5-4ADD-8801-0D06FADFA095}" type="slidenum">
-              <a:rPr lang="en-US">
-                <a:solidFill>
-                  <a:schemeClr val="bg1"/>
-                </a:solidFill>
-              </a:rPr>
-              <a:pPr>
-                <a:spcAft>
-                  <a:spcPts val="600"/>
-                </a:spcAft>
-              </a:pPr>
-              <a:t>18</a:t>
-            </a:fld>
-            <a:endParaRPr lang="en-US">
-              <a:solidFill>
-                <a:schemeClr val="bg1"/>
-              </a:solidFill>
-            </a:endParaRPr>
-          </a:p>
-        </p:txBody>
-      </p:sp>
-      <p:graphicFrame>
-        <p:nvGraphicFramePr>
-          <p:cNvPr id="26" name="TextBox 4"/>
-          <p:cNvGraphicFramePr/>
-          <p:nvPr>
-            <p:extLst/>
-          </p:nvPr>
-        </p:nvGraphicFramePr>
-        <p:xfrm>
-          <a:off x="685800" y="2878138"/>
-          <a:ext cx="10820400" cy="3340100"/>
-        </p:xfrm>
-        <a:graphic>
-          <a:graphicData uri="http://schemas.openxmlformats.org/drawingml/2006/diagram">
-            <dgm:relIds xmlns:dgm="http://schemas.openxmlformats.org/drawingml/2006/diagram" xmlns:r="http://schemas.openxmlformats.org/officeDocument/2006/relationships" r:dm="rId2" r:lo="rId3" r:qs="rId4" r:cs="rId5"/>
-          </a:graphicData>
-        </a:graphic>
-      </p:graphicFrame>
-      <p:sp>
-        <p:nvSpPr>
-          <p:cNvPr id="6" name="Footer Placeholder 5">
-            <a:extLst>
-              <a:ext uri="{FF2B5EF4-FFF2-40B4-BE49-F238E27FC236}">
-                <a16:creationId xmlns:a16="http://schemas.microsoft.com/office/drawing/2014/main" id="{0C54900B-D65B-44F0-8D87-996C8332FBC5}"/>
+                <a16:creationId xmlns:a16="http://schemas.microsoft.com/office/drawing/2014/main" id="{5CB136F4-308C-4782-813D-6F33D34037A5}"/>
               </a:ext>
             </a:extLst>
           </p:cNvPr>
@@ -27309,322 +27507,151 @@
       </p:sp>
       <p:sp>
         <p:nvSpPr>
-          <p:cNvPr id="8" name="Circle: Hollow 7">
+          <p:cNvPr id="5" name="Slide Number Placeholder 4">
             <a:extLst>
               <a:ext uri="{FF2B5EF4-FFF2-40B4-BE49-F238E27FC236}">
-                <a16:creationId xmlns:a16="http://schemas.microsoft.com/office/drawing/2014/main" id="{9E342BC0-F57E-4E9C-9D4F-B40382A60493}"/>
+                <a16:creationId xmlns:a16="http://schemas.microsoft.com/office/drawing/2014/main" id="{96F3F281-ECE4-45D9-88BB-CF25F86AED26}"/>
               </a:ext>
             </a:extLst>
           </p:cNvPr>
-          <p:cNvSpPr/>
+          <p:cNvSpPr>
+            <a:spLocks noGrp="1"/>
+          </p:cNvSpPr>
+          <p:nvPr>
+            <p:ph type="sldNum" sz="quarter" idx="12"/>
+          </p:nvPr>
+        </p:nvSpPr>
+        <p:spPr/>
+        <p:txBody>
+          <a:bodyPr/>
+          <a:lstStyle/>
+          <a:p>
+            <a:fld id="{6D22F896-40B5-4ADD-8801-0D06FADFA095}" type="slidenum">
+              <a:rPr lang="en-US" smtClean="0"/>
+              <a:t>18</a:t>
+            </a:fld>
+            <a:endParaRPr lang="en-US" dirty="0"/>
+          </a:p>
+        </p:txBody>
+      </p:sp>
+      <p:sp>
+        <p:nvSpPr>
+          <p:cNvPr id="7" name="CuadroTexto 6">
+            <a:extLst>
+              <a:ext uri="{FF2B5EF4-FFF2-40B4-BE49-F238E27FC236}">
+                <a16:creationId xmlns:a16="http://schemas.microsoft.com/office/drawing/2014/main" id="{083806C5-CFE4-44DD-B428-AE9169EDA6FC}"/>
+              </a:ext>
+            </a:extLst>
+          </p:cNvPr>
+          <p:cNvSpPr txBox="1"/>
           <p:nvPr/>
         </p:nvSpPr>
         <p:spPr>
           <a:xfrm>
-            <a:off x="260059" y="3395838"/>
-            <a:ext cx="268448" cy="264559"/>
+            <a:off x="685800" y="2318994"/>
+            <a:ext cx="5410200" cy="2862322"/>
           </a:xfrm>
-          <a:prstGeom prst="donut">
+          <a:prstGeom prst="rect">
+            <a:avLst/>
+          </a:prstGeom>
+          <a:noFill/>
+        </p:spPr>
+        <p:txBody>
+          <a:bodyPr wrap="square" rtlCol="0">
+            <a:spAutoFit/>
+          </a:bodyPr>
+          <a:lstStyle/>
+          <a:p>
+            <a:pPr marL="742950" lvl="1" indent="-285750">
+              <a:buFont typeface="Arial" panose="020B0604020202020204" pitchFamily="34" charset="0"/>
+              <a:buChar char="•"/>
+            </a:pPr>
+            <a:r>
+              <a:rPr lang="es-ES_tradnl" dirty="0"/>
+              <a:t>El efecto de Distorsión consiste en alterar de diferente manera las componentes de audio, cambiando su amplitud, fase o frecuencia.</a:t>
+            </a:r>
+          </a:p>
+          <a:p>
+            <a:pPr marL="742950" lvl="1" indent="-285750">
+              <a:buFont typeface="Arial" panose="020B0604020202020204" pitchFamily="34" charset="0"/>
+              <a:buChar char="•"/>
+            </a:pPr>
+            <a:endParaRPr lang="es-ES_tradnl" dirty="0"/>
+          </a:p>
+          <a:p>
+            <a:pPr marL="742950" lvl="1" indent="-285750">
+              <a:buFont typeface="Arial" panose="020B0604020202020204" pitchFamily="34" charset="0"/>
+              <a:buChar char="•"/>
+            </a:pPr>
+            <a:r>
+              <a:rPr lang="es-ES_tradnl" b="1" dirty="0"/>
+              <a:t>Amplitud máxima: </a:t>
+            </a:r>
+            <a:r>
+              <a:rPr lang="es-ES_tradnl" dirty="0"/>
+              <a:t>4095 debido a los 12 bits del ADC.</a:t>
+            </a:r>
+          </a:p>
+          <a:p>
+            <a:pPr lvl="1"/>
+            <a:endParaRPr lang="es-ES_tradnl" b="1" dirty="0"/>
+          </a:p>
+          <a:p>
+            <a:pPr marL="742950" lvl="1" indent="-285750">
+              <a:buFont typeface="Arial" panose="020B0604020202020204" pitchFamily="34" charset="0"/>
+              <a:buChar char="•"/>
+            </a:pPr>
+            <a:endParaRPr lang="es-ES_tradnl" dirty="0"/>
+          </a:p>
+          <a:p>
+            <a:pPr marL="742950" lvl="1" indent="-285750">
+              <a:buFont typeface="Arial" panose="020B0604020202020204" pitchFamily="34" charset="0"/>
+              <a:buChar char="•"/>
+            </a:pPr>
+            <a:endParaRPr lang="es-ES_tradnl" dirty="0"/>
+          </a:p>
+        </p:txBody>
+      </p:sp>
+      <p:pic>
+        <p:nvPicPr>
+          <p:cNvPr id="8" name="Imagen 7">
+            <a:extLst>
+              <a:ext uri="{FF2B5EF4-FFF2-40B4-BE49-F238E27FC236}">
+                <a16:creationId xmlns:a16="http://schemas.microsoft.com/office/drawing/2014/main" id="{BF097B51-E004-4E21-B592-BE9F7AB50DE6}"/>
+              </a:ext>
+            </a:extLst>
+          </p:cNvPr>
+          <p:cNvPicPr>
+            <a:picLocks noChangeAspect="1"/>
+          </p:cNvPicPr>
+          <p:nvPr/>
+        </p:nvPicPr>
+        <p:blipFill>
+          <a:blip r:embed="rId2"/>
+          <a:stretch>
+            <a:fillRect/>
+          </a:stretch>
+        </p:blipFill>
+        <p:spPr>
+          <a:xfrm>
+            <a:off x="6595621" y="2318994"/>
+            <a:ext cx="5013797" cy="1756348"/>
+          </a:xfrm>
+          <a:prstGeom prst="rect">
             <a:avLst/>
           </a:prstGeom>
         </p:spPr>
-        <p:style>
-          <a:lnRef idx="2">
-            <a:schemeClr val="accent1">
-              <a:shade val="50000"/>
-            </a:schemeClr>
-          </a:lnRef>
-          <a:fillRef idx="1">
-            <a:schemeClr val="accent1"/>
-          </a:fillRef>
-          <a:effectRef idx="0">
-            <a:schemeClr val="accent1"/>
-          </a:effectRef>
-          <a:fontRef idx="minor">
-            <a:schemeClr val="lt1"/>
-          </a:fontRef>
-        </p:style>
-        <p:txBody>
-          <a:bodyPr rtlCol="0" anchor="ctr"/>
-          <a:lstStyle/>
-          <a:p>
-            <a:pPr algn="ctr"/>
-            <a:endParaRPr lang="en-US">
-              <a:solidFill>
-                <a:schemeClr val="tx1"/>
-              </a:solidFill>
-            </a:endParaRPr>
-          </a:p>
-        </p:txBody>
-      </p:sp>
-      <p:sp>
-        <p:nvSpPr>
-          <p:cNvPr id="11" name="Arrow: Left 10">
-            <a:extLst>
-              <a:ext uri="{FF2B5EF4-FFF2-40B4-BE49-F238E27FC236}">
-                <a16:creationId xmlns:a16="http://schemas.microsoft.com/office/drawing/2014/main" id="{ACF7D011-AD33-4AC2-9BE7-C51194B3E87D}"/>
-              </a:ext>
-            </a:extLst>
-          </p:cNvPr>
-          <p:cNvSpPr/>
-          <p:nvPr/>
-        </p:nvSpPr>
-        <p:spPr>
-          <a:xfrm rot="10800000">
-            <a:off x="216017" y="5061347"/>
-            <a:ext cx="347095" cy="298248"/>
-          </a:xfrm>
-          <a:prstGeom prst="leftArrow">
-            <a:avLst/>
-          </a:prstGeom>
-        </p:spPr>
-        <p:style>
-          <a:lnRef idx="2">
-            <a:schemeClr val="accent1">
-              <a:shade val="50000"/>
-            </a:schemeClr>
-          </a:lnRef>
-          <a:fillRef idx="1">
-            <a:schemeClr val="accent1"/>
-          </a:fillRef>
-          <a:effectRef idx="0">
-            <a:schemeClr val="accent1"/>
-          </a:effectRef>
-          <a:fontRef idx="minor">
-            <a:schemeClr val="lt1"/>
-          </a:fontRef>
-        </p:style>
-        <p:txBody>
-          <a:bodyPr rtlCol="0" anchor="ctr"/>
-          <a:lstStyle/>
-          <a:p>
-            <a:pPr algn="ctr"/>
-            <a:endParaRPr lang="en-US"/>
-          </a:p>
-        </p:txBody>
-      </p:sp>
-      <p:sp>
-        <p:nvSpPr>
-          <p:cNvPr id="13" name="Circle: Hollow 12">
-            <a:extLst>
-              <a:ext uri="{FF2B5EF4-FFF2-40B4-BE49-F238E27FC236}">
-                <a16:creationId xmlns:a16="http://schemas.microsoft.com/office/drawing/2014/main" id="{0B1FBAC1-451B-4037-9390-24D6B4F283C7}"/>
-              </a:ext>
-            </a:extLst>
-          </p:cNvPr>
-          <p:cNvSpPr/>
-          <p:nvPr/>
-        </p:nvSpPr>
-        <p:spPr>
-          <a:xfrm>
-            <a:off x="260059" y="2990922"/>
-            <a:ext cx="268448" cy="264559"/>
-          </a:xfrm>
-          <a:prstGeom prst="donut">
-            <a:avLst/>
-          </a:prstGeom>
-        </p:spPr>
-        <p:style>
-          <a:lnRef idx="2">
-            <a:schemeClr val="accent1">
-              <a:shade val="50000"/>
-            </a:schemeClr>
-          </a:lnRef>
-          <a:fillRef idx="1">
-            <a:schemeClr val="accent1"/>
-          </a:fillRef>
-          <a:effectRef idx="0">
-            <a:schemeClr val="accent1"/>
-          </a:effectRef>
-          <a:fontRef idx="minor">
-            <a:schemeClr val="lt1"/>
-          </a:fontRef>
-        </p:style>
-        <p:txBody>
-          <a:bodyPr rtlCol="0" anchor="ctr"/>
-          <a:lstStyle/>
-          <a:p>
-            <a:pPr algn="ctr"/>
-            <a:endParaRPr lang="en-US">
-              <a:solidFill>
-                <a:schemeClr val="tx1"/>
-              </a:solidFill>
-            </a:endParaRPr>
-          </a:p>
-        </p:txBody>
-      </p:sp>
-      <p:sp>
-        <p:nvSpPr>
-          <p:cNvPr id="14" name="Circle: Hollow 13">
-            <a:extLst>
-              <a:ext uri="{FF2B5EF4-FFF2-40B4-BE49-F238E27FC236}">
-                <a16:creationId xmlns:a16="http://schemas.microsoft.com/office/drawing/2014/main" id="{0DA1F402-EFB8-4F6F-A272-99DFBF96B5CA}"/>
-              </a:ext>
-            </a:extLst>
-          </p:cNvPr>
-          <p:cNvSpPr/>
-          <p:nvPr/>
-        </p:nvSpPr>
-        <p:spPr>
-          <a:xfrm>
-            <a:off x="255341" y="3800754"/>
-            <a:ext cx="268448" cy="264559"/>
-          </a:xfrm>
-          <a:prstGeom prst="donut">
-            <a:avLst/>
-          </a:prstGeom>
-        </p:spPr>
-        <p:style>
-          <a:lnRef idx="2">
-            <a:schemeClr val="accent1">
-              <a:shade val="50000"/>
-            </a:schemeClr>
-          </a:lnRef>
-          <a:fillRef idx="1">
-            <a:schemeClr val="accent1"/>
-          </a:fillRef>
-          <a:effectRef idx="0">
-            <a:schemeClr val="accent1"/>
-          </a:effectRef>
-          <a:fontRef idx="minor">
-            <a:schemeClr val="lt1"/>
-          </a:fontRef>
-        </p:style>
-        <p:txBody>
-          <a:bodyPr rtlCol="0" anchor="ctr"/>
-          <a:lstStyle/>
-          <a:p>
-            <a:pPr algn="ctr"/>
-            <a:endParaRPr lang="en-US">
-              <a:solidFill>
-                <a:schemeClr val="tx1"/>
-              </a:solidFill>
-            </a:endParaRPr>
-          </a:p>
-        </p:txBody>
-      </p:sp>
-      <p:sp>
-        <p:nvSpPr>
-          <p:cNvPr id="12" name="Circle: Hollow 11">
-            <a:extLst>
-              <a:ext uri="{FF2B5EF4-FFF2-40B4-BE49-F238E27FC236}">
-                <a16:creationId xmlns:a16="http://schemas.microsoft.com/office/drawing/2014/main" id="{4FA5F234-5468-4C3A-8E71-F2670898C5E7}"/>
-              </a:ext>
-            </a:extLst>
-          </p:cNvPr>
-          <p:cNvSpPr/>
-          <p:nvPr/>
-        </p:nvSpPr>
-        <p:spPr>
-          <a:xfrm>
-            <a:off x="255341" y="4229948"/>
-            <a:ext cx="268448" cy="264559"/>
-          </a:xfrm>
-          <a:prstGeom prst="donut">
-            <a:avLst/>
-          </a:prstGeom>
-        </p:spPr>
-        <p:style>
-          <a:lnRef idx="2">
-            <a:schemeClr val="accent1">
-              <a:shade val="50000"/>
-            </a:schemeClr>
-          </a:lnRef>
-          <a:fillRef idx="1">
-            <a:schemeClr val="accent1"/>
-          </a:fillRef>
-          <a:effectRef idx="0">
-            <a:schemeClr val="accent1"/>
-          </a:effectRef>
-          <a:fontRef idx="minor">
-            <a:schemeClr val="lt1"/>
-          </a:fontRef>
-        </p:style>
-        <p:txBody>
-          <a:bodyPr rtlCol="0" anchor="ctr"/>
-          <a:lstStyle/>
-          <a:p>
-            <a:pPr algn="ctr"/>
-            <a:endParaRPr lang="en-US">
-              <a:solidFill>
-                <a:schemeClr val="tx1"/>
-              </a:solidFill>
-            </a:endParaRPr>
-          </a:p>
-        </p:txBody>
-      </p:sp>
-      <p:sp>
-        <p:nvSpPr>
-          <p:cNvPr id="15" name="Circle: Hollow 14">
-            <a:extLst>
-              <a:ext uri="{FF2B5EF4-FFF2-40B4-BE49-F238E27FC236}">
-                <a16:creationId xmlns:a16="http://schemas.microsoft.com/office/drawing/2014/main" id="{3924E664-9BF3-448A-9E80-CCA8F76F1B8C}"/>
-              </a:ext>
-            </a:extLst>
-          </p:cNvPr>
-          <p:cNvSpPr/>
-          <p:nvPr/>
-        </p:nvSpPr>
-        <p:spPr>
-          <a:xfrm>
-            <a:off x="255341" y="4632153"/>
-            <a:ext cx="268448" cy="264559"/>
-          </a:xfrm>
-          <a:prstGeom prst="donut">
-            <a:avLst/>
-          </a:prstGeom>
-        </p:spPr>
-        <p:style>
-          <a:lnRef idx="2">
-            <a:schemeClr val="accent1">
-              <a:shade val="50000"/>
-            </a:schemeClr>
-          </a:lnRef>
-          <a:fillRef idx="1">
-            <a:schemeClr val="accent1"/>
-          </a:fillRef>
-          <a:effectRef idx="0">
-            <a:schemeClr val="accent1"/>
-          </a:effectRef>
-          <a:fontRef idx="minor">
-            <a:schemeClr val="lt1"/>
-          </a:fontRef>
-        </p:style>
-        <p:txBody>
-          <a:bodyPr rtlCol="0" anchor="ctr"/>
-          <a:lstStyle/>
-          <a:p>
-            <a:pPr algn="ctr"/>
-            <a:endParaRPr lang="en-US">
-              <a:solidFill>
-                <a:schemeClr val="tx1"/>
-              </a:solidFill>
-            </a:endParaRPr>
-          </a:p>
-        </p:txBody>
-      </p:sp>
+      </p:pic>
     </p:spTree>
     <p:extLst>
       <p:ext uri="{BB962C8B-B14F-4D97-AF65-F5344CB8AC3E}">
-        <p14:creationId xmlns:p14="http://schemas.microsoft.com/office/powerpoint/2010/main" val="1278696046"/>
+        <p14:creationId xmlns:p14="http://schemas.microsoft.com/office/powerpoint/2010/main" val="407052417"/>
       </p:ext>
     </p:extLst>
   </p:cSld>
   <p:clrMapOvr>
     <a:masterClrMapping/>
   </p:clrMapOvr>
-  <mc:AlternateContent xmlns:mc="http://schemas.openxmlformats.org/markup-compatibility/2006">
-    <mc:Choice xmlns:p14="http://schemas.microsoft.com/office/powerpoint/2010/main" Requires="p14">
-      <p:transition spd="med" p14:dur="700">
-        <p:fade/>
-      </p:transition>
-    </mc:Choice>
-    <mc:Fallback>
-      <p:transition spd="med">
-        <p:fade/>
-      </p:transition>
-    </mc:Fallback>
-  </mc:AlternateContent>
 </p:sld>
 </file>
 
@@ -27673,9 +27700,12 @@
           <a:p>
             <a:r>
               <a:rPr lang="en-US" cap="small" dirty="0" err="1"/>
-              <a:t>Mejoras</a:t>
-            </a:r>
-            <a:endParaRPr lang="en-US" cap="small" dirty="0"/>
+              <a:t>Implementación</a:t>
+            </a:r>
+            <a:r>
+              <a:rPr lang="en-US" cap="small" dirty="0"/>
+              <a:t>: Fuzz</a:t>
+            </a:r>
           </a:p>
         </p:txBody>
       </p:sp>
@@ -27766,10 +27796,115 @@
           </a:p>
         </p:txBody>
       </p:sp>
+      <p:sp>
+        <p:nvSpPr>
+          <p:cNvPr id="7" name="CuadroTexto 6">
+            <a:extLst>
+              <a:ext uri="{FF2B5EF4-FFF2-40B4-BE49-F238E27FC236}">
+                <a16:creationId xmlns:a16="http://schemas.microsoft.com/office/drawing/2014/main" id="{083806C5-CFE4-44DD-B428-AE9169EDA6FC}"/>
+              </a:ext>
+            </a:extLst>
+          </p:cNvPr>
+          <p:cNvSpPr txBox="1"/>
+          <p:nvPr/>
+        </p:nvSpPr>
+        <p:spPr>
+          <a:xfrm>
+            <a:off x="685800" y="2318994"/>
+            <a:ext cx="5410200" cy="2862322"/>
+          </a:xfrm>
+          <a:prstGeom prst="rect">
+            <a:avLst/>
+          </a:prstGeom>
+          <a:noFill/>
+        </p:spPr>
+        <p:txBody>
+          <a:bodyPr wrap="square" rtlCol="0">
+            <a:spAutoFit/>
+          </a:bodyPr>
+          <a:lstStyle/>
+          <a:p>
+            <a:pPr marL="742950" lvl="1" indent="-285750">
+              <a:buFont typeface="Arial" panose="020B0604020202020204" pitchFamily="34" charset="0"/>
+              <a:buChar char="•"/>
+            </a:pPr>
+            <a:r>
+              <a:rPr lang="es-ES_tradnl" dirty="0"/>
+              <a:t>El efecto de </a:t>
+            </a:r>
+            <a:r>
+              <a:rPr lang="es-ES_tradnl" dirty="0" err="1"/>
+              <a:t>Fuzz</a:t>
+            </a:r>
+            <a:r>
+              <a:rPr lang="es-ES_tradnl" dirty="0"/>
+              <a:t> consiste en distorsionar las componentes de audio de tal manera que si su amplitud supera un umbral se amplifica a su máxima amplitud y en caso de estar por debajo del umbral su amplitud se hace 0.</a:t>
+            </a:r>
+          </a:p>
+          <a:p>
+            <a:pPr marL="742950" lvl="1" indent="-285750">
+              <a:buFont typeface="Arial" panose="020B0604020202020204" pitchFamily="34" charset="0"/>
+              <a:buChar char="•"/>
+            </a:pPr>
+            <a:endParaRPr lang="es-ES_tradnl" dirty="0"/>
+          </a:p>
+          <a:p>
+            <a:pPr marL="742950" lvl="1" indent="-285750">
+              <a:buFont typeface="Arial" panose="020B0604020202020204" pitchFamily="34" charset="0"/>
+              <a:buChar char="•"/>
+            </a:pPr>
+            <a:r>
+              <a:rPr lang="es-ES_tradnl" b="1" dirty="0"/>
+              <a:t>Amplitud máxima: </a:t>
+            </a:r>
+            <a:r>
+              <a:rPr lang="es-ES_tradnl" dirty="0"/>
+              <a:t>4095 debido a los 12 bits del ADC.</a:t>
+            </a:r>
+          </a:p>
+          <a:p>
+            <a:pPr marL="742950" lvl="1" indent="-285750">
+              <a:buFont typeface="Arial" panose="020B0604020202020204" pitchFamily="34" charset="0"/>
+              <a:buChar char="•"/>
+            </a:pPr>
+            <a:endParaRPr lang="es-ES_tradnl" dirty="0"/>
+          </a:p>
+        </p:txBody>
+      </p:sp>
+      <p:pic>
+        <p:nvPicPr>
+          <p:cNvPr id="10" name="Imagen 9">
+            <a:extLst>
+              <a:ext uri="{FF2B5EF4-FFF2-40B4-BE49-F238E27FC236}">
+                <a16:creationId xmlns:a16="http://schemas.microsoft.com/office/drawing/2014/main" id="{B48F1906-C1F0-4D37-B131-3169FC9E208F}"/>
+              </a:ext>
+            </a:extLst>
+          </p:cNvPr>
+          <p:cNvPicPr>
+            <a:picLocks noChangeAspect="1"/>
+          </p:cNvPicPr>
+          <p:nvPr/>
+        </p:nvPicPr>
+        <p:blipFill>
+          <a:blip r:embed="rId2"/>
+          <a:stretch>
+            <a:fillRect/>
+          </a:stretch>
+        </p:blipFill>
+        <p:spPr>
+          <a:xfrm>
+            <a:off x="6647543" y="2318994"/>
+            <a:ext cx="4702411" cy="1791093"/>
+          </a:xfrm>
+          <a:prstGeom prst="rect">
+            <a:avLst/>
+          </a:prstGeom>
+        </p:spPr>
+      </p:pic>
     </p:spTree>
     <p:extLst>
       <p:ext uri="{BB962C8B-B14F-4D97-AF65-F5344CB8AC3E}">
-        <p14:creationId xmlns:p14="http://schemas.microsoft.com/office/powerpoint/2010/main" val="414235850"/>
+        <p14:creationId xmlns:p14="http://schemas.microsoft.com/office/powerpoint/2010/main" val="1547425982"/>
       </p:ext>
     </p:extLst>
   </p:cSld>
@@ -28049,9 +28184,12 @@
           <a:p>
             <a:r>
               <a:rPr lang="en-US" cap="small" dirty="0" err="1"/>
-              <a:t>Conclusiones</a:t>
-            </a:r>
-            <a:endParaRPr lang="en-US" cap="small" dirty="0"/>
+              <a:t>Implementación</a:t>
+            </a:r>
+            <a:r>
+              <a:rPr lang="en-US" cap="small" dirty="0"/>
+              <a:t>: Echo</a:t>
+            </a:r>
           </a:p>
         </p:txBody>
       </p:sp>
@@ -28142,10 +28280,49 @@
           </a:p>
         </p:txBody>
       </p:sp>
+      <p:sp>
+        <p:nvSpPr>
+          <p:cNvPr id="7" name="CuadroTexto 6">
+            <a:extLst>
+              <a:ext uri="{FF2B5EF4-FFF2-40B4-BE49-F238E27FC236}">
+                <a16:creationId xmlns:a16="http://schemas.microsoft.com/office/drawing/2014/main" id="{083806C5-CFE4-44DD-B428-AE9169EDA6FC}"/>
+              </a:ext>
+            </a:extLst>
+          </p:cNvPr>
+          <p:cNvSpPr txBox="1"/>
+          <p:nvPr/>
+        </p:nvSpPr>
+        <p:spPr>
+          <a:xfrm>
+            <a:off x="685800" y="2318994"/>
+            <a:ext cx="5410200" cy="1477328"/>
+          </a:xfrm>
+          <a:prstGeom prst="rect">
+            <a:avLst/>
+          </a:prstGeom>
+          <a:noFill/>
+        </p:spPr>
+        <p:txBody>
+          <a:bodyPr wrap="square" rtlCol="0">
+            <a:spAutoFit/>
+          </a:bodyPr>
+          <a:lstStyle/>
+          <a:p>
+            <a:pPr marL="742950" lvl="1" indent="-285750">
+              <a:buFont typeface="Arial" panose="020B0604020202020204" pitchFamily="34" charset="0"/>
+              <a:buChar char="•"/>
+            </a:pPr>
+            <a:r>
+              <a:rPr lang="es-ES_tradnl" dirty="0"/>
+              <a:t>El efecto de Echo consiste en generar una salida de audio simulando que el sonido se refleja y por lo tanto apareciendo muestras de audio repetidas y atenuadas.</a:t>
+            </a:r>
+          </a:p>
+        </p:txBody>
+      </p:sp>
     </p:spTree>
     <p:extLst>
       <p:ext uri="{BB962C8B-B14F-4D97-AF65-F5344CB8AC3E}">
-        <p14:creationId xmlns:p14="http://schemas.microsoft.com/office/powerpoint/2010/main" val="1273444518"/>
+        <p14:creationId xmlns:p14="http://schemas.microsoft.com/office/powerpoint/2010/main" val="2246396717"/>
       </p:ext>
     </p:extLst>
   </p:cSld>
@@ -28200,9 +28377,12 @@
           <a:p>
             <a:r>
               <a:rPr lang="en-US" cap="small" dirty="0" err="1"/>
-              <a:t>Bibliografía</a:t>
-            </a:r>
-            <a:endParaRPr lang="en-US" cap="small" dirty="0"/>
+              <a:t>Implementación</a:t>
+            </a:r>
+            <a:r>
+              <a:rPr lang="en-US" cap="small" dirty="0"/>
+              <a:t>: Reverb</a:t>
+            </a:r>
           </a:p>
         </p:txBody>
       </p:sp>
@@ -28295,10 +28475,10 @@
       </p:sp>
       <p:sp>
         <p:nvSpPr>
-          <p:cNvPr id="6" name="TextBox 5">
+          <p:cNvPr id="7" name="CuadroTexto 6">
             <a:extLst>
               <a:ext uri="{FF2B5EF4-FFF2-40B4-BE49-F238E27FC236}">
-                <a16:creationId xmlns:a16="http://schemas.microsoft.com/office/drawing/2014/main" id="{905FC345-BE35-449A-ABB5-D2589C635BB4}"/>
+                <a16:creationId xmlns:a16="http://schemas.microsoft.com/office/drawing/2014/main" id="{083806C5-CFE4-44DD-B428-AE9169EDA6FC}"/>
               </a:ext>
             </a:extLst>
           </p:cNvPr>
@@ -28307,8 +28487,8 @@
         </p:nvSpPr>
         <p:spPr>
           <a:xfrm>
-            <a:off x="822121" y="1912690"/>
-            <a:ext cx="10684079" cy="2585323"/>
+            <a:off x="685800" y="2318994"/>
+            <a:ext cx="5410200" cy="1477328"/>
           </a:xfrm>
           <a:prstGeom prst="rect">
             <a:avLst/>
@@ -28321,188 +28501,59 @@
           </a:bodyPr>
           <a:lstStyle/>
           <a:p>
-            <a:pPr marL="285750" indent="-285750">
+            <a:pPr marL="742950" lvl="1" indent="-285750">
               <a:buFont typeface="Arial" panose="020B0604020202020204" pitchFamily="34" charset="0"/>
               <a:buChar char="•"/>
             </a:pPr>
             <a:r>
-              <a:rPr lang="en-US" dirty="0">
-                <a:hlinkClick r:id="rId2"/>
-              </a:rPr>
-              <a:t>http://culturizando.com/la-historia-de-la-primera-guitarra-electrica/</a:t>
-            </a:r>
-            <a:r>
-              <a:rPr lang="en-US" dirty="0"/>
-              <a:t> – </a:t>
-            </a:r>
-            <a:r>
-              <a:rPr lang="en-US" dirty="0" err="1"/>
-              <a:t>Figura</a:t>
-            </a:r>
-            <a:r>
-              <a:rPr lang="en-US" dirty="0"/>
-              <a:t> </a:t>
-            </a:r>
-            <a:r>
-              <a:rPr lang="en-US" dirty="0" err="1"/>
-              <a:t>primera</a:t>
-            </a:r>
-            <a:r>
-              <a:rPr lang="en-US" dirty="0"/>
-              <a:t> </a:t>
-            </a:r>
-            <a:r>
-              <a:rPr lang="en-US" dirty="0" err="1"/>
-              <a:t>guitarra</a:t>
-            </a:r>
-            <a:r>
-              <a:rPr lang="en-US" dirty="0"/>
-              <a:t> </a:t>
-            </a:r>
-            <a:r>
-              <a:rPr lang="en-US" dirty="0" err="1"/>
-              <a:t>eléctrica</a:t>
-            </a:r>
-            <a:r>
-              <a:rPr lang="en-US" dirty="0"/>
-              <a:t>.</a:t>
-            </a:r>
-          </a:p>
-          <a:p>
-            <a:pPr marL="285750" indent="-285750">
-              <a:buFont typeface="Arial" panose="020B0604020202020204" pitchFamily="34" charset="0"/>
-              <a:buChar char="•"/>
-            </a:pPr>
-            <a:r>
-              <a:rPr lang="en-US" dirty="0">
-                <a:hlinkClick r:id="rId2"/>
-              </a:rPr>
-              <a:t>https://duckduckgo.com/images </a:t>
-            </a:r>
-            <a:r>
-              <a:rPr lang="en-US" dirty="0"/>
-              <a:t>– </a:t>
-            </a:r>
-            <a:r>
-              <a:rPr lang="en-US" dirty="0" err="1"/>
-              <a:t>Figuras</a:t>
-            </a:r>
-            <a:r>
-              <a:rPr lang="en-US" dirty="0"/>
-              <a:t>.</a:t>
-            </a:r>
-          </a:p>
-          <a:p>
-            <a:pPr marL="285750" indent="-285750">
-              <a:buFont typeface="Arial" panose="020B0604020202020204" pitchFamily="34" charset="0"/>
-              <a:buChar char="•"/>
-            </a:pPr>
-            <a:endParaRPr lang="en-US" dirty="0">
-              <a:hlinkClick r:id="rId2"/>
-            </a:endParaRPr>
-          </a:p>
-          <a:p>
-            <a:pPr marL="285750" indent="-285750">
-              <a:buFont typeface="Arial" panose="020B0604020202020204" pitchFamily="34" charset="0"/>
-              <a:buChar char="•"/>
-            </a:pPr>
-            <a:r>
-              <a:rPr lang="en-US" dirty="0">
-                <a:hlinkClick r:id="rId2"/>
-              </a:rPr>
-              <a:t>https://commons.wikimedia.org/w/index.php?curid=5786095</a:t>
-            </a:r>
-            <a:r>
-              <a:rPr lang="en-US" dirty="0"/>
-              <a:t> – </a:t>
-            </a:r>
-            <a:r>
-              <a:rPr lang="en-US" dirty="0" err="1"/>
-              <a:t>Figura</a:t>
-            </a:r>
-            <a:r>
-              <a:rPr lang="en-US" dirty="0"/>
-              <a:t> “</a:t>
-            </a:r>
-            <a:r>
-              <a:rPr lang="en-US" i="1" dirty="0" err="1"/>
-              <a:t>Sallen&amp;Key</a:t>
-            </a:r>
-            <a:r>
-              <a:rPr lang="en-US" i="1" dirty="0"/>
-              <a:t>”  </a:t>
-            </a:r>
-            <a:r>
-              <a:rPr lang="en-US" i="1" dirty="0" err="1"/>
-              <a:t>genérico</a:t>
-            </a:r>
-            <a:r>
-              <a:rPr lang="en-US" i="1" dirty="0"/>
-              <a:t>.</a:t>
-            </a:r>
-            <a:endParaRPr lang="en-US" dirty="0"/>
-          </a:p>
-          <a:p>
-            <a:pPr marL="285750" indent="-285750">
-              <a:buFont typeface="Arial" panose="020B0604020202020204" pitchFamily="34" charset="0"/>
-              <a:buChar char="•"/>
-            </a:pPr>
-            <a:r>
-              <a:rPr lang="en-US" dirty="0">
-                <a:hlinkClick r:id="rId3"/>
-              </a:rPr>
-              <a:t>http://www.ti.com/lit/an/sloa024b/sloa024b.pdf</a:t>
-            </a:r>
-            <a:r>
-              <a:rPr lang="en-US" dirty="0"/>
-              <a:t> - </a:t>
-            </a:r>
-            <a:r>
-              <a:rPr lang="en-US" dirty="0" err="1"/>
-              <a:t>Análisis</a:t>
-            </a:r>
-            <a:r>
-              <a:rPr lang="en-US" dirty="0"/>
-              <a:t> </a:t>
-            </a:r>
-            <a:r>
-              <a:rPr lang="en-US" dirty="0" err="1"/>
-              <a:t>Filtro</a:t>
-            </a:r>
-            <a:r>
-              <a:rPr lang="en-US" dirty="0"/>
-              <a:t> “</a:t>
-            </a:r>
-            <a:r>
-              <a:rPr lang="en-US" i="1" dirty="0" err="1"/>
-              <a:t>Sallen&amp;Key</a:t>
-            </a:r>
-            <a:r>
-              <a:rPr lang="en-US" i="1" dirty="0"/>
-              <a:t>”.</a:t>
-            </a:r>
-            <a:endParaRPr lang="en-US" dirty="0"/>
-          </a:p>
-          <a:p>
-            <a:pPr marL="285750" indent="-285750">
-              <a:buFont typeface="Arial" panose="020B0604020202020204" pitchFamily="34" charset="0"/>
-              <a:buChar char="•"/>
-            </a:pPr>
-            <a:endParaRPr lang="en-US" dirty="0"/>
-          </a:p>
-          <a:p>
-            <a:pPr marL="285750" indent="-285750">
-              <a:buFont typeface="Arial" panose="020B0604020202020204" pitchFamily="34" charset="0"/>
-              <a:buChar char="•"/>
-            </a:pPr>
-            <a:endParaRPr lang="en-US" dirty="0"/>
+              <a:rPr lang="es-ES_tradnl" dirty="0"/>
+              <a:t>El efecto de </a:t>
+            </a:r>
+            <a:r>
+              <a:rPr lang="es-ES_tradnl" dirty="0" err="1"/>
+              <a:t>Reverb</a:t>
+            </a:r>
+            <a:r>
+              <a:rPr lang="es-ES_tradnl" dirty="0"/>
+              <a:t> consiste en simular múltiples reflexiones del sonido y dar sensación de que éste permanece en el ambiente unos instantes tras la desaparición del sonido original.</a:t>
+            </a:r>
           </a:p>
         </p:txBody>
       </p:sp>
+      <p:pic>
+        <p:nvPicPr>
+          <p:cNvPr id="8" name="Imagen 7">
+            <a:extLst>
+              <a:ext uri="{FF2B5EF4-FFF2-40B4-BE49-F238E27FC236}">
+                <a16:creationId xmlns:a16="http://schemas.microsoft.com/office/drawing/2014/main" id="{221C3B8A-C152-44B2-9A34-F4828C2FAB4A}"/>
+              </a:ext>
+            </a:extLst>
+          </p:cNvPr>
+          <p:cNvPicPr>
+            <a:picLocks noChangeAspect="1"/>
+          </p:cNvPicPr>
+          <p:nvPr/>
+        </p:nvPicPr>
+        <p:blipFill>
+          <a:blip r:embed="rId2"/>
+          <a:stretch>
+            <a:fillRect/>
+          </a:stretch>
+        </p:blipFill>
+        <p:spPr>
+          <a:xfrm>
+            <a:off x="7212241" y="2178229"/>
+            <a:ext cx="3819525" cy="2162175"/>
+          </a:xfrm>
+          <a:prstGeom prst="rect">
+            <a:avLst/>
+          </a:prstGeom>
+        </p:spPr>
+      </p:pic>
     </p:spTree>
     <p:extLst>
       <p:ext uri="{BB962C8B-B14F-4D97-AF65-F5344CB8AC3E}">
-        <p14:creationId xmlns:p14="http://schemas.microsoft.com/office/powerpoint/2010/main" val="2820286773"/>
+        <p14:creationId xmlns:p14="http://schemas.microsoft.com/office/powerpoint/2010/main" val="2371518782"/>
       </p:ext>
     </p:extLst>
   </p:cSld>
@@ -28547,20 +28598,27 @@
         </p:nvSpPr>
         <p:spPr>
           <a:xfrm>
-            <a:off x="3490858" y="744008"/>
-            <a:ext cx="4990412" cy="1048623"/>
+            <a:off x="2541864" y="764373"/>
+            <a:ext cx="8964336" cy="1293028"/>
           </a:xfrm>
         </p:spPr>
         <p:txBody>
-          <a:bodyPr>
-            <a:normAutofit/>
-          </a:bodyPr>
+          <a:bodyPr/>
           <a:lstStyle/>
           <a:p>
             <a:r>
-              <a:rPr lang="en-US" sz="6000" cap="small" dirty="0"/>
-              <a:t>DEMO TIME!</a:t>
-            </a:r>
+              <a:rPr lang="en-US" cap="small" dirty="0" err="1"/>
+              <a:t>Implementación</a:t>
+            </a:r>
+            <a:r>
+              <a:rPr lang="en-US" cap="small" dirty="0"/>
+              <a:t>: </a:t>
+            </a:r>
+            <a:r>
+              <a:rPr lang="en-US" cap="small" dirty="0" err="1"/>
+              <a:t>Octavador</a:t>
+            </a:r>
+            <a:endParaRPr lang="en-US" cap="small" dirty="0"/>
           </a:p>
         </p:txBody>
       </p:sp>
@@ -28646,6 +28704,1772 @@
             <a:fld id="{6D22F896-40B5-4ADD-8801-0D06FADFA095}" type="slidenum">
               <a:rPr lang="en-US" smtClean="0"/>
               <a:t>22</a:t>
+            </a:fld>
+            <a:endParaRPr lang="en-US" dirty="0"/>
+          </a:p>
+        </p:txBody>
+      </p:sp>
+      <p:sp>
+        <p:nvSpPr>
+          <p:cNvPr id="7" name="CuadroTexto 6">
+            <a:extLst>
+              <a:ext uri="{FF2B5EF4-FFF2-40B4-BE49-F238E27FC236}">
+                <a16:creationId xmlns:a16="http://schemas.microsoft.com/office/drawing/2014/main" id="{083806C5-CFE4-44DD-B428-AE9169EDA6FC}"/>
+              </a:ext>
+            </a:extLst>
+          </p:cNvPr>
+          <p:cNvSpPr txBox="1"/>
+          <p:nvPr/>
+        </p:nvSpPr>
+        <p:spPr>
+          <a:xfrm>
+            <a:off x="685800" y="2318994"/>
+            <a:ext cx="5410200" cy="1477328"/>
+          </a:xfrm>
+          <a:prstGeom prst="rect">
+            <a:avLst/>
+          </a:prstGeom>
+          <a:noFill/>
+        </p:spPr>
+        <p:txBody>
+          <a:bodyPr wrap="square" rtlCol="0">
+            <a:spAutoFit/>
+          </a:bodyPr>
+          <a:lstStyle/>
+          <a:p>
+            <a:pPr marL="742950" lvl="1" indent="-285750">
+              <a:buFont typeface="Arial" panose="020B0604020202020204" pitchFamily="34" charset="0"/>
+              <a:buChar char="•"/>
+            </a:pPr>
+            <a:r>
+              <a:rPr lang="es-ES_tradnl" dirty="0"/>
+              <a:t>El efecto de </a:t>
+            </a:r>
+            <a:r>
+              <a:rPr lang="es-ES_tradnl" dirty="0" err="1"/>
+              <a:t>Octavador</a:t>
+            </a:r>
+            <a:r>
+              <a:rPr lang="es-ES_tradnl" dirty="0"/>
+              <a:t> consiste en simular que la nota tocada es una octava más aguda o más grave, dando la sensación de que hay dos guitarras tocando al mismo tiempo.</a:t>
+            </a:r>
+          </a:p>
+        </p:txBody>
+      </p:sp>
+    </p:spTree>
+    <p:extLst>
+      <p:ext uri="{BB962C8B-B14F-4D97-AF65-F5344CB8AC3E}">
+        <p14:creationId xmlns:p14="http://schemas.microsoft.com/office/powerpoint/2010/main" val="1865786555"/>
+      </p:ext>
+    </p:extLst>
+  </p:cSld>
+  <p:clrMapOvr>
+    <a:masterClrMapping/>
+  </p:clrMapOvr>
+</p:sld>
+</file>
+
+<file path=ppt/slides/slide23.xml><?xml version="1.0" encoding="utf-8"?>
+<p:sld xmlns:a="http://schemas.openxmlformats.org/drawingml/2006/main" xmlns:r="http://schemas.openxmlformats.org/officeDocument/2006/relationships" xmlns:p="http://schemas.openxmlformats.org/presentationml/2006/main">
+  <p:cSld>
+    <p:spTree>
+      <p:nvGrpSpPr>
+        <p:cNvPr id="1" name=""/>
+        <p:cNvGrpSpPr/>
+        <p:nvPr/>
+      </p:nvGrpSpPr>
+      <p:grpSpPr>
+        <a:xfrm>
+          <a:off x="0" y="0"/>
+          <a:ext cx="0" cy="0"/>
+          <a:chOff x="0" y="0"/>
+          <a:chExt cx="0" cy="0"/>
+        </a:xfrm>
+      </p:grpSpPr>
+      <p:sp>
+        <p:nvSpPr>
+          <p:cNvPr id="2" name="Title 1">
+            <a:extLst>
+              <a:ext uri="{FF2B5EF4-FFF2-40B4-BE49-F238E27FC236}">
+                <a16:creationId xmlns:a16="http://schemas.microsoft.com/office/drawing/2014/main" id="{A8D9B15F-243A-46AB-8E11-D0C0441C7E7A}"/>
+              </a:ext>
+            </a:extLst>
+          </p:cNvPr>
+          <p:cNvSpPr>
+            <a:spLocks noGrp="1"/>
+          </p:cNvSpPr>
+          <p:nvPr>
+            <p:ph type="title"/>
+          </p:nvPr>
+        </p:nvSpPr>
+        <p:spPr>
+          <a:xfrm>
+            <a:off x="2541864" y="764373"/>
+            <a:ext cx="8964336" cy="1293028"/>
+          </a:xfrm>
+        </p:spPr>
+        <p:txBody>
+          <a:bodyPr/>
+          <a:lstStyle/>
+          <a:p>
+            <a:r>
+              <a:rPr lang="en-US" cap="small" dirty="0" err="1"/>
+              <a:t>Implementación</a:t>
+            </a:r>
+            <a:r>
+              <a:rPr lang="en-US" cap="small" dirty="0"/>
+              <a:t>: </a:t>
+            </a:r>
+            <a:r>
+              <a:rPr lang="en-US" cap="small" dirty="0" err="1"/>
+              <a:t>Trémolo</a:t>
+            </a:r>
+            <a:endParaRPr lang="en-US" cap="small" dirty="0"/>
+          </a:p>
+        </p:txBody>
+      </p:sp>
+      <p:sp>
+        <p:nvSpPr>
+          <p:cNvPr id="3" name="Date Placeholder 2">
+            <a:extLst>
+              <a:ext uri="{FF2B5EF4-FFF2-40B4-BE49-F238E27FC236}">
+                <a16:creationId xmlns:a16="http://schemas.microsoft.com/office/drawing/2014/main" id="{A290E9DE-389C-4E44-B46B-D764E57D5027}"/>
+              </a:ext>
+            </a:extLst>
+          </p:cNvPr>
+          <p:cNvSpPr>
+            <a:spLocks noGrp="1"/>
+          </p:cNvSpPr>
+          <p:nvPr>
+            <p:ph type="dt" sz="half" idx="10"/>
+          </p:nvPr>
+        </p:nvSpPr>
+        <p:spPr/>
+        <p:txBody>
+          <a:bodyPr/>
+          <a:lstStyle/>
+          <a:p>
+            <a:fld id="{E0855CDD-93BC-47DE-BEFF-59319602E3E3}" type="datetime1">
+              <a:rPr lang="es-ES" smtClean="0"/>
+              <a:t>27/01/2018</a:t>
+            </a:fld>
+            <a:endParaRPr lang="en-US" dirty="0"/>
+          </a:p>
+        </p:txBody>
+      </p:sp>
+      <p:sp>
+        <p:nvSpPr>
+          <p:cNvPr id="4" name="Footer Placeholder 3">
+            <a:extLst>
+              <a:ext uri="{FF2B5EF4-FFF2-40B4-BE49-F238E27FC236}">
+                <a16:creationId xmlns:a16="http://schemas.microsoft.com/office/drawing/2014/main" id="{5CB136F4-308C-4782-813D-6F33D34037A5}"/>
+              </a:ext>
+            </a:extLst>
+          </p:cNvPr>
+          <p:cNvSpPr>
+            <a:spLocks noGrp="1"/>
+          </p:cNvSpPr>
+          <p:nvPr>
+            <p:ph type="ftr" sz="quarter" idx="11"/>
+          </p:nvPr>
+        </p:nvSpPr>
+        <p:spPr/>
+        <p:txBody>
+          <a:bodyPr/>
+          <a:lstStyle/>
+          <a:p>
+            <a:r>
+              <a:rPr lang="es-ES"/>
+              <a:t>Sistema de adquisición, filtrado y Tratamiento digital de una señal acústica.</a:t>
+            </a:r>
+            <a:endParaRPr lang="en-US" dirty="0"/>
+          </a:p>
+        </p:txBody>
+      </p:sp>
+      <p:sp>
+        <p:nvSpPr>
+          <p:cNvPr id="5" name="Slide Number Placeholder 4">
+            <a:extLst>
+              <a:ext uri="{FF2B5EF4-FFF2-40B4-BE49-F238E27FC236}">
+                <a16:creationId xmlns:a16="http://schemas.microsoft.com/office/drawing/2014/main" id="{96F3F281-ECE4-45D9-88BB-CF25F86AED26}"/>
+              </a:ext>
+            </a:extLst>
+          </p:cNvPr>
+          <p:cNvSpPr>
+            <a:spLocks noGrp="1"/>
+          </p:cNvSpPr>
+          <p:nvPr>
+            <p:ph type="sldNum" sz="quarter" idx="12"/>
+          </p:nvPr>
+        </p:nvSpPr>
+        <p:spPr/>
+        <p:txBody>
+          <a:bodyPr/>
+          <a:lstStyle/>
+          <a:p>
+            <a:fld id="{6D22F896-40B5-4ADD-8801-0D06FADFA095}" type="slidenum">
+              <a:rPr lang="en-US" smtClean="0"/>
+              <a:t>23</a:t>
+            </a:fld>
+            <a:endParaRPr lang="en-US" dirty="0"/>
+          </a:p>
+        </p:txBody>
+      </p:sp>
+      <p:sp>
+        <p:nvSpPr>
+          <p:cNvPr id="7" name="CuadroTexto 6">
+            <a:extLst>
+              <a:ext uri="{FF2B5EF4-FFF2-40B4-BE49-F238E27FC236}">
+                <a16:creationId xmlns:a16="http://schemas.microsoft.com/office/drawing/2014/main" id="{083806C5-CFE4-44DD-B428-AE9169EDA6FC}"/>
+              </a:ext>
+            </a:extLst>
+          </p:cNvPr>
+          <p:cNvSpPr txBox="1"/>
+          <p:nvPr/>
+        </p:nvSpPr>
+        <p:spPr>
+          <a:xfrm>
+            <a:off x="685800" y="2318994"/>
+            <a:ext cx="5410200" cy="2585323"/>
+          </a:xfrm>
+          <a:prstGeom prst="rect">
+            <a:avLst/>
+          </a:prstGeom>
+          <a:noFill/>
+        </p:spPr>
+        <p:txBody>
+          <a:bodyPr wrap="square" rtlCol="0">
+            <a:spAutoFit/>
+          </a:bodyPr>
+          <a:lstStyle/>
+          <a:p>
+            <a:pPr marL="742950" lvl="1" indent="-285750">
+              <a:buFont typeface="Arial" panose="020B0604020202020204" pitchFamily="34" charset="0"/>
+              <a:buChar char="•"/>
+            </a:pPr>
+            <a:r>
+              <a:rPr lang="es-ES_tradnl" dirty="0"/>
+              <a:t>El efecto de Trémolo consiste en variar periódicamente la amplitud de las componentes de entrada mientras que la frecuencia se mantiene constante.</a:t>
+            </a:r>
+          </a:p>
+          <a:p>
+            <a:pPr marL="742950" lvl="1" indent="-285750">
+              <a:buFont typeface="Arial" panose="020B0604020202020204" pitchFamily="34" charset="0"/>
+              <a:buChar char="•"/>
+            </a:pPr>
+            <a:endParaRPr lang="es-ES_tradnl" dirty="0"/>
+          </a:p>
+          <a:p>
+            <a:pPr marL="742950" lvl="1" indent="-285750">
+              <a:buFont typeface="Arial" panose="020B0604020202020204" pitchFamily="34" charset="0"/>
+              <a:buChar char="•"/>
+            </a:pPr>
+            <a:r>
+              <a:rPr lang="es-ES_tradnl" dirty="0"/>
+              <a:t>En este caso se utiliza una sinusoide para modular la amplitud.</a:t>
+            </a:r>
+          </a:p>
+          <a:p>
+            <a:pPr marL="1200150" lvl="2" indent="-285750">
+              <a:buFont typeface="Arial" panose="020B0604020202020204" pitchFamily="34" charset="0"/>
+              <a:buChar char="•"/>
+            </a:pPr>
+            <a:r>
+              <a:rPr lang="es-ES_tradnl" dirty="0"/>
+              <a:t>1000 puntos.</a:t>
+            </a:r>
+          </a:p>
+          <a:p>
+            <a:pPr marL="1200150" lvl="2" indent="-285750">
+              <a:buFont typeface="Arial" panose="020B0604020202020204" pitchFamily="34" charset="0"/>
+              <a:buChar char="•"/>
+            </a:pPr>
+            <a:r>
+              <a:rPr lang="es-ES_tradnl" dirty="0"/>
+              <a:t>Amplitud máxima 4095.</a:t>
+            </a:r>
+          </a:p>
+        </p:txBody>
+      </p:sp>
+    </p:spTree>
+    <p:extLst>
+      <p:ext uri="{BB962C8B-B14F-4D97-AF65-F5344CB8AC3E}">
+        <p14:creationId xmlns:p14="http://schemas.microsoft.com/office/powerpoint/2010/main" val="3002038866"/>
+      </p:ext>
+    </p:extLst>
+  </p:cSld>
+  <p:clrMapOvr>
+    <a:masterClrMapping/>
+  </p:clrMapOvr>
+</p:sld>
+</file>
+
+<file path=ppt/slides/slide24.xml><?xml version="1.0" encoding="utf-8"?>
+<p:sld xmlns:a="http://schemas.openxmlformats.org/drawingml/2006/main" xmlns:r="http://schemas.openxmlformats.org/officeDocument/2006/relationships" xmlns:p="http://schemas.openxmlformats.org/presentationml/2006/main">
+  <p:cSld>
+    <p:spTree>
+      <p:nvGrpSpPr>
+        <p:cNvPr id="1" name=""/>
+        <p:cNvGrpSpPr/>
+        <p:nvPr/>
+      </p:nvGrpSpPr>
+      <p:grpSpPr>
+        <a:xfrm>
+          <a:off x="0" y="0"/>
+          <a:ext cx="0" cy="0"/>
+          <a:chOff x="0" y="0"/>
+          <a:chExt cx="0" cy="0"/>
+        </a:xfrm>
+      </p:grpSpPr>
+      <p:sp>
+        <p:nvSpPr>
+          <p:cNvPr id="2" name="Title 1">
+            <a:extLst>
+              <a:ext uri="{FF2B5EF4-FFF2-40B4-BE49-F238E27FC236}">
+                <a16:creationId xmlns:a16="http://schemas.microsoft.com/office/drawing/2014/main" id="{A8D9B15F-243A-46AB-8E11-D0C0441C7E7A}"/>
+              </a:ext>
+            </a:extLst>
+          </p:cNvPr>
+          <p:cNvSpPr>
+            <a:spLocks noGrp="1"/>
+          </p:cNvSpPr>
+          <p:nvPr>
+            <p:ph type="title"/>
+          </p:nvPr>
+        </p:nvSpPr>
+        <p:spPr>
+          <a:xfrm>
+            <a:off x="2541864" y="764373"/>
+            <a:ext cx="8964336" cy="1293028"/>
+          </a:xfrm>
+        </p:spPr>
+        <p:txBody>
+          <a:bodyPr/>
+          <a:lstStyle/>
+          <a:p>
+            <a:r>
+              <a:rPr lang="en-US" cap="small" dirty="0" err="1"/>
+              <a:t>Problemas</a:t>
+            </a:r>
+            <a:endParaRPr lang="en-US" cap="small" dirty="0"/>
+          </a:p>
+        </p:txBody>
+      </p:sp>
+      <p:sp>
+        <p:nvSpPr>
+          <p:cNvPr id="3" name="Date Placeholder 2">
+            <a:extLst>
+              <a:ext uri="{FF2B5EF4-FFF2-40B4-BE49-F238E27FC236}">
+                <a16:creationId xmlns:a16="http://schemas.microsoft.com/office/drawing/2014/main" id="{A290E9DE-389C-4E44-B46B-D764E57D5027}"/>
+              </a:ext>
+            </a:extLst>
+          </p:cNvPr>
+          <p:cNvSpPr>
+            <a:spLocks noGrp="1"/>
+          </p:cNvSpPr>
+          <p:nvPr>
+            <p:ph type="dt" sz="half" idx="10"/>
+          </p:nvPr>
+        </p:nvSpPr>
+        <p:spPr/>
+        <p:txBody>
+          <a:bodyPr/>
+          <a:lstStyle/>
+          <a:p>
+            <a:fld id="{E0855CDD-93BC-47DE-BEFF-59319602E3E3}" type="datetime1">
+              <a:rPr lang="es-ES" smtClean="0"/>
+              <a:t>27/01/2018</a:t>
+            </a:fld>
+            <a:endParaRPr lang="en-US" dirty="0"/>
+          </a:p>
+        </p:txBody>
+      </p:sp>
+      <p:sp>
+        <p:nvSpPr>
+          <p:cNvPr id="4" name="Footer Placeholder 3">
+            <a:extLst>
+              <a:ext uri="{FF2B5EF4-FFF2-40B4-BE49-F238E27FC236}">
+                <a16:creationId xmlns:a16="http://schemas.microsoft.com/office/drawing/2014/main" id="{5CB136F4-308C-4782-813D-6F33D34037A5}"/>
+              </a:ext>
+            </a:extLst>
+          </p:cNvPr>
+          <p:cNvSpPr>
+            <a:spLocks noGrp="1"/>
+          </p:cNvSpPr>
+          <p:nvPr>
+            <p:ph type="ftr" sz="quarter" idx="11"/>
+          </p:nvPr>
+        </p:nvSpPr>
+        <p:spPr/>
+        <p:txBody>
+          <a:bodyPr/>
+          <a:lstStyle/>
+          <a:p>
+            <a:r>
+              <a:rPr lang="es-ES"/>
+              <a:t>Sistema de adquisición, filtrado y Tratamiento digital de una señal acústica.</a:t>
+            </a:r>
+            <a:endParaRPr lang="en-US" dirty="0"/>
+          </a:p>
+        </p:txBody>
+      </p:sp>
+      <p:sp>
+        <p:nvSpPr>
+          <p:cNvPr id="5" name="Slide Number Placeholder 4">
+            <a:extLst>
+              <a:ext uri="{FF2B5EF4-FFF2-40B4-BE49-F238E27FC236}">
+                <a16:creationId xmlns:a16="http://schemas.microsoft.com/office/drawing/2014/main" id="{96F3F281-ECE4-45D9-88BB-CF25F86AED26}"/>
+              </a:ext>
+            </a:extLst>
+          </p:cNvPr>
+          <p:cNvSpPr>
+            <a:spLocks noGrp="1"/>
+          </p:cNvSpPr>
+          <p:nvPr>
+            <p:ph type="sldNum" sz="quarter" idx="12"/>
+          </p:nvPr>
+        </p:nvSpPr>
+        <p:spPr/>
+        <p:txBody>
+          <a:bodyPr/>
+          <a:lstStyle/>
+          <a:p>
+            <a:fld id="{6D22F896-40B5-4ADD-8801-0D06FADFA095}" type="slidenum">
+              <a:rPr lang="en-US" smtClean="0"/>
+              <a:t>24</a:t>
+            </a:fld>
+            <a:endParaRPr lang="en-US" dirty="0"/>
+          </a:p>
+        </p:txBody>
+      </p:sp>
+    </p:spTree>
+    <p:extLst>
+      <p:ext uri="{BB962C8B-B14F-4D97-AF65-F5344CB8AC3E}">
+        <p14:creationId xmlns:p14="http://schemas.microsoft.com/office/powerpoint/2010/main" val="2862553281"/>
+      </p:ext>
+    </p:extLst>
+  </p:cSld>
+  <p:clrMapOvr>
+    <a:masterClrMapping/>
+  </p:clrMapOvr>
+</p:sld>
+</file>
+
+<file path=ppt/slides/slide25.xml><?xml version="1.0" encoding="utf-8"?>
+<p:sld xmlns:a="http://schemas.openxmlformats.org/drawingml/2006/main" xmlns:r="http://schemas.openxmlformats.org/officeDocument/2006/relationships" xmlns:p="http://schemas.openxmlformats.org/presentationml/2006/main">
+  <p:cSld>
+    <p:bg>
+      <p:bgPr>
+        <a:solidFill>
+          <a:schemeClr val="bg1"/>
+        </a:solidFill>
+        <a:effectLst/>
+      </p:bgPr>
+    </p:bg>
+    <p:spTree>
+      <p:nvGrpSpPr>
+        <p:cNvPr id="1" name=""/>
+        <p:cNvGrpSpPr/>
+        <p:nvPr/>
+      </p:nvGrpSpPr>
+      <p:grpSpPr>
+        <a:xfrm>
+          <a:off x="0" y="0"/>
+          <a:ext cx="0" cy="0"/>
+          <a:chOff x="0" y="0"/>
+          <a:chExt cx="0" cy="0"/>
+        </a:xfrm>
+      </p:grpSpPr>
+      <p:sp>
+        <p:nvSpPr>
+          <p:cNvPr id="2" name="Title 1">
+            <a:extLst>
+              <a:ext uri="{FF2B5EF4-FFF2-40B4-BE49-F238E27FC236}">
+                <a16:creationId xmlns:a16="http://schemas.microsoft.com/office/drawing/2014/main" id="{D0DC89B9-017F-4218-B751-60CBACED24EF}"/>
+              </a:ext>
+            </a:extLst>
+          </p:cNvPr>
+          <p:cNvSpPr>
+            <a:spLocks noGrp="1"/>
+          </p:cNvSpPr>
+          <p:nvPr>
+            <p:ph type="title"/>
+          </p:nvPr>
+        </p:nvSpPr>
+        <p:spPr>
+          <a:xfrm>
+            <a:off x="9756396" y="764373"/>
+            <a:ext cx="1749804" cy="1293028"/>
+          </a:xfrm>
+        </p:spPr>
+        <p:txBody>
+          <a:bodyPr vert="horz" lIns="91440" tIns="45720" rIns="91440" bIns="45720" rtlCol="0" anchor="ctr">
+            <a:normAutofit/>
+          </a:bodyPr>
+          <a:lstStyle/>
+          <a:p>
+            <a:r>
+              <a:rPr lang="en-US" cap="small" dirty="0" err="1"/>
+              <a:t>Índice</a:t>
+            </a:r>
+            <a:endParaRPr lang="en-US" cap="small" dirty="0"/>
+          </a:p>
+        </p:txBody>
+      </p:sp>
+      <p:sp>
+        <p:nvSpPr>
+          <p:cNvPr id="3" name="Date Placeholder 2">
+            <a:extLst>
+              <a:ext uri="{FF2B5EF4-FFF2-40B4-BE49-F238E27FC236}">
+                <a16:creationId xmlns:a16="http://schemas.microsoft.com/office/drawing/2014/main" id="{56AB03D1-EEAA-457D-B1FB-120BAB38CC01}"/>
+              </a:ext>
+            </a:extLst>
+          </p:cNvPr>
+          <p:cNvSpPr>
+            <a:spLocks noGrp="1"/>
+          </p:cNvSpPr>
+          <p:nvPr>
+            <p:ph type="dt" sz="half" idx="10"/>
+          </p:nvPr>
+        </p:nvSpPr>
+        <p:spPr/>
+        <p:txBody>
+          <a:bodyPr vert="horz" lIns="91440" tIns="45720" rIns="91440" bIns="45720" rtlCol="0" anchor="ctr">
+            <a:normAutofit/>
+          </a:bodyPr>
+          <a:lstStyle/>
+          <a:p>
+            <a:pPr>
+              <a:spcAft>
+                <a:spcPts val="600"/>
+              </a:spcAft>
+            </a:pPr>
+            <a:fld id="{3DF178BE-18F7-4553-B706-7570B1EAB4FB}" type="datetime1">
+              <a:rPr lang="es-ES" smtClean="0">
+                <a:solidFill>
+                  <a:schemeClr val="tx1"/>
+                </a:solidFill>
+              </a:rPr>
+              <a:t>27/01/2018</a:t>
+            </a:fld>
+            <a:endParaRPr lang="en-US">
+              <a:solidFill>
+                <a:schemeClr val="tx1"/>
+              </a:solidFill>
+            </a:endParaRPr>
+          </a:p>
+        </p:txBody>
+      </p:sp>
+      <p:sp>
+        <p:nvSpPr>
+          <p:cNvPr id="4" name="Slide Number Placeholder 3">
+            <a:extLst>
+              <a:ext uri="{FF2B5EF4-FFF2-40B4-BE49-F238E27FC236}">
+                <a16:creationId xmlns:a16="http://schemas.microsoft.com/office/drawing/2014/main" id="{F709A17A-628C-4240-882E-90DE1270E6B9}"/>
+              </a:ext>
+            </a:extLst>
+          </p:cNvPr>
+          <p:cNvSpPr>
+            <a:spLocks noGrp="1"/>
+          </p:cNvSpPr>
+          <p:nvPr>
+            <p:ph type="sldNum" sz="quarter" idx="12"/>
+          </p:nvPr>
+        </p:nvSpPr>
+        <p:spPr/>
+        <p:txBody>
+          <a:bodyPr vert="horz" lIns="91440" tIns="45720" rIns="91440" bIns="45720" rtlCol="0" anchor="ctr">
+            <a:normAutofit/>
+          </a:bodyPr>
+          <a:lstStyle/>
+          <a:p>
+            <a:pPr>
+              <a:spcAft>
+                <a:spcPts val="600"/>
+              </a:spcAft>
+            </a:pPr>
+            <a:fld id="{6D22F896-40B5-4ADD-8801-0D06FADFA095}" type="slidenum">
+              <a:rPr lang="en-US">
+                <a:solidFill>
+                  <a:schemeClr val="bg1"/>
+                </a:solidFill>
+              </a:rPr>
+              <a:pPr>
+                <a:spcAft>
+                  <a:spcPts val="600"/>
+                </a:spcAft>
+              </a:pPr>
+              <a:t>25</a:t>
+            </a:fld>
+            <a:endParaRPr lang="en-US">
+              <a:solidFill>
+                <a:schemeClr val="bg1"/>
+              </a:solidFill>
+            </a:endParaRPr>
+          </a:p>
+        </p:txBody>
+      </p:sp>
+      <p:graphicFrame>
+        <p:nvGraphicFramePr>
+          <p:cNvPr id="26" name="TextBox 4"/>
+          <p:cNvGraphicFramePr/>
+          <p:nvPr>
+            <p:extLst/>
+          </p:nvPr>
+        </p:nvGraphicFramePr>
+        <p:xfrm>
+          <a:off x="685800" y="2878138"/>
+          <a:ext cx="10820400" cy="3340100"/>
+        </p:xfrm>
+        <a:graphic>
+          <a:graphicData uri="http://schemas.openxmlformats.org/drawingml/2006/diagram">
+            <dgm:relIds xmlns:dgm="http://schemas.openxmlformats.org/drawingml/2006/diagram" xmlns:r="http://schemas.openxmlformats.org/officeDocument/2006/relationships" r:dm="rId2" r:lo="rId3" r:qs="rId4" r:cs="rId5"/>
+          </a:graphicData>
+        </a:graphic>
+      </p:graphicFrame>
+      <p:sp>
+        <p:nvSpPr>
+          <p:cNvPr id="6" name="Footer Placeholder 5">
+            <a:extLst>
+              <a:ext uri="{FF2B5EF4-FFF2-40B4-BE49-F238E27FC236}">
+                <a16:creationId xmlns:a16="http://schemas.microsoft.com/office/drawing/2014/main" id="{0C54900B-D65B-44F0-8D87-996C8332FBC5}"/>
+              </a:ext>
+            </a:extLst>
+          </p:cNvPr>
+          <p:cNvSpPr>
+            <a:spLocks noGrp="1"/>
+          </p:cNvSpPr>
+          <p:nvPr>
+            <p:ph type="ftr" sz="quarter" idx="11"/>
+          </p:nvPr>
+        </p:nvSpPr>
+        <p:spPr/>
+        <p:txBody>
+          <a:bodyPr/>
+          <a:lstStyle/>
+          <a:p>
+            <a:r>
+              <a:rPr lang="es-ES"/>
+              <a:t>Sistema de adquisición, filtrado y Tratamiento digital de una señal acústica.</a:t>
+            </a:r>
+            <a:endParaRPr lang="en-US" dirty="0"/>
+          </a:p>
+        </p:txBody>
+      </p:sp>
+      <p:sp>
+        <p:nvSpPr>
+          <p:cNvPr id="8" name="Circle: Hollow 7">
+            <a:extLst>
+              <a:ext uri="{FF2B5EF4-FFF2-40B4-BE49-F238E27FC236}">
+                <a16:creationId xmlns:a16="http://schemas.microsoft.com/office/drawing/2014/main" id="{9E342BC0-F57E-4E9C-9D4F-B40382A60493}"/>
+              </a:ext>
+            </a:extLst>
+          </p:cNvPr>
+          <p:cNvSpPr/>
+          <p:nvPr/>
+        </p:nvSpPr>
+        <p:spPr>
+          <a:xfrm>
+            <a:off x="260059" y="3395838"/>
+            <a:ext cx="268448" cy="264559"/>
+          </a:xfrm>
+          <a:prstGeom prst="donut">
+            <a:avLst/>
+          </a:prstGeom>
+        </p:spPr>
+        <p:style>
+          <a:lnRef idx="2">
+            <a:schemeClr val="accent1">
+              <a:shade val="50000"/>
+            </a:schemeClr>
+          </a:lnRef>
+          <a:fillRef idx="1">
+            <a:schemeClr val="accent1"/>
+          </a:fillRef>
+          <a:effectRef idx="0">
+            <a:schemeClr val="accent1"/>
+          </a:effectRef>
+          <a:fontRef idx="minor">
+            <a:schemeClr val="lt1"/>
+          </a:fontRef>
+        </p:style>
+        <p:txBody>
+          <a:bodyPr rtlCol="0" anchor="ctr"/>
+          <a:lstStyle/>
+          <a:p>
+            <a:pPr algn="ctr"/>
+            <a:endParaRPr lang="en-US">
+              <a:solidFill>
+                <a:schemeClr val="tx1"/>
+              </a:solidFill>
+            </a:endParaRPr>
+          </a:p>
+        </p:txBody>
+      </p:sp>
+      <p:sp>
+        <p:nvSpPr>
+          <p:cNvPr id="11" name="Arrow: Left 10">
+            <a:extLst>
+              <a:ext uri="{FF2B5EF4-FFF2-40B4-BE49-F238E27FC236}">
+                <a16:creationId xmlns:a16="http://schemas.microsoft.com/office/drawing/2014/main" id="{ACF7D011-AD33-4AC2-9BE7-C51194B3E87D}"/>
+              </a:ext>
+            </a:extLst>
+          </p:cNvPr>
+          <p:cNvSpPr/>
+          <p:nvPr/>
+        </p:nvSpPr>
+        <p:spPr>
+          <a:xfrm rot="10800000">
+            <a:off x="216017" y="5061347"/>
+            <a:ext cx="347095" cy="298248"/>
+          </a:xfrm>
+          <a:prstGeom prst="leftArrow">
+            <a:avLst/>
+          </a:prstGeom>
+        </p:spPr>
+        <p:style>
+          <a:lnRef idx="2">
+            <a:schemeClr val="accent1">
+              <a:shade val="50000"/>
+            </a:schemeClr>
+          </a:lnRef>
+          <a:fillRef idx="1">
+            <a:schemeClr val="accent1"/>
+          </a:fillRef>
+          <a:effectRef idx="0">
+            <a:schemeClr val="accent1"/>
+          </a:effectRef>
+          <a:fontRef idx="minor">
+            <a:schemeClr val="lt1"/>
+          </a:fontRef>
+        </p:style>
+        <p:txBody>
+          <a:bodyPr rtlCol="0" anchor="ctr"/>
+          <a:lstStyle/>
+          <a:p>
+            <a:pPr algn="ctr"/>
+            <a:endParaRPr lang="en-US"/>
+          </a:p>
+        </p:txBody>
+      </p:sp>
+      <p:sp>
+        <p:nvSpPr>
+          <p:cNvPr id="13" name="Circle: Hollow 12">
+            <a:extLst>
+              <a:ext uri="{FF2B5EF4-FFF2-40B4-BE49-F238E27FC236}">
+                <a16:creationId xmlns:a16="http://schemas.microsoft.com/office/drawing/2014/main" id="{0B1FBAC1-451B-4037-9390-24D6B4F283C7}"/>
+              </a:ext>
+            </a:extLst>
+          </p:cNvPr>
+          <p:cNvSpPr/>
+          <p:nvPr/>
+        </p:nvSpPr>
+        <p:spPr>
+          <a:xfrm>
+            <a:off x="260059" y="2990922"/>
+            <a:ext cx="268448" cy="264559"/>
+          </a:xfrm>
+          <a:prstGeom prst="donut">
+            <a:avLst/>
+          </a:prstGeom>
+        </p:spPr>
+        <p:style>
+          <a:lnRef idx="2">
+            <a:schemeClr val="accent1">
+              <a:shade val="50000"/>
+            </a:schemeClr>
+          </a:lnRef>
+          <a:fillRef idx="1">
+            <a:schemeClr val="accent1"/>
+          </a:fillRef>
+          <a:effectRef idx="0">
+            <a:schemeClr val="accent1"/>
+          </a:effectRef>
+          <a:fontRef idx="minor">
+            <a:schemeClr val="lt1"/>
+          </a:fontRef>
+        </p:style>
+        <p:txBody>
+          <a:bodyPr rtlCol="0" anchor="ctr"/>
+          <a:lstStyle/>
+          <a:p>
+            <a:pPr algn="ctr"/>
+            <a:endParaRPr lang="en-US">
+              <a:solidFill>
+                <a:schemeClr val="tx1"/>
+              </a:solidFill>
+            </a:endParaRPr>
+          </a:p>
+        </p:txBody>
+      </p:sp>
+      <p:sp>
+        <p:nvSpPr>
+          <p:cNvPr id="14" name="Circle: Hollow 13">
+            <a:extLst>
+              <a:ext uri="{FF2B5EF4-FFF2-40B4-BE49-F238E27FC236}">
+                <a16:creationId xmlns:a16="http://schemas.microsoft.com/office/drawing/2014/main" id="{0DA1F402-EFB8-4F6F-A272-99DFBF96B5CA}"/>
+              </a:ext>
+            </a:extLst>
+          </p:cNvPr>
+          <p:cNvSpPr/>
+          <p:nvPr/>
+        </p:nvSpPr>
+        <p:spPr>
+          <a:xfrm>
+            <a:off x="255341" y="3800754"/>
+            <a:ext cx="268448" cy="264559"/>
+          </a:xfrm>
+          <a:prstGeom prst="donut">
+            <a:avLst/>
+          </a:prstGeom>
+        </p:spPr>
+        <p:style>
+          <a:lnRef idx="2">
+            <a:schemeClr val="accent1">
+              <a:shade val="50000"/>
+            </a:schemeClr>
+          </a:lnRef>
+          <a:fillRef idx="1">
+            <a:schemeClr val="accent1"/>
+          </a:fillRef>
+          <a:effectRef idx="0">
+            <a:schemeClr val="accent1"/>
+          </a:effectRef>
+          <a:fontRef idx="minor">
+            <a:schemeClr val="lt1"/>
+          </a:fontRef>
+        </p:style>
+        <p:txBody>
+          <a:bodyPr rtlCol="0" anchor="ctr"/>
+          <a:lstStyle/>
+          <a:p>
+            <a:pPr algn="ctr"/>
+            <a:endParaRPr lang="en-US">
+              <a:solidFill>
+                <a:schemeClr val="tx1"/>
+              </a:solidFill>
+            </a:endParaRPr>
+          </a:p>
+        </p:txBody>
+      </p:sp>
+      <p:sp>
+        <p:nvSpPr>
+          <p:cNvPr id="12" name="Circle: Hollow 11">
+            <a:extLst>
+              <a:ext uri="{FF2B5EF4-FFF2-40B4-BE49-F238E27FC236}">
+                <a16:creationId xmlns:a16="http://schemas.microsoft.com/office/drawing/2014/main" id="{4FA5F234-5468-4C3A-8E71-F2670898C5E7}"/>
+              </a:ext>
+            </a:extLst>
+          </p:cNvPr>
+          <p:cNvSpPr/>
+          <p:nvPr/>
+        </p:nvSpPr>
+        <p:spPr>
+          <a:xfrm>
+            <a:off x="255341" y="4229948"/>
+            <a:ext cx="268448" cy="264559"/>
+          </a:xfrm>
+          <a:prstGeom prst="donut">
+            <a:avLst/>
+          </a:prstGeom>
+        </p:spPr>
+        <p:style>
+          <a:lnRef idx="2">
+            <a:schemeClr val="accent1">
+              <a:shade val="50000"/>
+            </a:schemeClr>
+          </a:lnRef>
+          <a:fillRef idx="1">
+            <a:schemeClr val="accent1"/>
+          </a:fillRef>
+          <a:effectRef idx="0">
+            <a:schemeClr val="accent1"/>
+          </a:effectRef>
+          <a:fontRef idx="minor">
+            <a:schemeClr val="lt1"/>
+          </a:fontRef>
+        </p:style>
+        <p:txBody>
+          <a:bodyPr rtlCol="0" anchor="ctr"/>
+          <a:lstStyle/>
+          <a:p>
+            <a:pPr algn="ctr"/>
+            <a:endParaRPr lang="en-US">
+              <a:solidFill>
+                <a:schemeClr val="tx1"/>
+              </a:solidFill>
+            </a:endParaRPr>
+          </a:p>
+        </p:txBody>
+      </p:sp>
+      <p:sp>
+        <p:nvSpPr>
+          <p:cNvPr id="15" name="Circle: Hollow 14">
+            <a:extLst>
+              <a:ext uri="{FF2B5EF4-FFF2-40B4-BE49-F238E27FC236}">
+                <a16:creationId xmlns:a16="http://schemas.microsoft.com/office/drawing/2014/main" id="{3924E664-9BF3-448A-9E80-CCA8F76F1B8C}"/>
+              </a:ext>
+            </a:extLst>
+          </p:cNvPr>
+          <p:cNvSpPr/>
+          <p:nvPr/>
+        </p:nvSpPr>
+        <p:spPr>
+          <a:xfrm>
+            <a:off x="255341" y="4632153"/>
+            <a:ext cx="268448" cy="264559"/>
+          </a:xfrm>
+          <a:prstGeom prst="donut">
+            <a:avLst/>
+          </a:prstGeom>
+        </p:spPr>
+        <p:style>
+          <a:lnRef idx="2">
+            <a:schemeClr val="accent1">
+              <a:shade val="50000"/>
+            </a:schemeClr>
+          </a:lnRef>
+          <a:fillRef idx="1">
+            <a:schemeClr val="accent1"/>
+          </a:fillRef>
+          <a:effectRef idx="0">
+            <a:schemeClr val="accent1"/>
+          </a:effectRef>
+          <a:fontRef idx="minor">
+            <a:schemeClr val="lt1"/>
+          </a:fontRef>
+        </p:style>
+        <p:txBody>
+          <a:bodyPr rtlCol="0" anchor="ctr"/>
+          <a:lstStyle/>
+          <a:p>
+            <a:pPr algn="ctr"/>
+            <a:endParaRPr lang="en-US">
+              <a:solidFill>
+                <a:schemeClr val="tx1"/>
+              </a:solidFill>
+            </a:endParaRPr>
+          </a:p>
+        </p:txBody>
+      </p:sp>
+    </p:spTree>
+    <p:extLst>
+      <p:ext uri="{BB962C8B-B14F-4D97-AF65-F5344CB8AC3E}">
+        <p14:creationId xmlns:p14="http://schemas.microsoft.com/office/powerpoint/2010/main" val="1278696046"/>
+      </p:ext>
+    </p:extLst>
+  </p:cSld>
+  <p:clrMapOvr>
+    <a:masterClrMapping/>
+  </p:clrMapOvr>
+  <mc:AlternateContent xmlns:mc="http://schemas.openxmlformats.org/markup-compatibility/2006" xmlns:p14="http://schemas.microsoft.com/office/powerpoint/2010/main">
+    <mc:Choice Requires="p14">
+      <p:transition spd="med" p14:dur="700">
+        <p:fade/>
+      </p:transition>
+    </mc:Choice>
+    <mc:Fallback xmlns="">
+      <p:transition spd="med">
+        <p:fade/>
+      </p:transition>
+    </mc:Fallback>
+  </mc:AlternateContent>
+</p:sld>
+</file>
+
+<file path=ppt/slides/slide26.xml><?xml version="1.0" encoding="utf-8"?>
+<p:sld xmlns:a="http://schemas.openxmlformats.org/drawingml/2006/main" xmlns:r="http://schemas.openxmlformats.org/officeDocument/2006/relationships" xmlns:p="http://schemas.openxmlformats.org/presentationml/2006/main">
+  <p:cSld>
+    <p:spTree>
+      <p:nvGrpSpPr>
+        <p:cNvPr id="1" name=""/>
+        <p:cNvGrpSpPr/>
+        <p:nvPr/>
+      </p:nvGrpSpPr>
+      <p:grpSpPr>
+        <a:xfrm>
+          <a:off x="0" y="0"/>
+          <a:ext cx="0" cy="0"/>
+          <a:chOff x="0" y="0"/>
+          <a:chExt cx="0" cy="0"/>
+        </a:xfrm>
+      </p:grpSpPr>
+      <p:sp>
+        <p:nvSpPr>
+          <p:cNvPr id="2" name="Title 1">
+            <a:extLst>
+              <a:ext uri="{FF2B5EF4-FFF2-40B4-BE49-F238E27FC236}">
+                <a16:creationId xmlns:a16="http://schemas.microsoft.com/office/drawing/2014/main" id="{A8D9B15F-243A-46AB-8E11-D0C0441C7E7A}"/>
+              </a:ext>
+            </a:extLst>
+          </p:cNvPr>
+          <p:cNvSpPr>
+            <a:spLocks noGrp="1"/>
+          </p:cNvSpPr>
+          <p:nvPr>
+            <p:ph type="title"/>
+          </p:nvPr>
+        </p:nvSpPr>
+        <p:spPr>
+          <a:xfrm>
+            <a:off x="2541864" y="764373"/>
+            <a:ext cx="8964336" cy="1293028"/>
+          </a:xfrm>
+        </p:spPr>
+        <p:txBody>
+          <a:bodyPr/>
+          <a:lstStyle/>
+          <a:p>
+            <a:r>
+              <a:rPr lang="en-US" cap="small" dirty="0" err="1"/>
+              <a:t>Mejoras</a:t>
+            </a:r>
+            <a:endParaRPr lang="en-US" cap="small" dirty="0"/>
+          </a:p>
+        </p:txBody>
+      </p:sp>
+      <p:sp>
+        <p:nvSpPr>
+          <p:cNvPr id="3" name="Date Placeholder 2">
+            <a:extLst>
+              <a:ext uri="{FF2B5EF4-FFF2-40B4-BE49-F238E27FC236}">
+                <a16:creationId xmlns:a16="http://schemas.microsoft.com/office/drawing/2014/main" id="{A290E9DE-389C-4E44-B46B-D764E57D5027}"/>
+              </a:ext>
+            </a:extLst>
+          </p:cNvPr>
+          <p:cNvSpPr>
+            <a:spLocks noGrp="1"/>
+          </p:cNvSpPr>
+          <p:nvPr>
+            <p:ph type="dt" sz="half" idx="10"/>
+          </p:nvPr>
+        </p:nvSpPr>
+        <p:spPr/>
+        <p:txBody>
+          <a:bodyPr/>
+          <a:lstStyle/>
+          <a:p>
+            <a:fld id="{E0855CDD-93BC-47DE-BEFF-59319602E3E3}" type="datetime1">
+              <a:rPr lang="es-ES" smtClean="0"/>
+              <a:t>27/01/2018</a:t>
+            </a:fld>
+            <a:endParaRPr lang="en-US" dirty="0"/>
+          </a:p>
+        </p:txBody>
+      </p:sp>
+      <p:sp>
+        <p:nvSpPr>
+          <p:cNvPr id="4" name="Footer Placeholder 3">
+            <a:extLst>
+              <a:ext uri="{FF2B5EF4-FFF2-40B4-BE49-F238E27FC236}">
+                <a16:creationId xmlns:a16="http://schemas.microsoft.com/office/drawing/2014/main" id="{5CB136F4-308C-4782-813D-6F33D34037A5}"/>
+              </a:ext>
+            </a:extLst>
+          </p:cNvPr>
+          <p:cNvSpPr>
+            <a:spLocks noGrp="1"/>
+          </p:cNvSpPr>
+          <p:nvPr>
+            <p:ph type="ftr" sz="quarter" idx="11"/>
+          </p:nvPr>
+        </p:nvSpPr>
+        <p:spPr/>
+        <p:txBody>
+          <a:bodyPr/>
+          <a:lstStyle/>
+          <a:p>
+            <a:r>
+              <a:rPr lang="es-ES"/>
+              <a:t>Sistema de adquisición, filtrado y Tratamiento digital de una señal acústica.</a:t>
+            </a:r>
+            <a:endParaRPr lang="en-US" dirty="0"/>
+          </a:p>
+        </p:txBody>
+      </p:sp>
+      <p:sp>
+        <p:nvSpPr>
+          <p:cNvPr id="5" name="Slide Number Placeholder 4">
+            <a:extLst>
+              <a:ext uri="{FF2B5EF4-FFF2-40B4-BE49-F238E27FC236}">
+                <a16:creationId xmlns:a16="http://schemas.microsoft.com/office/drawing/2014/main" id="{96F3F281-ECE4-45D9-88BB-CF25F86AED26}"/>
+              </a:ext>
+            </a:extLst>
+          </p:cNvPr>
+          <p:cNvSpPr>
+            <a:spLocks noGrp="1"/>
+          </p:cNvSpPr>
+          <p:nvPr>
+            <p:ph type="sldNum" sz="quarter" idx="12"/>
+          </p:nvPr>
+        </p:nvSpPr>
+        <p:spPr/>
+        <p:txBody>
+          <a:bodyPr/>
+          <a:lstStyle/>
+          <a:p>
+            <a:fld id="{6D22F896-40B5-4ADD-8801-0D06FADFA095}" type="slidenum">
+              <a:rPr lang="en-US" smtClean="0"/>
+              <a:t>26</a:t>
+            </a:fld>
+            <a:endParaRPr lang="en-US" dirty="0"/>
+          </a:p>
+        </p:txBody>
+      </p:sp>
+    </p:spTree>
+    <p:extLst>
+      <p:ext uri="{BB962C8B-B14F-4D97-AF65-F5344CB8AC3E}">
+        <p14:creationId xmlns:p14="http://schemas.microsoft.com/office/powerpoint/2010/main" val="414235850"/>
+      </p:ext>
+    </p:extLst>
+  </p:cSld>
+  <p:clrMapOvr>
+    <a:masterClrMapping/>
+  </p:clrMapOvr>
+</p:sld>
+</file>
+
+<file path=ppt/slides/slide27.xml><?xml version="1.0" encoding="utf-8"?>
+<p:sld xmlns:a="http://schemas.openxmlformats.org/drawingml/2006/main" xmlns:r="http://schemas.openxmlformats.org/officeDocument/2006/relationships" xmlns:p="http://schemas.openxmlformats.org/presentationml/2006/main">
+  <p:cSld>
+    <p:spTree>
+      <p:nvGrpSpPr>
+        <p:cNvPr id="1" name=""/>
+        <p:cNvGrpSpPr/>
+        <p:nvPr/>
+      </p:nvGrpSpPr>
+      <p:grpSpPr>
+        <a:xfrm>
+          <a:off x="0" y="0"/>
+          <a:ext cx="0" cy="0"/>
+          <a:chOff x="0" y="0"/>
+          <a:chExt cx="0" cy="0"/>
+        </a:xfrm>
+      </p:grpSpPr>
+      <p:sp>
+        <p:nvSpPr>
+          <p:cNvPr id="2" name="Title 1">
+            <a:extLst>
+              <a:ext uri="{FF2B5EF4-FFF2-40B4-BE49-F238E27FC236}">
+                <a16:creationId xmlns:a16="http://schemas.microsoft.com/office/drawing/2014/main" id="{A8D9B15F-243A-46AB-8E11-D0C0441C7E7A}"/>
+              </a:ext>
+            </a:extLst>
+          </p:cNvPr>
+          <p:cNvSpPr>
+            <a:spLocks noGrp="1"/>
+          </p:cNvSpPr>
+          <p:nvPr>
+            <p:ph type="title"/>
+          </p:nvPr>
+        </p:nvSpPr>
+        <p:spPr>
+          <a:xfrm>
+            <a:off x="2541864" y="764373"/>
+            <a:ext cx="8964336" cy="1293028"/>
+          </a:xfrm>
+        </p:spPr>
+        <p:txBody>
+          <a:bodyPr/>
+          <a:lstStyle/>
+          <a:p>
+            <a:r>
+              <a:rPr lang="en-US" cap="small" dirty="0" err="1"/>
+              <a:t>Conclusiones</a:t>
+            </a:r>
+            <a:endParaRPr lang="en-US" cap="small" dirty="0"/>
+          </a:p>
+        </p:txBody>
+      </p:sp>
+      <p:sp>
+        <p:nvSpPr>
+          <p:cNvPr id="3" name="Date Placeholder 2">
+            <a:extLst>
+              <a:ext uri="{FF2B5EF4-FFF2-40B4-BE49-F238E27FC236}">
+                <a16:creationId xmlns:a16="http://schemas.microsoft.com/office/drawing/2014/main" id="{A290E9DE-389C-4E44-B46B-D764E57D5027}"/>
+              </a:ext>
+            </a:extLst>
+          </p:cNvPr>
+          <p:cNvSpPr>
+            <a:spLocks noGrp="1"/>
+          </p:cNvSpPr>
+          <p:nvPr>
+            <p:ph type="dt" sz="half" idx="10"/>
+          </p:nvPr>
+        </p:nvSpPr>
+        <p:spPr/>
+        <p:txBody>
+          <a:bodyPr/>
+          <a:lstStyle/>
+          <a:p>
+            <a:fld id="{E0855CDD-93BC-47DE-BEFF-59319602E3E3}" type="datetime1">
+              <a:rPr lang="es-ES" smtClean="0"/>
+              <a:t>27/01/2018</a:t>
+            </a:fld>
+            <a:endParaRPr lang="en-US" dirty="0"/>
+          </a:p>
+        </p:txBody>
+      </p:sp>
+      <p:sp>
+        <p:nvSpPr>
+          <p:cNvPr id="4" name="Footer Placeholder 3">
+            <a:extLst>
+              <a:ext uri="{FF2B5EF4-FFF2-40B4-BE49-F238E27FC236}">
+                <a16:creationId xmlns:a16="http://schemas.microsoft.com/office/drawing/2014/main" id="{5CB136F4-308C-4782-813D-6F33D34037A5}"/>
+              </a:ext>
+            </a:extLst>
+          </p:cNvPr>
+          <p:cNvSpPr>
+            <a:spLocks noGrp="1"/>
+          </p:cNvSpPr>
+          <p:nvPr>
+            <p:ph type="ftr" sz="quarter" idx="11"/>
+          </p:nvPr>
+        </p:nvSpPr>
+        <p:spPr/>
+        <p:txBody>
+          <a:bodyPr/>
+          <a:lstStyle/>
+          <a:p>
+            <a:r>
+              <a:rPr lang="es-ES"/>
+              <a:t>Sistema de adquisición, filtrado y Tratamiento digital de una señal acústica.</a:t>
+            </a:r>
+            <a:endParaRPr lang="en-US" dirty="0"/>
+          </a:p>
+        </p:txBody>
+      </p:sp>
+      <p:sp>
+        <p:nvSpPr>
+          <p:cNvPr id="5" name="Slide Number Placeholder 4">
+            <a:extLst>
+              <a:ext uri="{FF2B5EF4-FFF2-40B4-BE49-F238E27FC236}">
+                <a16:creationId xmlns:a16="http://schemas.microsoft.com/office/drawing/2014/main" id="{96F3F281-ECE4-45D9-88BB-CF25F86AED26}"/>
+              </a:ext>
+            </a:extLst>
+          </p:cNvPr>
+          <p:cNvSpPr>
+            <a:spLocks noGrp="1"/>
+          </p:cNvSpPr>
+          <p:nvPr>
+            <p:ph type="sldNum" sz="quarter" idx="12"/>
+          </p:nvPr>
+        </p:nvSpPr>
+        <p:spPr/>
+        <p:txBody>
+          <a:bodyPr/>
+          <a:lstStyle/>
+          <a:p>
+            <a:fld id="{6D22F896-40B5-4ADD-8801-0D06FADFA095}" type="slidenum">
+              <a:rPr lang="en-US" smtClean="0"/>
+              <a:t>27</a:t>
+            </a:fld>
+            <a:endParaRPr lang="en-US" dirty="0"/>
+          </a:p>
+        </p:txBody>
+      </p:sp>
+    </p:spTree>
+    <p:extLst>
+      <p:ext uri="{BB962C8B-B14F-4D97-AF65-F5344CB8AC3E}">
+        <p14:creationId xmlns:p14="http://schemas.microsoft.com/office/powerpoint/2010/main" val="1273444518"/>
+      </p:ext>
+    </p:extLst>
+  </p:cSld>
+  <p:clrMapOvr>
+    <a:masterClrMapping/>
+  </p:clrMapOvr>
+</p:sld>
+</file>
+
+<file path=ppt/slides/slide28.xml><?xml version="1.0" encoding="utf-8"?>
+<p:sld xmlns:a="http://schemas.openxmlformats.org/drawingml/2006/main" xmlns:r="http://schemas.openxmlformats.org/officeDocument/2006/relationships" xmlns:p="http://schemas.openxmlformats.org/presentationml/2006/main">
+  <p:cSld>
+    <p:spTree>
+      <p:nvGrpSpPr>
+        <p:cNvPr id="1" name=""/>
+        <p:cNvGrpSpPr/>
+        <p:nvPr/>
+      </p:nvGrpSpPr>
+      <p:grpSpPr>
+        <a:xfrm>
+          <a:off x="0" y="0"/>
+          <a:ext cx="0" cy="0"/>
+          <a:chOff x="0" y="0"/>
+          <a:chExt cx="0" cy="0"/>
+        </a:xfrm>
+      </p:grpSpPr>
+      <p:sp>
+        <p:nvSpPr>
+          <p:cNvPr id="2" name="Title 1">
+            <a:extLst>
+              <a:ext uri="{FF2B5EF4-FFF2-40B4-BE49-F238E27FC236}">
+                <a16:creationId xmlns:a16="http://schemas.microsoft.com/office/drawing/2014/main" id="{A8D9B15F-243A-46AB-8E11-D0C0441C7E7A}"/>
+              </a:ext>
+            </a:extLst>
+          </p:cNvPr>
+          <p:cNvSpPr>
+            <a:spLocks noGrp="1"/>
+          </p:cNvSpPr>
+          <p:nvPr>
+            <p:ph type="title"/>
+          </p:nvPr>
+        </p:nvSpPr>
+        <p:spPr>
+          <a:xfrm>
+            <a:off x="2541864" y="764373"/>
+            <a:ext cx="8964336" cy="1293028"/>
+          </a:xfrm>
+        </p:spPr>
+        <p:txBody>
+          <a:bodyPr/>
+          <a:lstStyle/>
+          <a:p>
+            <a:r>
+              <a:rPr lang="en-US" cap="small" dirty="0" err="1"/>
+              <a:t>Bibliografía</a:t>
+            </a:r>
+            <a:endParaRPr lang="en-US" cap="small" dirty="0"/>
+          </a:p>
+        </p:txBody>
+      </p:sp>
+      <p:sp>
+        <p:nvSpPr>
+          <p:cNvPr id="3" name="Date Placeholder 2">
+            <a:extLst>
+              <a:ext uri="{FF2B5EF4-FFF2-40B4-BE49-F238E27FC236}">
+                <a16:creationId xmlns:a16="http://schemas.microsoft.com/office/drawing/2014/main" id="{A290E9DE-389C-4E44-B46B-D764E57D5027}"/>
+              </a:ext>
+            </a:extLst>
+          </p:cNvPr>
+          <p:cNvSpPr>
+            <a:spLocks noGrp="1"/>
+          </p:cNvSpPr>
+          <p:nvPr>
+            <p:ph type="dt" sz="half" idx="10"/>
+          </p:nvPr>
+        </p:nvSpPr>
+        <p:spPr/>
+        <p:txBody>
+          <a:bodyPr/>
+          <a:lstStyle/>
+          <a:p>
+            <a:fld id="{E0855CDD-93BC-47DE-BEFF-59319602E3E3}" type="datetime1">
+              <a:rPr lang="es-ES" smtClean="0"/>
+              <a:t>27/01/2018</a:t>
+            </a:fld>
+            <a:endParaRPr lang="en-US" dirty="0"/>
+          </a:p>
+        </p:txBody>
+      </p:sp>
+      <p:sp>
+        <p:nvSpPr>
+          <p:cNvPr id="4" name="Footer Placeholder 3">
+            <a:extLst>
+              <a:ext uri="{FF2B5EF4-FFF2-40B4-BE49-F238E27FC236}">
+                <a16:creationId xmlns:a16="http://schemas.microsoft.com/office/drawing/2014/main" id="{5CB136F4-308C-4782-813D-6F33D34037A5}"/>
+              </a:ext>
+            </a:extLst>
+          </p:cNvPr>
+          <p:cNvSpPr>
+            <a:spLocks noGrp="1"/>
+          </p:cNvSpPr>
+          <p:nvPr>
+            <p:ph type="ftr" sz="quarter" idx="11"/>
+          </p:nvPr>
+        </p:nvSpPr>
+        <p:spPr/>
+        <p:txBody>
+          <a:bodyPr/>
+          <a:lstStyle/>
+          <a:p>
+            <a:r>
+              <a:rPr lang="es-ES"/>
+              <a:t>Sistema de adquisición, filtrado y Tratamiento digital de una señal acústica.</a:t>
+            </a:r>
+            <a:endParaRPr lang="en-US" dirty="0"/>
+          </a:p>
+        </p:txBody>
+      </p:sp>
+      <p:sp>
+        <p:nvSpPr>
+          <p:cNvPr id="5" name="Slide Number Placeholder 4">
+            <a:extLst>
+              <a:ext uri="{FF2B5EF4-FFF2-40B4-BE49-F238E27FC236}">
+                <a16:creationId xmlns:a16="http://schemas.microsoft.com/office/drawing/2014/main" id="{96F3F281-ECE4-45D9-88BB-CF25F86AED26}"/>
+              </a:ext>
+            </a:extLst>
+          </p:cNvPr>
+          <p:cNvSpPr>
+            <a:spLocks noGrp="1"/>
+          </p:cNvSpPr>
+          <p:nvPr>
+            <p:ph type="sldNum" sz="quarter" idx="12"/>
+          </p:nvPr>
+        </p:nvSpPr>
+        <p:spPr/>
+        <p:txBody>
+          <a:bodyPr/>
+          <a:lstStyle/>
+          <a:p>
+            <a:fld id="{6D22F896-40B5-4ADD-8801-0D06FADFA095}" type="slidenum">
+              <a:rPr lang="en-US" smtClean="0"/>
+              <a:t>28</a:t>
+            </a:fld>
+            <a:endParaRPr lang="en-US" dirty="0"/>
+          </a:p>
+        </p:txBody>
+      </p:sp>
+      <p:sp>
+        <p:nvSpPr>
+          <p:cNvPr id="6" name="TextBox 5">
+            <a:extLst>
+              <a:ext uri="{FF2B5EF4-FFF2-40B4-BE49-F238E27FC236}">
+                <a16:creationId xmlns:a16="http://schemas.microsoft.com/office/drawing/2014/main" id="{905FC345-BE35-449A-ABB5-D2589C635BB4}"/>
+              </a:ext>
+            </a:extLst>
+          </p:cNvPr>
+          <p:cNvSpPr txBox="1"/>
+          <p:nvPr/>
+        </p:nvSpPr>
+        <p:spPr>
+          <a:xfrm>
+            <a:off x="822121" y="1912690"/>
+            <a:ext cx="10684079" cy="2585323"/>
+          </a:xfrm>
+          <a:prstGeom prst="rect">
+            <a:avLst/>
+          </a:prstGeom>
+          <a:noFill/>
+        </p:spPr>
+        <p:txBody>
+          <a:bodyPr wrap="square" rtlCol="0">
+            <a:spAutoFit/>
+          </a:bodyPr>
+          <a:lstStyle/>
+          <a:p>
+            <a:pPr marL="285750" indent="-285750">
+              <a:buFont typeface="Arial" panose="020B0604020202020204" pitchFamily="34" charset="0"/>
+              <a:buChar char="•"/>
+            </a:pPr>
+            <a:r>
+              <a:rPr lang="en-US" dirty="0">
+                <a:hlinkClick r:id="rId2"/>
+              </a:rPr>
+              <a:t>http://culturizando.com/la-historia-de-la-primera-guitarra-electrica/</a:t>
+            </a:r>
+            <a:r>
+              <a:rPr lang="en-US" dirty="0"/>
+              <a:t> – </a:t>
+            </a:r>
+            <a:r>
+              <a:rPr lang="en-US" dirty="0" err="1"/>
+              <a:t>Figura</a:t>
+            </a:r>
+            <a:r>
+              <a:rPr lang="en-US" dirty="0"/>
+              <a:t> </a:t>
+            </a:r>
+            <a:r>
+              <a:rPr lang="en-US" dirty="0" err="1"/>
+              <a:t>primera</a:t>
+            </a:r>
+            <a:r>
+              <a:rPr lang="en-US" dirty="0"/>
+              <a:t> </a:t>
+            </a:r>
+            <a:r>
+              <a:rPr lang="en-US" dirty="0" err="1"/>
+              <a:t>guitarra</a:t>
+            </a:r>
+            <a:r>
+              <a:rPr lang="en-US" dirty="0"/>
+              <a:t> </a:t>
+            </a:r>
+            <a:r>
+              <a:rPr lang="en-US" dirty="0" err="1"/>
+              <a:t>eléctrica</a:t>
+            </a:r>
+            <a:r>
+              <a:rPr lang="en-US" dirty="0"/>
+              <a:t>.</a:t>
+            </a:r>
+          </a:p>
+          <a:p>
+            <a:pPr marL="285750" indent="-285750">
+              <a:buFont typeface="Arial" panose="020B0604020202020204" pitchFamily="34" charset="0"/>
+              <a:buChar char="•"/>
+            </a:pPr>
+            <a:r>
+              <a:rPr lang="en-US" dirty="0">
+                <a:hlinkClick r:id="rId2"/>
+              </a:rPr>
+              <a:t>https://duckduckgo.com/images </a:t>
+            </a:r>
+            <a:r>
+              <a:rPr lang="en-US" dirty="0"/>
+              <a:t>– </a:t>
+            </a:r>
+            <a:r>
+              <a:rPr lang="en-US" dirty="0" err="1"/>
+              <a:t>Figuras</a:t>
+            </a:r>
+            <a:r>
+              <a:rPr lang="en-US" dirty="0"/>
+              <a:t>.</a:t>
+            </a:r>
+          </a:p>
+          <a:p>
+            <a:pPr marL="285750" indent="-285750">
+              <a:buFont typeface="Arial" panose="020B0604020202020204" pitchFamily="34" charset="0"/>
+              <a:buChar char="•"/>
+            </a:pPr>
+            <a:endParaRPr lang="en-US" dirty="0">
+              <a:hlinkClick r:id="rId2"/>
+            </a:endParaRPr>
+          </a:p>
+          <a:p>
+            <a:pPr marL="285750" indent="-285750">
+              <a:buFont typeface="Arial" panose="020B0604020202020204" pitchFamily="34" charset="0"/>
+              <a:buChar char="•"/>
+            </a:pPr>
+            <a:r>
+              <a:rPr lang="en-US" dirty="0">
+                <a:hlinkClick r:id="rId2"/>
+              </a:rPr>
+              <a:t>https://commons.wikimedia.org/w/index.php?curid=5786095</a:t>
+            </a:r>
+            <a:r>
+              <a:rPr lang="en-US" dirty="0"/>
+              <a:t> – </a:t>
+            </a:r>
+            <a:r>
+              <a:rPr lang="en-US" dirty="0" err="1"/>
+              <a:t>Figura</a:t>
+            </a:r>
+            <a:r>
+              <a:rPr lang="en-US" dirty="0"/>
+              <a:t> “</a:t>
+            </a:r>
+            <a:r>
+              <a:rPr lang="en-US" i="1" dirty="0" err="1"/>
+              <a:t>Sallen&amp;Key</a:t>
+            </a:r>
+            <a:r>
+              <a:rPr lang="en-US" i="1" dirty="0"/>
+              <a:t>”  </a:t>
+            </a:r>
+            <a:r>
+              <a:rPr lang="en-US" i="1" dirty="0" err="1"/>
+              <a:t>genérico</a:t>
+            </a:r>
+            <a:r>
+              <a:rPr lang="en-US" i="1" dirty="0"/>
+              <a:t>.</a:t>
+            </a:r>
+            <a:endParaRPr lang="en-US" dirty="0"/>
+          </a:p>
+          <a:p>
+            <a:pPr marL="285750" indent="-285750">
+              <a:buFont typeface="Arial" panose="020B0604020202020204" pitchFamily="34" charset="0"/>
+              <a:buChar char="•"/>
+            </a:pPr>
+            <a:r>
+              <a:rPr lang="en-US" dirty="0">
+                <a:hlinkClick r:id="rId3"/>
+              </a:rPr>
+              <a:t>http://www.ti.com/lit/an/sloa024b/sloa024b.pdf</a:t>
+            </a:r>
+            <a:r>
+              <a:rPr lang="en-US" dirty="0"/>
+              <a:t> - </a:t>
+            </a:r>
+            <a:r>
+              <a:rPr lang="en-US" dirty="0" err="1"/>
+              <a:t>Análisis</a:t>
+            </a:r>
+            <a:r>
+              <a:rPr lang="en-US" dirty="0"/>
+              <a:t> </a:t>
+            </a:r>
+            <a:r>
+              <a:rPr lang="en-US" dirty="0" err="1"/>
+              <a:t>Filtro</a:t>
+            </a:r>
+            <a:r>
+              <a:rPr lang="en-US" dirty="0"/>
+              <a:t> “</a:t>
+            </a:r>
+            <a:r>
+              <a:rPr lang="en-US" i="1" dirty="0" err="1"/>
+              <a:t>Sallen&amp;Key</a:t>
+            </a:r>
+            <a:r>
+              <a:rPr lang="en-US" i="1" dirty="0"/>
+              <a:t>”.</a:t>
+            </a:r>
+            <a:endParaRPr lang="en-US" dirty="0"/>
+          </a:p>
+          <a:p>
+            <a:pPr marL="285750" indent="-285750">
+              <a:buFont typeface="Arial" panose="020B0604020202020204" pitchFamily="34" charset="0"/>
+              <a:buChar char="•"/>
+            </a:pPr>
+            <a:endParaRPr lang="en-US" dirty="0"/>
+          </a:p>
+          <a:p>
+            <a:pPr marL="285750" indent="-285750">
+              <a:buFont typeface="Arial" panose="020B0604020202020204" pitchFamily="34" charset="0"/>
+              <a:buChar char="•"/>
+            </a:pPr>
+            <a:endParaRPr lang="en-US" dirty="0"/>
+          </a:p>
+        </p:txBody>
+      </p:sp>
+    </p:spTree>
+    <p:extLst>
+      <p:ext uri="{BB962C8B-B14F-4D97-AF65-F5344CB8AC3E}">
+        <p14:creationId xmlns:p14="http://schemas.microsoft.com/office/powerpoint/2010/main" val="2820286773"/>
+      </p:ext>
+    </p:extLst>
+  </p:cSld>
+  <p:clrMapOvr>
+    <a:masterClrMapping/>
+  </p:clrMapOvr>
+</p:sld>
+</file>
+
+<file path=ppt/slides/slide29.xml><?xml version="1.0" encoding="utf-8"?>
+<p:sld xmlns:a="http://schemas.openxmlformats.org/drawingml/2006/main" xmlns:r="http://schemas.openxmlformats.org/officeDocument/2006/relationships" xmlns:p="http://schemas.openxmlformats.org/presentationml/2006/main">
+  <p:cSld>
+    <p:spTree>
+      <p:nvGrpSpPr>
+        <p:cNvPr id="1" name=""/>
+        <p:cNvGrpSpPr/>
+        <p:nvPr/>
+      </p:nvGrpSpPr>
+      <p:grpSpPr>
+        <a:xfrm>
+          <a:off x="0" y="0"/>
+          <a:ext cx="0" cy="0"/>
+          <a:chOff x="0" y="0"/>
+          <a:chExt cx="0" cy="0"/>
+        </a:xfrm>
+      </p:grpSpPr>
+      <p:sp>
+        <p:nvSpPr>
+          <p:cNvPr id="2" name="Title 1">
+            <a:extLst>
+              <a:ext uri="{FF2B5EF4-FFF2-40B4-BE49-F238E27FC236}">
+                <a16:creationId xmlns:a16="http://schemas.microsoft.com/office/drawing/2014/main" id="{A8D9B15F-243A-46AB-8E11-D0C0441C7E7A}"/>
+              </a:ext>
+            </a:extLst>
+          </p:cNvPr>
+          <p:cNvSpPr>
+            <a:spLocks noGrp="1"/>
+          </p:cNvSpPr>
+          <p:nvPr>
+            <p:ph type="title"/>
+          </p:nvPr>
+        </p:nvSpPr>
+        <p:spPr>
+          <a:xfrm>
+            <a:off x="3490858" y="744008"/>
+            <a:ext cx="4990412" cy="1048623"/>
+          </a:xfrm>
+        </p:spPr>
+        <p:txBody>
+          <a:bodyPr>
+            <a:normAutofit/>
+          </a:bodyPr>
+          <a:lstStyle/>
+          <a:p>
+            <a:r>
+              <a:rPr lang="en-US" sz="6000" cap="small" dirty="0"/>
+              <a:t>DEMO TIME!</a:t>
+            </a:r>
+          </a:p>
+        </p:txBody>
+      </p:sp>
+      <p:sp>
+        <p:nvSpPr>
+          <p:cNvPr id="3" name="Date Placeholder 2">
+            <a:extLst>
+              <a:ext uri="{FF2B5EF4-FFF2-40B4-BE49-F238E27FC236}">
+                <a16:creationId xmlns:a16="http://schemas.microsoft.com/office/drawing/2014/main" id="{A290E9DE-389C-4E44-B46B-D764E57D5027}"/>
+              </a:ext>
+            </a:extLst>
+          </p:cNvPr>
+          <p:cNvSpPr>
+            <a:spLocks noGrp="1"/>
+          </p:cNvSpPr>
+          <p:nvPr>
+            <p:ph type="dt" sz="half" idx="10"/>
+          </p:nvPr>
+        </p:nvSpPr>
+        <p:spPr/>
+        <p:txBody>
+          <a:bodyPr/>
+          <a:lstStyle/>
+          <a:p>
+            <a:fld id="{E0855CDD-93BC-47DE-BEFF-59319602E3E3}" type="datetime1">
+              <a:rPr lang="es-ES" smtClean="0"/>
+              <a:t>27/01/2018</a:t>
+            </a:fld>
+            <a:endParaRPr lang="en-US" dirty="0"/>
+          </a:p>
+        </p:txBody>
+      </p:sp>
+      <p:sp>
+        <p:nvSpPr>
+          <p:cNvPr id="4" name="Footer Placeholder 3">
+            <a:extLst>
+              <a:ext uri="{FF2B5EF4-FFF2-40B4-BE49-F238E27FC236}">
+                <a16:creationId xmlns:a16="http://schemas.microsoft.com/office/drawing/2014/main" id="{5CB136F4-308C-4782-813D-6F33D34037A5}"/>
+              </a:ext>
+            </a:extLst>
+          </p:cNvPr>
+          <p:cNvSpPr>
+            <a:spLocks noGrp="1"/>
+          </p:cNvSpPr>
+          <p:nvPr>
+            <p:ph type="ftr" sz="quarter" idx="11"/>
+          </p:nvPr>
+        </p:nvSpPr>
+        <p:spPr/>
+        <p:txBody>
+          <a:bodyPr/>
+          <a:lstStyle/>
+          <a:p>
+            <a:r>
+              <a:rPr lang="es-ES"/>
+              <a:t>Sistema de adquisición, filtrado y Tratamiento digital de una señal acústica.</a:t>
+            </a:r>
+            <a:endParaRPr lang="en-US" dirty="0"/>
+          </a:p>
+        </p:txBody>
+      </p:sp>
+      <p:sp>
+        <p:nvSpPr>
+          <p:cNvPr id="5" name="Slide Number Placeholder 4">
+            <a:extLst>
+              <a:ext uri="{FF2B5EF4-FFF2-40B4-BE49-F238E27FC236}">
+                <a16:creationId xmlns:a16="http://schemas.microsoft.com/office/drawing/2014/main" id="{96F3F281-ECE4-45D9-88BB-CF25F86AED26}"/>
+              </a:ext>
+            </a:extLst>
+          </p:cNvPr>
+          <p:cNvSpPr>
+            <a:spLocks noGrp="1"/>
+          </p:cNvSpPr>
+          <p:nvPr>
+            <p:ph type="sldNum" sz="quarter" idx="12"/>
+          </p:nvPr>
+        </p:nvSpPr>
+        <p:spPr/>
+        <p:txBody>
+          <a:bodyPr/>
+          <a:lstStyle/>
+          <a:p>
+            <a:fld id="{6D22F896-40B5-4ADD-8801-0D06FADFA095}" type="slidenum">
+              <a:rPr lang="en-US" smtClean="0"/>
+              <a:t>29</a:t>
             </a:fld>
             <a:endParaRPr lang="en-US" dirty="0"/>
           </a:p>
@@ -28749,165 +30573,6 @@
 </p:sld>
 </file>
 
-<file path=ppt/slides/slide23.xml><?xml version="1.0" encoding="utf-8"?>
-<p:sld xmlns:a="http://schemas.openxmlformats.org/drawingml/2006/main" xmlns:r="http://schemas.openxmlformats.org/officeDocument/2006/relationships" xmlns:p="http://schemas.openxmlformats.org/presentationml/2006/main">
-  <p:cSld>
-    <p:spTree>
-      <p:nvGrpSpPr>
-        <p:cNvPr id="1" name=""/>
-        <p:cNvGrpSpPr/>
-        <p:nvPr/>
-      </p:nvGrpSpPr>
-      <p:grpSpPr>
-        <a:xfrm>
-          <a:off x="0" y="0"/>
-          <a:ext cx="0" cy="0"/>
-          <a:chOff x="0" y="0"/>
-          <a:chExt cx="0" cy="0"/>
-        </a:xfrm>
-      </p:grpSpPr>
-      <p:sp>
-        <p:nvSpPr>
-          <p:cNvPr id="8" name="Title 7">
-            <a:extLst>
-              <a:ext uri="{FF2B5EF4-FFF2-40B4-BE49-F238E27FC236}">
-                <a16:creationId xmlns:a16="http://schemas.microsoft.com/office/drawing/2014/main" id="{E41D4263-F554-4D38-B650-01606454E29F}"/>
-              </a:ext>
-            </a:extLst>
-          </p:cNvPr>
-          <p:cNvSpPr>
-            <a:spLocks noGrp="1"/>
-          </p:cNvSpPr>
-          <p:nvPr>
-            <p:ph type="ctrTitle"/>
-          </p:nvPr>
-        </p:nvSpPr>
-        <p:spPr>
-          <a:xfrm>
-            <a:off x="1371600" y="2336651"/>
-            <a:ext cx="9448800" cy="1092349"/>
-          </a:xfrm>
-        </p:spPr>
-        <p:txBody>
-          <a:bodyPr/>
-          <a:lstStyle/>
-          <a:p>
-            <a:pPr algn="ctr"/>
-            <a:r>
-              <a:rPr lang="en-US" cap="small" dirty="0"/>
-              <a:t>¡</a:t>
-            </a:r>
-            <a:r>
-              <a:rPr lang="en-US" cap="small" dirty="0" err="1"/>
-              <a:t>Muchas</a:t>
-            </a:r>
-            <a:r>
-              <a:rPr lang="en-US" cap="small" dirty="0"/>
-              <a:t> Gracias!</a:t>
-            </a:r>
-          </a:p>
-        </p:txBody>
-      </p:sp>
-      <p:sp>
-        <p:nvSpPr>
-          <p:cNvPr id="2" name="Date Placeholder 1">
-            <a:extLst>
-              <a:ext uri="{FF2B5EF4-FFF2-40B4-BE49-F238E27FC236}">
-                <a16:creationId xmlns:a16="http://schemas.microsoft.com/office/drawing/2014/main" id="{F4A3C405-8190-4AEC-B9AB-2FBC74AA4E75}"/>
-              </a:ext>
-            </a:extLst>
-          </p:cNvPr>
-          <p:cNvSpPr>
-            <a:spLocks noGrp="1"/>
-          </p:cNvSpPr>
-          <p:nvPr>
-            <p:ph type="dt" sz="half" idx="10"/>
-          </p:nvPr>
-        </p:nvSpPr>
-        <p:spPr/>
-        <p:txBody>
-          <a:bodyPr/>
-          <a:lstStyle/>
-          <a:p>
-            <a:fld id="{DA3763D0-FBF4-4533-9140-ADEED69E83B4}" type="datetime1">
-              <a:rPr lang="es-ES" smtClean="0"/>
-              <a:t>27/01/2018</a:t>
-            </a:fld>
-            <a:endParaRPr lang="en-US" dirty="0"/>
-          </a:p>
-        </p:txBody>
-      </p:sp>
-      <p:sp>
-        <p:nvSpPr>
-          <p:cNvPr id="3" name="Footer Placeholder 2">
-            <a:extLst>
-              <a:ext uri="{FF2B5EF4-FFF2-40B4-BE49-F238E27FC236}">
-                <a16:creationId xmlns:a16="http://schemas.microsoft.com/office/drawing/2014/main" id="{B676A108-0D32-4A62-BD88-9688EE2A3D54}"/>
-              </a:ext>
-            </a:extLst>
-          </p:cNvPr>
-          <p:cNvSpPr>
-            <a:spLocks noGrp="1"/>
-          </p:cNvSpPr>
-          <p:nvPr>
-            <p:ph type="ftr" sz="quarter" idx="11"/>
-          </p:nvPr>
-        </p:nvSpPr>
-        <p:spPr/>
-        <p:txBody>
-          <a:bodyPr/>
-          <a:lstStyle/>
-          <a:p>
-            <a:r>
-              <a:rPr lang="es-ES"/>
-              <a:t>Sistema de adquisición, filtrado y Tratamiento digital de una señal acústica.</a:t>
-            </a:r>
-            <a:endParaRPr lang="en-US" dirty="0"/>
-          </a:p>
-        </p:txBody>
-      </p:sp>
-      <p:sp>
-        <p:nvSpPr>
-          <p:cNvPr id="4" name="Slide Number Placeholder 3">
-            <a:extLst>
-              <a:ext uri="{FF2B5EF4-FFF2-40B4-BE49-F238E27FC236}">
-                <a16:creationId xmlns:a16="http://schemas.microsoft.com/office/drawing/2014/main" id="{075FEEE4-411D-48B8-8C3B-DC25B3238548}"/>
-              </a:ext>
-            </a:extLst>
-          </p:cNvPr>
-          <p:cNvSpPr>
-            <a:spLocks noGrp="1"/>
-          </p:cNvSpPr>
-          <p:nvPr>
-            <p:ph type="sldNum" sz="quarter" idx="12"/>
-          </p:nvPr>
-        </p:nvSpPr>
-        <p:spPr/>
-        <p:txBody>
-          <a:bodyPr/>
-          <a:lstStyle/>
-          <a:p>
-            <a:fld id="{6D22F896-40B5-4ADD-8801-0D06FADFA095}" type="slidenum">
-              <a:rPr lang="en-US" smtClean="0"/>
-              <a:t>23</a:t>
-            </a:fld>
-            <a:endParaRPr lang="en-US" dirty="0"/>
-          </a:p>
-        </p:txBody>
-      </p:sp>
-    </p:spTree>
-    <p:extLst>
-      <p:ext uri="{BB962C8B-B14F-4D97-AF65-F5344CB8AC3E}">
-        <p14:creationId xmlns:p14="http://schemas.microsoft.com/office/powerpoint/2010/main" val="1950089736"/>
-      </p:ext>
-    </p:extLst>
-  </p:cSld>
-  <p:clrMapOvr>
-    <a:masterClrMapping/>
-  </p:clrMapOvr>
-</p:sld>
-</file>
-
 <file path=ppt/slides/slide3.xml><?xml version="1.0" encoding="utf-8"?>
 <p:sld xmlns:a="http://schemas.openxmlformats.org/drawingml/2006/main" xmlns:r="http://schemas.openxmlformats.org/officeDocument/2006/relationships" xmlns:p="http://schemas.openxmlformats.org/presentationml/2006/main">
   <p:cSld>
@@ -29288,8 +30953,8 @@
         </p:blipFill>
         <p:spPr>
           <a:xfrm>
-            <a:off x="8922858" y="3179876"/>
-            <a:ext cx="1371600" cy="1432560"/>
+            <a:off x="8922858" y="3031186"/>
+            <a:ext cx="1663443" cy="1737374"/>
           </a:xfrm>
           <a:prstGeom prst="rect">
             <a:avLst/>
@@ -29314,6 +30979,165 @@
       <p:transition/>
     </mc:Fallback>
   </mc:AlternateContent>
+</p:sld>
+</file>
+
+<file path=ppt/slides/slide30.xml><?xml version="1.0" encoding="utf-8"?>
+<p:sld xmlns:a="http://schemas.openxmlformats.org/drawingml/2006/main" xmlns:r="http://schemas.openxmlformats.org/officeDocument/2006/relationships" xmlns:p="http://schemas.openxmlformats.org/presentationml/2006/main">
+  <p:cSld>
+    <p:spTree>
+      <p:nvGrpSpPr>
+        <p:cNvPr id="1" name=""/>
+        <p:cNvGrpSpPr/>
+        <p:nvPr/>
+      </p:nvGrpSpPr>
+      <p:grpSpPr>
+        <a:xfrm>
+          <a:off x="0" y="0"/>
+          <a:ext cx="0" cy="0"/>
+          <a:chOff x="0" y="0"/>
+          <a:chExt cx="0" cy="0"/>
+        </a:xfrm>
+      </p:grpSpPr>
+      <p:sp>
+        <p:nvSpPr>
+          <p:cNvPr id="8" name="Title 7">
+            <a:extLst>
+              <a:ext uri="{FF2B5EF4-FFF2-40B4-BE49-F238E27FC236}">
+                <a16:creationId xmlns:a16="http://schemas.microsoft.com/office/drawing/2014/main" id="{E41D4263-F554-4D38-B650-01606454E29F}"/>
+              </a:ext>
+            </a:extLst>
+          </p:cNvPr>
+          <p:cNvSpPr>
+            <a:spLocks noGrp="1"/>
+          </p:cNvSpPr>
+          <p:nvPr>
+            <p:ph type="ctrTitle"/>
+          </p:nvPr>
+        </p:nvSpPr>
+        <p:spPr>
+          <a:xfrm>
+            <a:off x="1371600" y="2336651"/>
+            <a:ext cx="9448800" cy="1092349"/>
+          </a:xfrm>
+        </p:spPr>
+        <p:txBody>
+          <a:bodyPr/>
+          <a:lstStyle/>
+          <a:p>
+            <a:pPr algn="ctr"/>
+            <a:r>
+              <a:rPr lang="en-US" cap="small" dirty="0"/>
+              <a:t>¡</a:t>
+            </a:r>
+            <a:r>
+              <a:rPr lang="en-US" cap="small" dirty="0" err="1"/>
+              <a:t>Muchas</a:t>
+            </a:r>
+            <a:r>
+              <a:rPr lang="en-US" cap="small" dirty="0"/>
+              <a:t> Gracias!</a:t>
+            </a:r>
+          </a:p>
+        </p:txBody>
+      </p:sp>
+      <p:sp>
+        <p:nvSpPr>
+          <p:cNvPr id="2" name="Date Placeholder 1">
+            <a:extLst>
+              <a:ext uri="{FF2B5EF4-FFF2-40B4-BE49-F238E27FC236}">
+                <a16:creationId xmlns:a16="http://schemas.microsoft.com/office/drawing/2014/main" id="{F4A3C405-8190-4AEC-B9AB-2FBC74AA4E75}"/>
+              </a:ext>
+            </a:extLst>
+          </p:cNvPr>
+          <p:cNvSpPr>
+            <a:spLocks noGrp="1"/>
+          </p:cNvSpPr>
+          <p:nvPr>
+            <p:ph type="dt" sz="half" idx="10"/>
+          </p:nvPr>
+        </p:nvSpPr>
+        <p:spPr/>
+        <p:txBody>
+          <a:bodyPr/>
+          <a:lstStyle/>
+          <a:p>
+            <a:fld id="{DA3763D0-FBF4-4533-9140-ADEED69E83B4}" type="datetime1">
+              <a:rPr lang="es-ES" smtClean="0"/>
+              <a:t>27/01/2018</a:t>
+            </a:fld>
+            <a:endParaRPr lang="en-US" dirty="0"/>
+          </a:p>
+        </p:txBody>
+      </p:sp>
+      <p:sp>
+        <p:nvSpPr>
+          <p:cNvPr id="3" name="Footer Placeholder 2">
+            <a:extLst>
+              <a:ext uri="{FF2B5EF4-FFF2-40B4-BE49-F238E27FC236}">
+                <a16:creationId xmlns:a16="http://schemas.microsoft.com/office/drawing/2014/main" id="{B676A108-0D32-4A62-BD88-9688EE2A3D54}"/>
+              </a:ext>
+            </a:extLst>
+          </p:cNvPr>
+          <p:cNvSpPr>
+            <a:spLocks noGrp="1"/>
+          </p:cNvSpPr>
+          <p:nvPr>
+            <p:ph type="ftr" sz="quarter" idx="11"/>
+          </p:nvPr>
+        </p:nvSpPr>
+        <p:spPr/>
+        <p:txBody>
+          <a:bodyPr/>
+          <a:lstStyle/>
+          <a:p>
+            <a:r>
+              <a:rPr lang="es-ES"/>
+              <a:t>Sistema de adquisición, filtrado y Tratamiento digital de una señal acústica.</a:t>
+            </a:r>
+            <a:endParaRPr lang="en-US" dirty="0"/>
+          </a:p>
+        </p:txBody>
+      </p:sp>
+      <p:sp>
+        <p:nvSpPr>
+          <p:cNvPr id="4" name="Slide Number Placeholder 3">
+            <a:extLst>
+              <a:ext uri="{FF2B5EF4-FFF2-40B4-BE49-F238E27FC236}">
+                <a16:creationId xmlns:a16="http://schemas.microsoft.com/office/drawing/2014/main" id="{075FEEE4-411D-48B8-8C3B-DC25B3238548}"/>
+              </a:ext>
+            </a:extLst>
+          </p:cNvPr>
+          <p:cNvSpPr>
+            <a:spLocks noGrp="1"/>
+          </p:cNvSpPr>
+          <p:nvPr>
+            <p:ph type="sldNum" sz="quarter" idx="12"/>
+          </p:nvPr>
+        </p:nvSpPr>
+        <p:spPr/>
+        <p:txBody>
+          <a:bodyPr/>
+          <a:lstStyle/>
+          <a:p>
+            <a:fld id="{6D22F896-40B5-4ADD-8801-0D06FADFA095}" type="slidenum">
+              <a:rPr lang="en-US" smtClean="0"/>
+              <a:t>30</a:t>
+            </a:fld>
+            <a:endParaRPr lang="en-US" dirty="0"/>
+          </a:p>
+        </p:txBody>
+      </p:sp>
+    </p:spTree>
+    <p:extLst>
+      <p:ext uri="{BB962C8B-B14F-4D97-AF65-F5344CB8AC3E}">
+        <p14:creationId xmlns:p14="http://schemas.microsoft.com/office/powerpoint/2010/main" val="1950089736"/>
+      </p:ext>
+    </p:extLst>
+  </p:cSld>
+  <p:clrMapOvr>
+    <a:masterClrMapping/>
+  </p:clrMapOvr>
 </p:sld>
 </file>
 
@@ -33884,13 +35708,13 @@
   <p:clrMapOvr>
     <a:masterClrMapping/>
   </p:clrMapOvr>
-  <mc:AlternateContent xmlns:mc="http://schemas.openxmlformats.org/markup-compatibility/2006">
-    <mc:Choice xmlns:p14="http://schemas.microsoft.com/office/powerpoint/2010/main" Requires="p14">
+  <mc:AlternateContent xmlns:mc="http://schemas.openxmlformats.org/markup-compatibility/2006" xmlns:p14="http://schemas.microsoft.com/office/powerpoint/2010/main">
+    <mc:Choice Requires="p14">
       <p:transition spd="med" p14:dur="700">
         <p:fade/>
       </p:transition>
     </mc:Choice>
-    <mc:Fallback>
+    <mc:Fallback xmlns="">
       <p:transition spd="med">
         <p:fade/>
       </p:transition>

</xml_diff>

<commit_message>
SUBSIS: Adición de la diapositiva de problemas.
</commit_message>
<xml_diff>
--- a/Subsis/Presentación/Sistema de adquisición, filtrado y Tratamiento digital.pptx
+++ b/Subsis/Presentación/Sistema de adquisición, filtrado y Tratamiento digital.pptx
@@ -14967,7 +14967,7 @@
           <a:p>
             <a:fld id="{0BED2AD6-8755-4780-A945-DFB3AAF8B968}" type="slidenum">
               <a:rPr lang="en-US" smtClean="0"/>
-              <a:t>‹Nº›</a:t>
+              <a:t>‹#›</a:t>
             </a:fld>
             <a:endParaRPr lang="en-US"/>
           </a:p>
@@ -15233,7 +15233,7 @@
           <a:p>
             <a:fld id="{6B93383A-9629-40DD-AC2C-9F630984072E}" type="slidenum">
               <a:rPr lang="en-US" smtClean="0"/>
-              <a:t>‹Nº›</a:t>
+              <a:t>‹#›</a:t>
             </a:fld>
             <a:endParaRPr lang="en-US"/>
           </a:p>
@@ -15569,7 +15569,7 @@
           <a:p>
             <a:fld id="{6D22F896-40B5-4ADD-8801-0D06FADFA095}" type="slidenum">
               <a:rPr lang="en-US" smtClean="0"/>
-              <a:t>‹Nº›</a:t>
+              <a:t>‹#›</a:t>
             </a:fld>
             <a:endParaRPr lang="en-US" dirty="0"/>
           </a:p>
@@ -15830,7 +15830,7 @@
           <a:p>
             <a:fld id="{6D22F896-40B5-4ADD-8801-0D06FADFA095}" type="slidenum">
               <a:rPr lang="en-US" smtClean="0"/>
-              <a:t>‹Nº›</a:t>
+              <a:t>‹#›</a:t>
             </a:fld>
             <a:endParaRPr lang="en-US" dirty="0"/>
           </a:p>
@@ -16075,7 +16075,7 @@
           <a:p>
             <a:fld id="{6D22F896-40B5-4ADD-8801-0D06FADFA095}" type="slidenum">
               <a:rPr lang="en-US" smtClean="0"/>
-              <a:t>‹Nº›</a:t>
+              <a:t>‹#›</a:t>
             </a:fld>
             <a:endParaRPr lang="en-US" dirty="0"/>
           </a:p>
@@ -16389,7 +16389,7 @@
           <a:p>
             <a:fld id="{6D22F896-40B5-4ADD-8801-0D06FADFA095}" type="slidenum">
               <a:rPr lang="en-US" smtClean="0"/>
-              <a:t>‹Nº›</a:t>
+              <a:t>‹#›</a:t>
             </a:fld>
             <a:endParaRPr lang="en-US" dirty="0"/>
           </a:p>
@@ -16866,7 +16866,7 @@
           <a:p>
             <a:fld id="{6D22F896-40B5-4ADD-8801-0D06FADFA095}" type="slidenum">
               <a:rPr lang="en-US" smtClean="0"/>
-              <a:t>‹Nº›</a:t>
+              <a:t>‹#›</a:t>
             </a:fld>
             <a:endParaRPr lang="en-US" dirty="0"/>
           </a:p>
@@ -17407,7 +17407,7 @@
           <a:p>
             <a:fld id="{6D22F896-40B5-4ADD-8801-0D06FADFA095}" type="slidenum">
               <a:rPr lang="en-US" smtClean="0"/>
-              <a:t>‹Nº›</a:t>
+              <a:t>‹#›</a:t>
             </a:fld>
             <a:endParaRPr lang="en-US" dirty="0"/>
           </a:p>
@@ -18185,7 +18185,7 @@
           <a:p>
             <a:fld id="{6D22F896-40B5-4ADD-8801-0D06FADFA095}" type="slidenum">
               <a:rPr lang="en-US" smtClean="0"/>
-              <a:t>‹Nº›</a:t>
+              <a:t>‹#›</a:t>
             </a:fld>
             <a:endParaRPr lang="en-US" dirty="0"/>
           </a:p>
@@ -18364,7 +18364,7 @@
           <a:p>
             <a:fld id="{6D22F896-40B5-4ADD-8801-0D06FADFA095}" type="slidenum">
               <a:rPr lang="en-US" smtClean="0"/>
-              <a:t>‹Nº›</a:t>
+              <a:t>‹#›</a:t>
             </a:fld>
             <a:endParaRPr lang="en-US" dirty="0"/>
           </a:p>
@@ -18601,7 +18601,7 @@
           <a:p>
             <a:fld id="{6D22F896-40B5-4ADD-8801-0D06FADFA095}" type="slidenum">
               <a:rPr lang="en-US" smtClean="0"/>
-              <a:t>‹Nº›</a:t>
+              <a:t>‹#›</a:t>
             </a:fld>
             <a:endParaRPr lang="en-US" dirty="0"/>
           </a:p>
@@ -18775,7 +18775,7 @@
           <a:p>
             <a:fld id="{6D22F896-40B5-4ADD-8801-0D06FADFA095}" type="slidenum">
               <a:rPr lang="en-US" smtClean="0"/>
-              <a:t>‹Nº›</a:t>
+              <a:t>‹#›</a:t>
             </a:fld>
             <a:endParaRPr lang="en-US" dirty="0"/>
           </a:p>
@@ -19078,7 +19078,7 @@
           <a:p>
             <a:fld id="{6D22F896-40B5-4ADD-8801-0D06FADFA095}" type="slidenum">
               <a:rPr lang="en-US" smtClean="0"/>
-              <a:t>‹Nº›</a:t>
+              <a:t>‹#›</a:t>
             </a:fld>
             <a:endParaRPr lang="en-US" dirty="0"/>
           </a:p>
@@ -19314,7 +19314,7 @@
           <a:p>
             <a:fld id="{6D22F896-40B5-4ADD-8801-0D06FADFA095}" type="slidenum">
               <a:rPr lang="en-US" smtClean="0"/>
-              <a:t>‹Nº›</a:t>
+              <a:t>‹#›</a:t>
             </a:fld>
             <a:endParaRPr lang="en-US" dirty="0"/>
           </a:p>
@@ -19697,7 +19697,7 @@
           <a:p>
             <a:fld id="{6D22F896-40B5-4ADD-8801-0D06FADFA095}" type="slidenum">
               <a:rPr lang="en-US" smtClean="0"/>
-              <a:t>‹Nº›</a:t>
+              <a:t>‹#›</a:t>
             </a:fld>
             <a:endParaRPr lang="en-US" dirty="0"/>
           </a:p>
@@ -19819,7 +19819,7 @@
           <a:p>
             <a:fld id="{6D22F896-40B5-4ADD-8801-0D06FADFA095}" type="slidenum">
               <a:rPr lang="en-US" smtClean="0"/>
-              <a:t>‹Nº›</a:t>
+              <a:t>‹#›</a:t>
             </a:fld>
             <a:endParaRPr lang="en-US" dirty="0"/>
           </a:p>
@@ -19918,7 +19918,7 @@
           <a:p>
             <a:fld id="{6D22F896-40B5-4ADD-8801-0D06FADFA095}" type="slidenum">
               <a:rPr lang="en-US" smtClean="0"/>
-              <a:t>‹Nº›</a:t>
+              <a:t>‹#›</a:t>
             </a:fld>
             <a:endParaRPr lang="en-US" dirty="0"/>
           </a:p>
@@ -20171,7 +20171,7 @@
           <a:p>
             <a:fld id="{6D22F896-40B5-4ADD-8801-0D06FADFA095}" type="slidenum">
               <a:rPr lang="en-US" smtClean="0"/>
-              <a:t>‹Nº›</a:t>
+              <a:t>‹#›</a:t>
             </a:fld>
             <a:endParaRPr lang="en-US" dirty="0"/>
           </a:p>
@@ -20432,7 +20432,7 @@
           <a:p>
             <a:fld id="{6D22F896-40B5-4ADD-8801-0D06FADFA095}" type="slidenum">
               <a:rPr lang="en-US" smtClean="0"/>
-              <a:t>‹Nº›</a:t>
+              <a:t>‹#›</a:t>
             </a:fld>
             <a:endParaRPr lang="en-US" dirty="0"/>
           </a:p>
@@ -20716,7 +20716,7 @@
             <a:fld id="{6D22F896-40B5-4ADD-8801-0D06FADFA095}" type="slidenum">
               <a:rPr lang="en-US" smtClean="0"/>
               <a:pPr/>
-              <a:t>‹Nº›</a:t>
+              <a:t>‹#›</a:t>
             </a:fld>
             <a:endParaRPr lang="en-US" dirty="0"/>
           </a:p>
@@ -28527,6 +28527,139 @@
               <a:rPr lang="en-US" smtClean="0"/>
               <a:t>23</a:t>
             </a:fld>
+            <a:endParaRPr lang="en-US" dirty="0"/>
+          </a:p>
+        </p:txBody>
+      </p:sp>
+      <p:sp>
+        <p:nvSpPr>
+          <p:cNvPr id="6" name="TextBox 5">
+            <a:extLst>
+              <a:ext uri="{FF2B5EF4-FFF2-40B4-BE49-F238E27FC236}">
+                <a16:creationId xmlns:a16="http://schemas.microsoft.com/office/drawing/2014/main" id="{0A572204-3E0F-4AC4-997C-0979EDFCA3C8}"/>
+              </a:ext>
+            </a:extLst>
+          </p:cNvPr>
+          <p:cNvSpPr txBox="1"/>
+          <p:nvPr/>
+        </p:nvSpPr>
+        <p:spPr>
+          <a:xfrm>
+            <a:off x="685800" y="1963024"/>
+            <a:ext cx="8298809" cy="2031325"/>
+          </a:xfrm>
+          <a:prstGeom prst="rect">
+            <a:avLst/>
+          </a:prstGeom>
+          <a:noFill/>
+        </p:spPr>
+        <p:txBody>
+          <a:bodyPr wrap="square" rtlCol="0">
+            <a:spAutoFit/>
+          </a:bodyPr>
+          <a:lstStyle/>
+          <a:p>
+            <a:pPr marL="285750" indent="-285750">
+              <a:buFont typeface="Arial" panose="020B0604020202020204" pitchFamily="34" charset="0"/>
+              <a:buChar char="•"/>
+            </a:pPr>
+            <a:r>
+              <a:rPr lang="en-US" dirty="0" err="1"/>
+              <a:t>Limitaciones</a:t>
+            </a:r>
+            <a:r>
+              <a:rPr lang="en-US" dirty="0"/>
+              <a:t> </a:t>
+            </a:r>
+            <a:r>
+              <a:rPr lang="en-US" dirty="0" err="1"/>
+              <a:t>en</a:t>
+            </a:r>
+            <a:r>
+              <a:rPr lang="en-US" dirty="0"/>
+              <a:t> </a:t>
+            </a:r>
+            <a:r>
+              <a:rPr lang="en-US" dirty="0" err="1"/>
+              <a:t>memoria</a:t>
+            </a:r>
+            <a:r>
+              <a:rPr lang="en-US" dirty="0"/>
+              <a:t>:</a:t>
+            </a:r>
+          </a:p>
+          <a:p>
+            <a:pPr marL="742950" lvl="1" indent="-285750">
+              <a:buFont typeface="Arial" panose="020B0604020202020204" pitchFamily="34" charset="0"/>
+              <a:buChar char="•"/>
+            </a:pPr>
+            <a:r>
+              <a:rPr lang="en-US" dirty="0"/>
+              <a:t>Flash: 512KBs.</a:t>
+            </a:r>
+          </a:p>
+          <a:p>
+            <a:pPr marL="742950" lvl="1" indent="-285750">
+              <a:buFont typeface="Arial" panose="020B0604020202020204" pitchFamily="34" charset="0"/>
+              <a:buChar char="•"/>
+            </a:pPr>
+            <a:r>
+              <a:rPr lang="en-US" dirty="0"/>
+              <a:t>RAM: 64KBs.</a:t>
+            </a:r>
+          </a:p>
+          <a:p>
+            <a:pPr marL="285750" indent="-285750">
+              <a:buFont typeface="Arial" panose="020B0604020202020204" pitchFamily="34" charset="0"/>
+              <a:buChar char="•"/>
+            </a:pPr>
+            <a:r>
+              <a:rPr lang="en-US" dirty="0" err="1"/>
+              <a:t>Limitación</a:t>
+            </a:r>
+            <a:r>
+              <a:rPr lang="en-US" dirty="0"/>
+              <a:t> </a:t>
+            </a:r>
+            <a:r>
+              <a:rPr lang="en-US" dirty="0" err="1"/>
+              <a:t>en</a:t>
+            </a:r>
+            <a:r>
+              <a:rPr lang="en-US" dirty="0"/>
+              <a:t> el DAC, </a:t>
+            </a:r>
+            <a:r>
+              <a:rPr lang="en-US" dirty="0" err="1"/>
+              <a:t>salida</a:t>
+            </a:r>
+            <a:r>
+              <a:rPr lang="en-US" dirty="0"/>
+              <a:t> de 10bits.</a:t>
+            </a:r>
+          </a:p>
+          <a:p>
+            <a:pPr marL="285750" indent="-285750">
+              <a:buFont typeface="Arial" panose="020B0604020202020204" pitchFamily="34" charset="0"/>
+              <a:buChar char="•"/>
+            </a:pPr>
+            <a:r>
+              <a:rPr lang="en-US" dirty="0"/>
+              <a:t>“Popping Sounds”.</a:t>
+            </a:r>
+          </a:p>
+          <a:p>
+            <a:pPr marL="285750" indent="-285750">
+              <a:buFont typeface="Arial" panose="020B0604020202020204" pitchFamily="34" charset="0"/>
+              <a:buChar char="•"/>
+            </a:pPr>
+            <a:endParaRPr lang="en-US" dirty="0"/>
+          </a:p>
+          <a:p>
+            <a:pPr marL="742950" lvl="1" indent="-285750">
+              <a:buFont typeface="Arial" panose="020B0604020202020204" pitchFamily="34" charset="0"/>
+              <a:buChar char="•"/>
+            </a:pPr>
             <a:endParaRPr lang="en-US" dirty="0"/>
           </a:p>
         </p:txBody>

</xml_diff>

<commit_message>
Tiene pinta de definitiva
</commit_message>
<xml_diff>
--- a/Subsis/Presentación/Sistema de adquisición, filtrado y Tratamiento digital.pptx
+++ b/Subsis/Presentación/Sistema de adquisición, filtrado y Tratamiento digital.pptx
@@ -14885,7 +14885,7 @@
           <a:p>
             <a:fld id="{50F23765-5450-48CE-BF1D-D27786CC2F72}" type="datetimeFigureOut">
               <a:rPr lang="en-US" smtClean="0"/>
-              <a:t>1/30/2018</a:t>
+              <a:t>1/31/2018</a:t>
             </a:fld>
             <a:endParaRPr lang="en-US"/>
           </a:p>
@@ -14967,7 +14967,7 @@
           <a:p>
             <a:fld id="{0BED2AD6-8755-4780-A945-DFB3AAF8B968}" type="slidenum">
               <a:rPr lang="en-US" smtClean="0"/>
-              <a:t>‹#›</a:t>
+              <a:t>‹Nº›</a:t>
             </a:fld>
             <a:endParaRPr lang="en-US"/>
           </a:p>
@@ -15071,7 +15071,7 @@
           <a:p>
             <a:fld id="{9628CDF8-D1EA-4E8E-B7DC-C8831B3DD32F}" type="datetimeFigureOut">
               <a:rPr lang="en-US" smtClean="0"/>
-              <a:t>1/30/2018</a:t>
+              <a:t>1/31/2018</a:t>
             </a:fld>
             <a:endParaRPr lang="en-US"/>
           </a:p>
@@ -15233,7 +15233,7 @@
           <a:p>
             <a:fld id="{6B93383A-9629-40DD-AC2C-9F630984072E}" type="slidenum">
               <a:rPr lang="en-US" smtClean="0"/>
-              <a:t>‹#›</a:t>
+              <a:t>‹Nº›</a:t>
             </a:fld>
             <a:endParaRPr lang="en-US"/>
           </a:p>
@@ -15513,7 +15513,7 @@
           <a:p>
             <a:fld id="{DCDBB42F-9838-4BA0-8597-2A32240DE494}" type="datetime1">
               <a:rPr lang="es-ES" smtClean="0"/>
-              <a:t>30/01/2018</a:t>
+              <a:t>31/01/2018</a:t>
             </a:fld>
             <a:endParaRPr lang="en-US" dirty="0"/>
           </a:p>
@@ -15569,7 +15569,7 @@
           <a:p>
             <a:fld id="{6D22F896-40B5-4ADD-8801-0D06FADFA095}" type="slidenum">
               <a:rPr lang="en-US" smtClean="0"/>
-              <a:t>‹#›</a:t>
+              <a:t>‹Nº›</a:t>
             </a:fld>
             <a:endParaRPr lang="en-US" dirty="0"/>
           </a:p>
@@ -15784,7 +15784,7 @@
           <a:p>
             <a:fld id="{8E050375-B383-4461-AA43-F5474B014657}" type="datetime1">
               <a:rPr lang="es-ES" smtClean="0"/>
-              <a:t>30/01/2018</a:t>
+              <a:t>31/01/2018</a:t>
             </a:fld>
             <a:endParaRPr lang="en-US" dirty="0"/>
           </a:p>
@@ -15830,7 +15830,7 @@
           <a:p>
             <a:fld id="{6D22F896-40B5-4ADD-8801-0D06FADFA095}" type="slidenum">
               <a:rPr lang="en-US" smtClean="0"/>
-              <a:t>‹#›</a:t>
+              <a:t>‹Nº›</a:t>
             </a:fld>
             <a:endParaRPr lang="en-US" dirty="0"/>
           </a:p>
@@ -16019,7 +16019,7 @@
           <a:p>
             <a:fld id="{3BFA309A-4AB6-4BD2-98C4-F0BE0F110C25}" type="datetime1">
               <a:rPr lang="es-ES" smtClean="0"/>
-              <a:t>30/01/2018</a:t>
+              <a:t>31/01/2018</a:t>
             </a:fld>
             <a:endParaRPr lang="en-US" dirty="0"/>
           </a:p>
@@ -16075,7 +16075,7 @@
           <a:p>
             <a:fld id="{6D22F896-40B5-4ADD-8801-0D06FADFA095}" type="slidenum">
               <a:rPr lang="en-US" smtClean="0"/>
-              <a:t>‹#›</a:t>
+              <a:t>‹Nº›</a:t>
             </a:fld>
             <a:endParaRPr lang="en-US" dirty="0"/>
           </a:p>
@@ -16333,7 +16333,7 @@
           <a:p>
             <a:fld id="{BFF3ED76-7F3F-41C5-AA8D-5FAB64FB68DC}" type="datetime1">
               <a:rPr lang="es-ES" smtClean="0"/>
-              <a:t>30/01/2018</a:t>
+              <a:t>31/01/2018</a:t>
             </a:fld>
             <a:endParaRPr lang="en-US" dirty="0"/>
           </a:p>
@@ -16389,7 +16389,7 @@
           <a:p>
             <a:fld id="{6D22F896-40B5-4ADD-8801-0D06FADFA095}" type="slidenum">
               <a:rPr lang="en-US" smtClean="0"/>
-              <a:t>‹#›</a:t>
+              <a:t>‹Nº›</a:t>
             </a:fld>
             <a:endParaRPr lang="en-US" dirty="0"/>
           </a:p>
@@ -16810,7 +16810,7 @@
           <a:p>
             <a:fld id="{CDB32514-435D-46A3-9F21-90C2F27BB598}" type="datetime1">
               <a:rPr lang="es-ES" smtClean="0"/>
-              <a:t>30/01/2018</a:t>
+              <a:t>31/01/2018</a:t>
             </a:fld>
             <a:endParaRPr lang="en-US" dirty="0"/>
           </a:p>
@@ -16866,7 +16866,7 @@
           <a:p>
             <a:fld id="{6D22F896-40B5-4ADD-8801-0D06FADFA095}" type="slidenum">
               <a:rPr lang="en-US" smtClean="0"/>
-              <a:t>‹#›</a:t>
+              <a:t>‹Nº›</a:t>
             </a:fld>
             <a:endParaRPr lang="en-US" dirty="0"/>
           </a:p>
@@ -17361,7 +17361,7 @@
           <a:p>
             <a:fld id="{482D9E2E-0320-4749-B503-C04912E37C68}" type="datetime1">
               <a:rPr lang="es-ES" smtClean="0"/>
-              <a:t>30/01/2018</a:t>
+              <a:t>31/01/2018</a:t>
             </a:fld>
             <a:endParaRPr lang="en-US" dirty="0"/>
           </a:p>
@@ -17407,7 +17407,7 @@
           <a:p>
             <a:fld id="{6D22F896-40B5-4ADD-8801-0D06FADFA095}" type="slidenum">
               <a:rPr lang="en-US" smtClean="0"/>
-              <a:t>‹#›</a:t>
+              <a:t>‹Nº›</a:t>
             </a:fld>
             <a:endParaRPr lang="en-US" dirty="0"/>
           </a:p>
@@ -18139,7 +18139,7 @@
           <a:p>
             <a:fld id="{C8991AC3-87D2-4C08-A0AA-2A8EFA57A03C}" type="datetime1">
               <a:rPr lang="es-ES" smtClean="0"/>
-              <a:t>30/01/2018</a:t>
+              <a:t>31/01/2018</a:t>
             </a:fld>
             <a:endParaRPr lang="en-US" dirty="0"/>
           </a:p>
@@ -18185,7 +18185,7 @@
           <a:p>
             <a:fld id="{6D22F896-40B5-4ADD-8801-0D06FADFA095}" type="slidenum">
               <a:rPr lang="en-US" smtClean="0"/>
-              <a:t>‹#›</a:t>
+              <a:t>‹Nº›</a:t>
             </a:fld>
             <a:endParaRPr lang="en-US" dirty="0"/>
           </a:p>
@@ -18318,7 +18318,7 @@
           <a:p>
             <a:fld id="{B4F1F8AB-9989-4B1E-AE52-1364C01A2E2F}" type="datetime1">
               <a:rPr lang="es-ES" smtClean="0"/>
-              <a:t>30/01/2018</a:t>
+              <a:t>31/01/2018</a:t>
             </a:fld>
             <a:endParaRPr lang="en-US" dirty="0"/>
           </a:p>
@@ -18364,7 +18364,7 @@
           <a:p>
             <a:fld id="{6D22F896-40B5-4ADD-8801-0D06FADFA095}" type="slidenum">
               <a:rPr lang="en-US" smtClean="0"/>
-              <a:t>‹#›</a:t>
+              <a:t>‹Nº›</a:t>
             </a:fld>
             <a:endParaRPr lang="en-US" dirty="0"/>
           </a:p>
@@ -18545,7 +18545,7 @@
           <a:p>
             <a:fld id="{20621808-AEFE-49A9-8A24-DF155648DE22}" type="datetime1">
               <a:rPr lang="es-ES" smtClean="0"/>
-              <a:t>30/01/2018</a:t>
+              <a:t>31/01/2018</a:t>
             </a:fld>
             <a:endParaRPr lang="en-US" dirty="0"/>
           </a:p>
@@ -18601,7 +18601,7 @@
           <a:p>
             <a:fld id="{6D22F896-40B5-4ADD-8801-0D06FADFA095}" type="slidenum">
               <a:rPr lang="en-US" smtClean="0"/>
-              <a:t>‹#›</a:t>
+              <a:t>‹Nº›</a:t>
             </a:fld>
             <a:endParaRPr lang="en-US" dirty="0"/>
           </a:p>
@@ -18729,7 +18729,7 @@
           <a:p>
             <a:fld id="{8A2DE761-68F1-452A-991B-6F2E778C0E08}" type="datetime1">
               <a:rPr lang="es-ES" smtClean="0"/>
-              <a:t>30/01/2018</a:t>
+              <a:t>31/01/2018</a:t>
             </a:fld>
             <a:endParaRPr lang="en-US" dirty="0"/>
           </a:p>
@@ -18775,7 +18775,7 @@
           <a:p>
             <a:fld id="{6D22F896-40B5-4ADD-8801-0D06FADFA095}" type="slidenum">
               <a:rPr lang="en-US" smtClean="0"/>
-              <a:t>‹#›</a:t>
+              <a:t>‹Nº›</a:t>
             </a:fld>
             <a:endParaRPr lang="en-US" dirty="0"/>
           </a:p>
@@ -19022,7 +19022,7 @@
           <a:p>
             <a:fld id="{34951F3B-C5CE-4EAC-9081-2AFA110FCA0F}" type="datetime1">
               <a:rPr lang="es-ES" smtClean="0"/>
-              <a:t>30/01/2018</a:t>
+              <a:t>31/01/2018</a:t>
             </a:fld>
             <a:endParaRPr lang="en-US" dirty="0"/>
           </a:p>
@@ -19078,7 +19078,7 @@
           <a:p>
             <a:fld id="{6D22F896-40B5-4ADD-8801-0D06FADFA095}" type="slidenum">
               <a:rPr lang="en-US" smtClean="0"/>
-              <a:t>‹#›</a:t>
+              <a:t>‹Nº›</a:t>
             </a:fld>
             <a:endParaRPr lang="en-US" dirty="0"/>
           </a:p>
@@ -19268,7 +19268,7 @@
           <a:p>
             <a:fld id="{2D48DB2B-05D5-4765-BFF0-DE0758C10474}" type="datetime1">
               <a:rPr lang="es-ES" smtClean="0"/>
-              <a:t>30/01/2018</a:t>
+              <a:t>31/01/2018</a:t>
             </a:fld>
             <a:endParaRPr lang="en-US" dirty="0"/>
           </a:p>
@@ -19314,7 +19314,7 @@
           <a:p>
             <a:fld id="{6D22F896-40B5-4ADD-8801-0D06FADFA095}" type="slidenum">
               <a:rPr lang="en-US" smtClean="0"/>
-              <a:t>‹#›</a:t>
+              <a:t>‹Nº›</a:t>
             </a:fld>
             <a:endParaRPr lang="en-US" dirty="0"/>
           </a:p>
@@ -19651,7 +19651,7 @@
           <a:p>
             <a:fld id="{83D5FC61-CB6E-4DE2-982E-C7653C088D96}" type="datetime1">
               <a:rPr lang="es-ES" smtClean="0"/>
-              <a:t>30/01/2018</a:t>
+              <a:t>31/01/2018</a:t>
             </a:fld>
             <a:endParaRPr lang="en-US" dirty="0"/>
           </a:p>
@@ -19697,7 +19697,7 @@
           <a:p>
             <a:fld id="{6D22F896-40B5-4ADD-8801-0D06FADFA095}" type="slidenum">
               <a:rPr lang="en-US" smtClean="0"/>
-              <a:t>‹#›</a:t>
+              <a:t>‹Nº›</a:t>
             </a:fld>
             <a:endParaRPr lang="en-US" dirty="0"/>
           </a:p>
@@ -19773,7 +19773,7 @@
           <a:p>
             <a:fld id="{E0855CDD-93BC-47DE-BEFF-59319602E3E3}" type="datetime1">
               <a:rPr lang="es-ES" smtClean="0"/>
-              <a:t>30/01/2018</a:t>
+              <a:t>31/01/2018</a:t>
             </a:fld>
             <a:endParaRPr lang="en-US" dirty="0"/>
           </a:p>
@@ -19819,7 +19819,7 @@
           <a:p>
             <a:fld id="{6D22F896-40B5-4ADD-8801-0D06FADFA095}" type="slidenum">
               <a:rPr lang="en-US" smtClean="0"/>
-              <a:t>‹#›</a:t>
+              <a:t>‹Nº›</a:t>
             </a:fld>
             <a:endParaRPr lang="en-US" dirty="0"/>
           </a:p>
@@ -19872,7 +19872,7 @@
           <a:p>
             <a:fld id="{DA3763D0-FBF4-4533-9140-ADEED69E83B4}" type="datetime1">
               <a:rPr lang="es-ES" smtClean="0"/>
-              <a:t>30/01/2018</a:t>
+              <a:t>31/01/2018</a:t>
             </a:fld>
             <a:endParaRPr lang="en-US" dirty="0"/>
           </a:p>
@@ -19918,7 +19918,7 @@
           <a:p>
             <a:fld id="{6D22F896-40B5-4ADD-8801-0D06FADFA095}" type="slidenum">
               <a:rPr lang="en-US" smtClean="0"/>
-              <a:t>‹#›</a:t>
+              <a:t>‹Nº›</a:t>
             </a:fld>
             <a:endParaRPr lang="en-US" dirty="0"/>
           </a:p>
@@ -20125,7 +20125,7 @@
           <a:p>
             <a:fld id="{0D02CA71-BF78-429D-A6D8-CADBF5C3A941}" type="datetime1">
               <a:rPr lang="es-ES" smtClean="0"/>
-              <a:t>30/01/2018</a:t>
+              <a:t>31/01/2018</a:t>
             </a:fld>
             <a:endParaRPr lang="en-US" dirty="0"/>
           </a:p>
@@ -20171,7 +20171,7 @@
           <a:p>
             <a:fld id="{6D22F896-40B5-4ADD-8801-0D06FADFA095}" type="slidenum">
               <a:rPr lang="en-US" smtClean="0"/>
-              <a:t>‹#›</a:t>
+              <a:t>‹Nº›</a:t>
             </a:fld>
             <a:endParaRPr lang="en-US" dirty="0"/>
           </a:p>
@@ -20386,7 +20386,7 @@
           <a:p>
             <a:fld id="{DC3CD5EC-E118-477A-B20A-54B09E3D9B37}" type="datetime1">
               <a:rPr lang="es-ES" smtClean="0"/>
-              <a:t>30/01/2018</a:t>
+              <a:t>31/01/2018</a:t>
             </a:fld>
             <a:endParaRPr lang="en-US" dirty="0"/>
           </a:p>
@@ -20432,7 +20432,7 @@
           <a:p>
             <a:fld id="{6D22F896-40B5-4ADD-8801-0D06FADFA095}" type="slidenum">
               <a:rPr lang="en-US" smtClean="0"/>
-              <a:t>‹#›</a:t>
+              <a:t>‹Nº›</a:t>
             </a:fld>
             <a:endParaRPr lang="en-US" dirty="0"/>
           </a:p>
@@ -20633,7 +20633,7 @@
           <a:p>
             <a:fld id="{9F0E3C1F-E5AF-4671-B520-7AFF2C5456AB}" type="datetime1">
               <a:rPr lang="es-ES" smtClean="0"/>
-              <a:t>30/01/2018</a:t>
+              <a:t>31/01/2018</a:t>
             </a:fld>
             <a:endParaRPr lang="en-US" dirty="0"/>
           </a:p>
@@ -20716,7 +20716,7 @@
             <a:fld id="{6D22F896-40B5-4ADD-8801-0D06FADFA095}" type="slidenum">
               <a:rPr lang="en-US" smtClean="0"/>
               <a:pPr/>
-              <a:t>‹#›</a:t>
+              <a:t>‹Nº›</a:t>
             </a:fld>
             <a:endParaRPr lang="en-US" dirty="0"/>
           </a:p>
@@ -21257,7 +21257,7 @@
           <a:p>
             <a:fld id="{E0855CDD-93BC-47DE-BEFF-59319602E3E3}" type="datetime1">
               <a:rPr lang="es-ES" smtClean="0"/>
-              <a:t>30/01/2018</a:t>
+              <a:t>31/01/2018</a:t>
             </a:fld>
             <a:endParaRPr lang="en-US" dirty="0"/>
           </a:p>
@@ -22203,7 +22203,7 @@
           <a:p>
             <a:fld id="{E0855CDD-93BC-47DE-BEFF-59319602E3E3}" type="datetime1">
               <a:rPr lang="es-ES" smtClean="0"/>
-              <a:t>30/01/2018</a:t>
+              <a:t>31/01/2018</a:t>
             </a:fld>
             <a:endParaRPr lang="en-US" dirty="0"/>
           </a:p>
@@ -22841,7 +22841,7 @@
           <a:p>
             <a:fld id="{E0855CDD-93BC-47DE-BEFF-59319602E3E3}" type="datetime1">
               <a:rPr lang="es-ES" smtClean="0"/>
-              <a:t>30/01/2018</a:t>
+              <a:t>31/01/2018</a:t>
             </a:fld>
             <a:endParaRPr lang="en-US" dirty="0"/>
           </a:p>
@@ -24114,7 +24114,7 @@
           <a:p>
             <a:fld id="{E0855CDD-93BC-47DE-BEFF-59319602E3E3}" type="datetime1">
               <a:rPr lang="es-ES" smtClean="0"/>
-              <a:t>30/01/2018</a:t>
+              <a:t>31/01/2018</a:t>
             </a:fld>
             <a:endParaRPr lang="en-US" dirty="0"/>
           </a:p>
@@ -25608,7 +25608,7 @@
           <a:p>
             <a:fld id="{E0855CDD-93BC-47DE-BEFF-59319602E3E3}" type="datetime1">
               <a:rPr lang="es-ES" smtClean="0"/>
-              <a:t>30/01/2018</a:t>
+              <a:t>31/01/2018</a:t>
             </a:fld>
             <a:endParaRPr lang="en-US" dirty="0"/>
           </a:p>
@@ -26252,7 +26252,7 @@
           <a:p>
             <a:fld id="{E0855CDD-93BC-47DE-BEFF-59319602E3E3}" type="datetime1">
               <a:rPr lang="es-ES" smtClean="0"/>
-              <a:t>30/01/2018</a:t>
+              <a:t>31/01/2018</a:t>
             </a:fld>
             <a:endParaRPr lang="en-US" dirty="0"/>
           </a:p>
@@ -26526,7 +26526,7 @@
           <a:p>
             <a:fld id="{E0855CDD-93BC-47DE-BEFF-59319602E3E3}" type="datetime1">
               <a:rPr lang="es-ES" smtClean="0"/>
-              <a:t>30/01/2018</a:t>
+              <a:t>31/01/2018</a:t>
             </a:fld>
             <a:endParaRPr lang="en-US" dirty="0"/>
           </a:p>
@@ -26652,8 +26652,12 @@
               <a:t>Buffer muestras</a:t>
             </a:r>
             <a:r>
+              <a:rPr lang="es-ES_tradnl"/>
+              <a:t>: 16384</a:t>
+            </a:r>
+            <a:r>
               <a:rPr lang="es-ES_tradnl" dirty="0"/>
-              <a:t>: 18384.</a:t>
+              <a:t>.</a:t>
             </a:r>
           </a:p>
           <a:p>
@@ -26667,7 +26671,7 @@
             </a:r>
             <a:r>
               <a:rPr lang="es-ES_tradnl" dirty="0"/>
-              <a:t>25KHz.</a:t>
+              <a:t>50 KHz.</a:t>
             </a:r>
           </a:p>
           <a:p>
@@ -26689,7 +26693,7 @@
             </a:r>
             <a:r>
               <a:rPr lang="es-ES_tradnl" dirty="0"/>
-              <a:t>0,5 s aproximadamente.</a:t>
+              <a:t>0,33 s aproximadamente.</a:t>
             </a:r>
           </a:p>
         </p:txBody>
@@ -26819,7 +26823,7 @@
           <a:p>
             <a:fld id="{E0855CDD-93BC-47DE-BEFF-59319602E3E3}" type="datetime1">
               <a:rPr lang="es-ES" smtClean="0"/>
-              <a:t>30/01/2018</a:t>
+              <a:t>31/01/2018</a:t>
             </a:fld>
             <a:endParaRPr lang="en-US" dirty="0"/>
           </a:p>
@@ -26898,7 +26902,7 @@
         <p:spPr>
           <a:xfrm>
             <a:off x="685800" y="2318994"/>
-            <a:ext cx="5410200" cy="2862322"/>
+            <a:ext cx="5410200" cy="3416320"/>
           </a:xfrm>
           <a:prstGeom prst="rect">
             <a:avLst/>
@@ -26918,6 +26922,20 @@
             <a:r>
               <a:rPr lang="es-ES_tradnl" dirty="0"/>
               <a:t>El efecto de Distorsión consiste en alterar de diferente manera las componentes de audio, cambiando su amplitud, fase o frecuencia.</a:t>
+            </a:r>
+          </a:p>
+          <a:p>
+            <a:pPr marL="742950" lvl="1" indent="-285750">
+              <a:buFont typeface="Arial" panose="020B0604020202020204" pitchFamily="34" charset="0"/>
+              <a:buChar char="•"/>
+            </a:pPr>
+            <a:r>
+              <a:rPr lang="es-ES_tradnl" dirty="0" err="1"/>
+              <a:t>Clippeado</a:t>
+            </a:r>
+            <a:r>
+              <a:rPr lang="es-ES_tradnl" dirty="0"/>
+              <a:t> de la señal cuando está por encima o por debajo de un umbral.</a:t>
             </a:r>
           </a:p>
           <a:p>
@@ -27081,7 +27099,7 @@
           <a:p>
             <a:fld id="{E0855CDD-93BC-47DE-BEFF-59319602E3E3}" type="datetime1">
               <a:rPr lang="es-ES" smtClean="0"/>
-              <a:t>30/01/2018</a:t>
+              <a:t>31/01/2018</a:t>
             </a:fld>
             <a:endParaRPr lang="en-US" dirty="0"/>
           </a:p>
@@ -27187,7 +27205,15 @@
             </a:r>
             <a:r>
               <a:rPr lang="es-ES_tradnl" dirty="0"/>
-              <a:t> consiste en distorsionar las componentes de audio de tal manera que si su amplitud supera un umbral se amplifica a su máxima amplitud y en caso de estar por debajo del umbral su amplitud se hace 0.</a:t>
+              <a:t> consiste en distorsionar las componentes de audio de tal manera que si su amplitud supera un umbral se </a:t>
+            </a:r>
+            <a:r>
+              <a:rPr lang="es-ES_tradnl" dirty="0" err="1"/>
+              <a:t>clippea</a:t>
+            </a:r>
+            <a:r>
+              <a:rPr lang="es-ES_tradnl" dirty="0"/>
+              <a:t> a su máxima amplitud y en caso de estar por debajo del umbral su amplitud se hace 0.</a:t>
             </a:r>
           </a:p>
           <a:p>
@@ -27340,7 +27366,7 @@
           <a:p>
             <a:fld id="{E0855CDD-93BC-47DE-BEFF-59319602E3E3}" type="datetime1">
               <a:rPr lang="es-ES" smtClean="0"/>
-              <a:t>30/01/2018</a:t>
+              <a:t>31/01/2018</a:t>
             </a:fld>
             <a:endParaRPr lang="en-US" dirty="0"/>
           </a:p>
@@ -27546,7 +27572,7 @@
                   <a:schemeClr val="tx1"/>
                 </a:solidFill>
               </a:rPr>
-              <a:t>30/01/2018</a:t>
+              <a:t>31/01/2018</a:t>
             </a:fld>
             <a:endParaRPr lang="en-US">
               <a:solidFill>
@@ -27758,7 +27784,7 @@
           <a:p>
             <a:fld id="{E0855CDD-93BC-47DE-BEFF-59319602E3E3}" type="datetime1">
               <a:rPr lang="es-ES" smtClean="0"/>
-              <a:t>30/01/2018</a:t>
+              <a:t>31/01/2018</a:t>
             </a:fld>
             <a:endParaRPr lang="en-US" dirty="0"/>
           </a:p>
@@ -27994,7 +28020,7 @@
           <a:p>
             <a:fld id="{E0855CDD-93BC-47DE-BEFF-59319602E3E3}" type="datetime1">
               <a:rPr lang="es-ES" smtClean="0"/>
-              <a:t>30/01/2018</a:t>
+              <a:t>31/01/2018</a:t>
             </a:fld>
             <a:endParaRPr lang="en-US" dirty="0"/>
           </a:p>
@@ -28230,7 +28256,7 @@
           <a:p>
             <a:fld id="{E0855CDD-93BC-47DE-BEFF-59319602E3E3}" type="datetime1">
               <a:rPr lang="es-ES" smtClean="0"/>
-              <a:t>30/01/2018</a:t>
+              <a:t>31/01/2018</a:t>
             </a:fld>
             <a:endParaRPr lang="en-US" dirty="0"/>
           </a:p>
@@ -28375,7 +28401,7 @@
             </a:pPr>
             <a:r>
               <a:rPr lang="es-ES_tradnl" dirty="0"/>
-              <a:t>Sinusoide de frecuencia : 100-400 Hz</a:t>
+              <a:t>Frecuencia sinusoide : 100-400 Hz</a:t>
             </a:r>
           </a:p>
         </p:txBody>
@@ -28467,7 +28493,7 @@
           <a:p>
             <a:fld id="{E0855CDD-93BC-47DE-BEFF-59319602E3E3}" type="datetime1">
               <a:rPr lang="es-ES" smtClean="0"/>
-              <a:t>30/01/2018</a:t>
+              <a:t>31/01/2018</a:t>
             </a:fld>
             <a:endParaRPr lang="en-US" dirty="0"/>
           </a:p>
@@ -28772,7 +28798,7 @@
                   <a:schemeClr val="tx1"/>
                 </a:solidFill>
               </a:rPr>
-              <a:t>30/01/2018</a:t>
+              <a:t>31/01/2018</a:t>
             </a:fld>
             <a:endParaRPr lang="en-US">
               <a:solidFill>
@@ -29273,7 +29299,7 @@
           <a:p>
             <a:fld id="{E0855CDD-93BC-47DE-BEFF-59319602E3E3}" type="datetime1">
               <a:rPr lang="es-ES" smtClean="0"/>
-              <a:t>30/01/2018</a:t>
+              <a:t>31/01/2018</a:t>
             </a:fld>
             <a:endParaRPr lang="en-US" dirty="0"/>
           </a:p>
@@ -29334,6 +29360,109 @@
               <a:t>25</a:t>
             </a:fld>
             <a:endParaRPr lang="en-US" dirty="0"/>
+          </a:p>
+        </p:txBody>
+      </p:sp>
+      <p:sp>
+        <p:nvSpPr>
+          <p:cNvPr id="6" name="CuadroTexto 5">
+            <a:extLst>
+              <a:ext uri="{FF2B5EF4-FFF2-40B4-BE49-F238E27FC236}">
+                <a16:creationId xmlns:a16="http://schemas.microsoft.com/office/drawing/2014/main" id="{3A9132CE-F3C4-433F-9E3F-A3564CF62ECF}"/>
+              </a:ext>
+            </a:extLst>
+          </p:cNvPr>
+          <p:cNvSpPr txBox="1"/>
+          <p:nvPr/>
+        </p:nvSpPr>
+        <p:spPr>
+          <a:xfrm>
+            <a:off x="685800" y="2057401"/>
+            <a:ext cx="4326826" cy="3970318"/>
+          </a:xfrm>
+          <a:prstGeom prst="rect">
+            <a:avLst/>
+          </a:prstGeom>
+          <a:noFill/>
+        </p:spPr>
+        <p:txBody>
+          <a:bodyPr wrap="square" rtlCol="0">
+            <a:spAutoFit/>
+          </a:bodyPr>
+          <a:lstStyle/>
+          <a:p>
+            <a:pPr marL="285750" indent="-285750">
+              <a:buFont typeface="Arial" panose="020B0604020202020204" pitchFamily="34" charset="0"/>
+              <a:buChar char="•"/>
+            </a:pPr>
+            <a:r>
+              <a:rPr lang="es-ES_tradnl" dirty="0"/>
+              <a:t>Utilizar una tarjeta SD y el DMA de la placa “Mini-DK2” para aumentar la memoria.</a:t>
+            </a:r>
+          </a:p>
+          <a:p>
+            <a:endParaRPr lang="es-ES_tradnl" dirty="0"/>
+          </a:p>
+          <a:p>
+            <a:pPr marL="285750" indent="-285750">
+              <a:buFont typeface="Arial" panose="020B0604020202020204" pitchFamily="34" charset="0"/>
+              <a:buChar char="•"/>
+            </a:pPr>
+            <a:r>
+              <a:rPr lang="es-ES_tradnl" dirty="0"/>
+              <a:t>Depurar la codificación de los efectos.</a:t>
+            </a:r>
+          </a:p>
+          <a:p>
+            <a:pPr marL="285750" indent="-285750">
+              <a:buFont typeface="Arial" panose="020B0604020202020204" pitchFamily="34" charset="0"/>
+              <a:buChar char="•"/>
+            </a:pPr>
+            <a:endParaRPr lang="es-ES_tradnl" dirty="0"/>
+          </a:p>
+          <a:p>
+            <a:pPr marL="285750" indent="-285750">
+              <a:buFont typeface="Arial" panose="020B0604020202020204" pitchFamily="34" charset="0"/>
+              <a:buChar char="•"/>
+            </a:pPr>
+            <a:r>
+              <a:rPr lang="es-ES_tradnl" dirty="0"/>
+              <a:t>Implementar varios efectos simultáneamente en la placa.</a:t>
+            </a:r>
+          </a:p>
+          <a:p>
+            <a:pPr marL="285750" indent="-285750">
+              <a:buFont typeface="Arial" panose="020B0604020202020204" pitchFamily="34" charset="0"/>
+              <a:buChar char="•"/>
+            </a:pPr>
+            <a:endParaRPr lang="es-ES_tradnl" dirty="0"/>
+          </a:p>
+          <a:p>
+            <a:pPr marL="285750" indent="-285750">
+              <a:buFont typeface="Arial" panose="020B0604020202020204" pitchFamily="34" charset="0"/>
+              <a:buChar char="•"/>
+            </a:pPr>
+            <a:r>
+              <a:rPr lang="es-ES_tradnl" dirty="0"/>
+              <a:t>Implementar el filtro FIR </a:t>
+            </a:r>
+          </a:p>
+          <a:p>
+            <a:pPr marL="285750" indent="-285750">
+              <a:buFont typeface="Arial" panose="020B0604020202020204" pitchFamily="34" charset="0"/>
+              <a:buChar char="•"/>
+            </a:pPr>
+            <a:endParaRPr lang="es-ES_tradnl" dirty="0"/>
+          </a:p>
+          <a:p>
+            <a:pPr marL="285750" indent="-285750">
+              <a:buFont typeface="Arial" panose="020B0604020202020204" pitchFamily="34" charset="0"/>
+              <a:buChar char="•"/>
+            </a:pPr>
+            <a:r>
+              <a:rPr lang="es-ES_tradnl" dirty="0"/>
+              <a:t>Adquirir un hardware con mejores especificaciones.</a:t>
+            </a:r>
           </a:p>
         </p:txBody>
       </p:sp>
@@ -29424,7 +29553,7 @@
           <a:p>
             <a:fld id="{E0855CDD-93BC-47DE-BEFF-59319602E3E3}" type="datetime1">
               <a:rPr lang="es-ES" smtClean="0"/>
-              <a:t>30/01/2018</a:t>
+              <a:t>31/01/2018</a:t>
             </a:fld>
             <a:endParaRPr lang="en-US" dirty="0"/>
           </a:p>
@@ -29485,6 +29614,76 @@
               <a:t>26</a:t>
             </a:fld>
             <a:endParaRPr lang="en-US" dirty="0"/>
+          </a:p>
+        </p:txBody>
+      </p:sp>
+      <p:sp>
+        <p:nvSpPr>
+          <p:cNvPr id="6" name="CuadroTexto 5">
+            <a:extLst>
+              <a:ext uri="{FF2B5EF4-FFF2-40B4-BE49-F238E27FC236}">
+                <a16:creationId xmlns:a16="http://schemas.microsoft.com/office/drawing/2014/main" id="{574656E9-BC90-431F-A773-52033AF80B29}"/>
+              </a:ext>
+            </a:extLst>
+          </p:cNvPr>
+          <p:cNvSpPr txBox="1"/>
+          <p:nvPr/>
+        </p:nvSpPr>
+        <p:spPr>
+          <a:xfrm>
+            <a:off x="685800" y="2057401"/>
+            <a:ext cx="4326826" cy="2031325"/>
+          </a:xfrm>
+          <a:prstGeom prst="rect">
+            <a:avLst/>
+          </a:prstGeom>
+          <a:noFill/>
+        </p:spPr>
+        <p:txBody>
+          <a:bodyPr wrap="square" rtlCol="0">
+            <a:spAutoFit/>
+          </a:bodyPr>
+          <a:lstStyle/>
+          <a:p>
+            <a:pPr marL="285750" indent="-285750">
+              <a:buFont typeface="Arial" panose="020B0604020202020204" pitchFamily="34" charset="0"/>
+              <a:buChar char="•"/>
+            </a:pPr>
+            <a:r>
+              <a:rPr lang="es-ES_tradnl" dirty="0"/>
+              <a:t>Un experimento muy ilustrativo.</a:t>
+            </a:r>
+          </a:p>
+          <a:p>
+            <a:pPr marL="285750" indent="-285750">
+              <a:buFont typeface="Arial" panose="020B0604020202020204" pitchFamily="34" charset="0"/>
+              <a:buChar char="•"/>
+            </a:pPr>
+            <a:endParaRPr lang="es-ES_tradnl" dirty="0"/>
+          </a:p>
+          <a:p>
+            <a:pPr marL="285750" indent="-285750">
+              <a:buFont typeface="Arial" panose="020B0604020202020204" pitchFamily="34" charset="0"/>
+              <a:buChar char="•"/>
+            </a:pPr>
+            <a:r>
+              <a:rPr lang="es-ES_tradnl" dirty="0"/>
+              <a:t>Los objetivos propuestos a priori no se han podido alcanzar en su totalidad.</a:t>
+            </a:r>
+          </a:p>
+          <a:p>
+            <a:pPr marL="285750" indent="-285750">
+              <a:buFont typeface="Arial" panose="020B0604020202020204" pitchFamily="34" charset="0"/>
+              <a:buChar char="•"/>
+            </a:pPr>
+            <a:endParaRPr lang="es-ES_tradnl" dirty="0"/>
+          </a:p>
+          <a:p>
+            <a:pPr marL="285750" indent="-285750">
+              <a:buFont typeface="Arial" panose="020B0604020202020204" pitchFamily="34" charset="0"/>
+              <a:buChar char="•"/>
+            </a:pPr>
+            <a:endParaRPr lang="es-ES_tradnl" dirty="0"/>
           </a:p>
         </p:txBody>
       </p:sp>
@@ -29575,7 +29774,7 @@
           <a:p>
             <a:fld id="{E0855CDD-93BC-47DE-BEFF-59319602E3E3}" type="datetime1">
               <a:rPr lang="es-ES" smtClean="0"/>
-              <a:t>30/01/2018</a:t>
+              <a:t>31/01/2018</a:t>
             </a:fld>
             <a:endParaRPr lang="en-US" dirty="0"/>
           </a:p>
@@ -29933,7 +30132,7 @@
           <a:p>
             <a:fld id="{E0855CDD-93BC-47DE-BEFF-59319602E3E3}" type="datetime1">
               <a:rPr lang="es-ES" smtClean="0"/>
-              <a:t>30/01/2018</a:t>
+              <a:t>31/01/2018</a:t>
             </a:fld>
             <a:endParaRPr lang="en-US" dirty="0"/>
           </a:p>
@@ -30177,7 +30376,7 @@
           <a:p>
             <a:fld id="{DA3763D0-FBF4-4533-9140-ADEED69E83B4}" type="datetime1">
               <a:rPr lang="es-ES" smtClean="0"/>
-              <a:t>30/01/2018</a:t>
+              <a:t>31/01/2018</a:t>
             </a:fld>
             <a:endParaRPr lang="en-US" dirty="0"/>
           </a:p>
@@ -30323,7 +30522,7 @@
           <a:p>
             <a:fld id="{98FBD669-39C0-4E64-8C38-5513E7EC2408}" type="datetime1">
               <a:rPr lang="es-ES" smtClean="0"/>
-              <a:t>30/01/2018</a:t>
+              <a:t>31/01/2018</a:t>
             </a:fld>
             <a:endParaRPr lang="en-US" dirty="0"/>
           </a:p>
@@ -30732,7 +30931,7 @@
           <a:p>
             <a:fld id="{E0855CDD-93BC-47DE-BEFF-59319602E3E3}" type="datetime1">
               <a:rPr lang="es-ES" smtClean="0"/>
-              <a:t>30/01/2018</a:t>
+              <a:t>31/01/2018</a:t>
             </a:fld>
             <a:endParaRPr lang="en-US" dirty="0"/>
           </a:p>
@@ -31434,7 +31633,7 @@
           <a:p>
             <a:fld id="{E0855CDD-93BC-47DE-BEFF-59319602E3E3}" type="datetime1">
               <a:rPr lang="es-ES" smtClean="0"/>
-              <a:t>30/01/2018</a:t>
+              <a:t>31/01/2018</a:t>
             </a:fld>
             <a:endParaRPr lang="en-US" dirty="0"/>
           </a:p>
@@ -32622,7 +32821,7 @@
                   <a:spcPts val="600"/>
                 </a:spcAft>
               </a:pPr>
-              <a:t>1/30/2018</a:t>
+              <a:t>1/31/2018</a:t>
             </a:fld>
             <a:endParaRPr lang="en-US"/>
           </a:p>
@@ -33118,7 +33317,7 @@
           <a:p>
             <a:fld id="{E0855CDD-93BC-47DE-BEFF-59319602E3E3}" type="datetime1">
               <a:rPr lang="es-ES" smtClean="0"/>
-              <a:t>30/01/2018</a:t>
+              <a:t>31/01/2018</a:t>
             </a:fld>
             <a:endParaRPr lang="en-US" dirty="0"/>
           </a:p>
@@ -34128,7 +34327,7 @@
           <a:p>
             <a:fld id="{E0855CDD-93BC-47DE-BEFF-59319602E3E3}" type="datetime1">
               <a:rPr lang="es-ES" smtClean="0"/>
-              <a:t>30/01/2018</a:t>
+              <a:t>31/01/2018</a:t>
             </a:fld>
             <a:endParaRPr lang="en-US" dirty="0"/>
           </a:p>
@@ -34914,7 +35113,7 @@
                   <a:schemeClr val="tx1"/>
                 </a:solidFill>
               </a:rPr>
-              <a:t>30/01/2018</a:t>
+              <a:t>31/01/2018</a:t>
             </a:fld>
             <a:endParaRPr lang="en-US">
               <a:solidFill>

</xml_diff>